<commit_message>
se realizo todas las clases para esta semana
</commit_message>
<xml_diff>
--- a/2015-2016/clases/computacion_aplicada_2/clase_2/clase_2.pptx
+++ b/2015-2016/clases/computacion_aplicada_2/clase_2/clase_2.pptx
@@ -6,10 +6,18 @@
   </p:sldMasterIdLst>
   <p:sldIdLst>
     <p:sldId id="256" r:id="rId2"/>
-    <p:sldId id="257" r:id="rId3"/>
-    <p:sldId id="258" r:id="rId4"/>
-    <p:sldId id="259" r:id="rId5"/>
-    <p:sldId id="260" r:id="rId6"/>
+    <p:sldId id="261" r:id="rId3"/>
+    <p:sldId id="257" r:id="rId4"/>
+    <p:sldId id="262" r:id="rId5"/>
+    <p:sldId id="263" r:id="rId6"/>
+    <p:sldId id="264" r:id="rId7"/>
+    <p:sldId id="258" r:id="rId8"/>
+    <p:sldId id="259" r:id="rId9"/>
+    <p:sldId id="260" r:id="rId10"/>
+    <p:sldId id="265" r:id="rId11"/>
+    <p:sldId id="266" r:id="rId12"/>
+    <p:sldId id="267" r:id="rId13"/>
+    <p:sldId id="268" r:id="rId14"/>
   </p:sldIdLst>
   <p:sldSz cx="9144000" cy="6858000" type="screen4x3"/>
   <p:notesSz cx="6858000" cy="9144000"/>
@@ -3107,6 +3115,767 @@
   <p:clrMapOvr>
     <a:masterClrMapping/>
   </p:clrMapOvr>
+  <p:timing>
+    <p:tnLst>
+      <p:par>
+        <p:cTn id="1" dur="indefinite" restart="never" nodeType="tmRoot"/>
+      </p:par>
+    </p:tnLst>
+  </p:timing>
+</p:sld>
+</file>
+
+<file path=ppt/slides/slide10.xml><?xml version="1.0" encoding="utf-8"?>
+<p:sld xmlns:a="http://schemas.openxmlformats.org/drawingml/2006/main" xmlns:r="http://schemas.openxmlformats.org/officeDocument/2006/relationships" xmlns:p="http://schemas.openxmlformats.org/presentationml/2006/main">
+  <p:cSld>
+    <p:spTree>
+      <p:nvGrpSpPr>
+        <p:cNvPr id="1" name=""/>
+        <p:cNvGrpSpPr/>
+        <p:nvPr/>
+      </p:nvGrpSpPr>
+      <p:grpSpPr>
+        <a:xfrm>
+          <a:off x="0" y="0"/>
+          <a:ext cx="0" cy="0"/>
+          <a:chOff x="0" y="0"/>
+          <a:chExt cx="0" cy="0"/>
+        </a:xfrm>
+      </p:grpSpPr>
+      <p:sp>
+        <p:nvSpPr>
+          <p:cNvPr id="4" name="2 Marcador de contenido"/>
+          <p:cNvSpPr>
+            <a:spLocks noGrp="1"/>
+          </p:cNvSpPr>
+          <p:nvPr>
+            <p:ph idx="1"/>
+          </p:nvPr>
+        </p:nvSpPr>
+        <p:spPr>
+          <a:xfrm>
+            <a:off x="457200" y="548680"/>
+            <a:ext cx="8229600" cy="5577483"/>
+          </a:xfrm>
+        </p:spPr>
+        <p:txBody>
+          <a:bodyPr>
+            <a:normAutofit/>
+          </a:bodyPr>
+          <a:lstStyle/>
+          <a:p>
+            <a:r>
+              <a:rPr lang="es-ES" sz="2600" b="1" dirty="0"/>
+              <a:t>PRODUCTO</a:t>
+            </a:r>
+            <a:r>
+              <a:rPr lang="es-ES" sz="2600" b="1" dirty="0"/>
+              <a:t> </a:t>
+            </a:r>
+            <a:r>
+              <a:rPr lang="es-ES" sz="2600" dirty="0" smtClean="0"/>
+              <a:t>: </a:t>
+            </a:r>
+            <a:r>
+              <a:rPr lang="es-ES" sz="2800" dirty="0"/>
+              <a:t>Multiplica todos los valores dados como argumentos</a:t>
+            </a:r>
+            <a:r>
+              <a:rPr lang="es-ES" sz="2600" dirty="0" smtClean="0"/>
+              <a:t>, </a:t>
+            </a:r>
+            <a:r>
+              <a:rPr lang="es-ES" sz="2600" dirty="0" err="1" smtClean="0"/>
+              <a:t>ej</a:t>
+            </a:r>
+            <a:r>
+              <a:rPr lang="es-ES" sz="2600" dirty="0" smtClean="0"/>
+              <a:t>:</a:t>
+            </a:r>
+          </a:p>
+          <a:p>
+            <a:pPr lvl="1"/>
+            <a:r>
+              <a:rPr lang="es-ES" sz="2600" dirty="0" smtClean="0"/>
+              <a:t>PRODUCTO(4;5)</a:t>
+            </a:r>
+            <a:r>
+              <a:rPr lang="es-ES" sz="2600" dirty="0" smtClean="0"/>
+              <a:t>  =&gt; </a:t>
+            </a:r>
+            <a:r>
+              <a:rPr lang="es-ES" sz="2600" dirty="0" smtClean="0"/>
+              <a:t>20</a:t>
+            </a:r>
+          </a:p>
+          <a:p>
+            <a:r>
+              <a:rPr lang="es-ES" sz="2600" b="1" dirty="0" smtClean="0"/>
+              <a:t>POTENCIA </a:t>
+            </a:r>
+            <a:r>
+              <a:rPr lang="es-ES" sz="2600" dirty="0"/>
+              <a:t>: </a:t>
+            </a:r>
+            <a:r>
+              <a:rPr lang="es-ES" sz="2800" dirty="0"/>
+              <a:t>Toma el argumento número y lo eleva a la potencia indicada por el </a:t>
+            </a:r>
+            <a:r>
+              <a:rPr lang="es-ES" sz="2800" dirty="0" smtClean="0"/>
+              <a:t>argumento potencia</a:t>
+            </a:r>
+            <a:r>
+              <a:rPr lang="es-ES" sz="2600" dirty="0" smtClean="0"/>
+              <a:t>, </a:t>
+            </a:r>
+            <a:r>
+              <a:rPr lang="es-ES" sz="2600" dirty="0" err="1"/>
+              <a:t>ej</a:t>
+            </a:r>
+            <a:r>
+              <a:rPr lang="es-ES" sz="2600" dirty="0"/>
+              <a:t>:</a:t>
+            </a:r>
+          </a:p>
+          <a:p>
+            <a:pPr lvl="1"/>
+            <a:r>
+              <a:rPr lang="es-ES" sz="2600" dirty="0" smtClean="0"/>
+              <a:t>POTENCIA(2;5)</a:t>
+            </a:r>
+            <a:r>
+              <a:rPr lang="es-ES" sz="2600" dirty="0"/>
+              <a:t>  =&gt; </a:t>
+            </a:r>
+            <a:r>
+              <a:rPr lang="es-ES" sz="2600" dirty="0" smtClean="0"/>
+              <a:t>32</a:t>
+            </a:r>
+          </a:p>
+          <a:p>
+            <a:r>
+              <a:rPr lang="es-ES" sz="2600" b="1" dirty="0"/>
+              <a:t>REDONDEAR(número, </a:t>
+            </a:r>
+            <a:r>
+              <a:rPr lang="es-ES" sz="2600" b="1" dirty="0" err="1"/>
+              <a:t>núm_decimales</a:t>
+            </a:r>
+            <a:r>
+              <a:rPr lang="es-ES" sz="2600" b="1" dirty="0" smtClean="0"/>
+              <a:t>): </a:t>
+            </a:r>
+            <a:r>
+              <a:rPr lang="es-ES" sz="2800" dirty="0"/>
+              <a:t>Devuelve el argumento número, con la </a:t>
+            </a:r>
+            <a:r>
+              <a:rPr lang="es-ES" sz="2800" dirty="0" smtClean="0"/>
+              <a:t>cantidad </a:t>
+            </a:r>
+            <a:r>
+              <a:rPr lang="es-ES" sz="2800" dirty="0"/>
+              <a:t>de decimales especificados en el argumento </a:t>
+            </a:r>
+            <a:r>
+              <a:rPr lang="es-ES" sz="2800" dirty="0" err="1" smtClean="0"/>
+              <a:t>núm_decimales</a:t>
+            </a:r>
+            <a:r>
+              <a:rPr lang="es-ES" sz="2800" dirty="0" smtClean="0"/>
+              <a:t>, </a:t>
+            </a:r>
+            <a:r>
+              <a:rPr lang="es-ES" sz="2800" dirty="0" err="1" smtClean="0"/>
+              <a:t>ej</a:t>
+            </a:r>
+            <a:r>
+              <a:rPr lang="es-ES" sz="2800" dirty="0" smtClean="0"/>
+              <a:t>:</a:t>
+            </a:r>
+            <a:endParaRPr lang="es-ES" sz="2600" b="1" dirty="0"/>
+          </a:p>
+          <a:p>
+            <a:pPr lvl="2"/>
+            <a:r>
+              <a:rPr lang="pt-BR" dirty="0"/>
+              <a:t>REDONDEAR(1.4545, 2) </a:t>
+            </a:r>
+            <a:r>
+              <a:rPr lang="pt-BR" dirty="0" smtClean="0"/>
+              <a:t>=&gt;1.45</a:t>
+            </a:r>
+            <a:endParaRPr lang="es-ES" dirty="0"/>
+          </a:p>
+          <a:p>
+            <a:pPr marL="457200" lvl="1" indent="0">
+              <a:buNone/>
+            </a:pPr>
+            <a:endParaRPr lang="es-ES" dirty="0" smtClean="0"/>
+          </a:p>
+          <a:p>
+            <a:endParaRPr lang="es-ES" dirty="0"/>
+          </a:p>
+        </p:txBody>
+      </p:sp>
+    </p:spTree>
+    <p:extLst>
+      <p:ext uri="{BB962C8B-B14F-4D97-AF65-F5344CB8AC3E}">
+        <p14:creationId xmlns:p14="http://schemas.microsoft.com/office/powerpoint/2010/main" val="3095225801"/>
+      </p:ext>
+    </p:extLst>
+  </p:cSld>
+  <p:clrMapOvr>
+    <a:masterClrMapping/>
+  </p:clrMapOvr>
+  <p:timing>
+    <p:tnLst>
+      <p:par>
+        <p:cTn id="1" dur="indefinite" restart="never" nodeType="tmRoot"/>
+      </p:par>
+    </p:tnLst>
+  </p:timing>
+</p:sld>
+</file>
+
+<file path=ppt/slides/slide11.xml><?xml version="1.0" encoding="utf-8"?>
+<p:sld xmlns:a="http://schemas.openxmlformats.org/drawingml/2006/main" xmlns:r="http://schemas.openxmlformats.org/officeDocument/2006/relationships" xmlns:p="http://schemas.openxmlformats.org/presentationml/2006/main">
+  <p:cSld>
+    <p:spTree>
+      <p:nvGrpSpPr>
+        <p:cNvPr id="1" name=""/>
+        <p:cNvGrpSpPr/>
+        <p:nvPr/>
+      </p:nvGrpSpPr>
+      <p:grpSpPr>
+        <a:xfrm>
+          <a:off x="0" y="0"/>
+          <a:ext cx="0" cy="0"/>
+          <a:chOff x="0" y="0"/>
+          <a:chExt cx="0" cy="0"/>
+        </a:xfrm>
+      </p:grpSpPr>
+      <p:sp>
+        <p:nvSpPr>
+          <p:cNvPr id="4" name="2 Marcador de contenido"/>
+          <p:cNvSpPr>
+            <a:spLocks noGrp="1"/>
+          </p:cNvSpPr>
+          <p:nvPr>
+            <p:ph idx="1"/>
+          </p:nvPr>
+        </p:nvSpPr>
+        <p:spPr>
+          <a:xfrm>
+            <a:off x="457200" y="548680"/>
+            <a:ext cx="8229600" cy="5904655"/>
+          </a:xfrm>
+        </p:spPr>
+        <p:txBody>
+          <a:bodyPr>
+            <a:normAutofit/>
+          </a:bodyPr>
+          <a:lstStyle/>
+          <a:p>
+            <a:r>
+              <a:rPr lang="es-ES" sz="2600" b="1" dirty="0"/>
+              <a:t>REDONDEAR.MAS(</a:t>
+            </a:r>
+            <a:r>
+              <a:rPr lang="es-ES" sz="2600" b="1" dirty="0" err="1"/>
+              <a:t>número,número_decimales</a:t>
+            </a:r>
+            <a:r>
+              <a:rPr lang="es-ES" sz="2600" b="1" dirty="0"/>
+              <a:t>): </a:t>
+            </a:r>
+            <a:r>
+              <a:rPr lang="es-ES" sz="2800" dirty="0"/>
+              <a:t>Tal como con la función REDONDEAR</a:t>
+            </a:r>
+            <a:r>
+              <a:rPr lang="es-ES" sz="2600" dirty="0" smtClean="0"/>
+              <a:t>,  pero </a:t>
+            </a:r>
+            <a:r>
+              <a:rPr lang="es-ES" sz="2800" dirty="0"/>
+              <a:t>las aproximaciones de los decimales siempre los hace a los valores </a:t>
+            </a:r>
+            <a:r>
+              <a:rPr lang="es-ES" sz="2800" dirty="0" smtClean="0"/>
+              <a:t>superiores, </a:t>
+            </a:r>
+            <a:r>
+              <a:rPr lang="es-ES" sz="2600" dirty="0" err="1" smtClean="0"/>
+              <a:t>ej</a:t>
+            </a:r>
+            <a:r>
+              <a:rPr lang="es-ES" sz="2600" dirty="0" smtClean="0"/>
+              <a:t>:</a:t>
+            </a:r>
+          </a:p>
+          <a:p>
+            <a:pPr lvl="1"/>
+            <a:r>
+              <a:rPr lang="pt-BR" sz="2400" dirty="0"/>
+              <a:t>REDONDEAR.MAS(4.52,1) </a:t>
+            </a:r>
+            <a:r>
+              <a:rPr lang="pt-BR" sz="2400" dirty="0" smtClean="0"/>
+              <a:t>=&gt; 4.6</a:t>
+            </a:r>
+          </a:p>
+          <a:p>
+            <a:r>
+              <a:rPr lang="es-ES" sz="2600" b="1" dirty="0"/>
+              <a:t>REDONDEAR.MENOS(</a:t>
+            </a:r>
+            <a:r>
+              <a:rPr lang="es-ES" sz="2600" b="1" dirty="0" err="1"/>
+              <a:t>número,núm_decimales</a:t>
+            </a:r>
+            <a:r>
+              <a:rPr lang="es-ES" sz="2600" b="1" dirty="0" smtClean="0"/>
+              <a:t>): </a:t>
+            </a:r>
+            <a:r>
+              <a:rPr lang="es-ES" sz="2400" dirty="0"/>
+              <a:t>Tal como con la función REDONDEAR,  pero las aproximaciones de los decimales siempre los hace a los valores </a:t>
+            </a:r>
+            <a:r>
+              <a:rPr lang="es-ES" sz="2400" dirty="0" smtClean="0"/>
+              <a:t>inferiores, </a:t>
+            </a:r>
+            <a:r>
+              <a:rPr lang="es-ES" sz="2400" dirty="0" err="1" smtClean="0"/>
+              <a:t>ej</a:t>
+            </a:r>
+            <a:r>
+              <a:rPr lang="es-ES" sz="2400" dirty="0" smtClean="0"/>
+              <a:t>:</a:t>
+            </a:r>
+          </a:p>
+          <a:p>
+            <a:pPr lvl="1"/>
+            <a:r>
+              <a:rPr lang="pt-BR" sz="2400" dirty="0"/>
+              <a:t>REDONDEAR.MENOS(4.52,1) </a:t>
+            </a:r>
+            <a:r>
+              <a:rPr lang="pt-BR" sz="2400" dirty="0" smtClean="0"/>
+              <a:t>=&gt; 4.5</a:t>
+            </a:r>
+          </a:p>
+          <a:p>
+            <a:r>
+              <a:rPr lang="es-ES" sz="2600" b="1" dirty="0"/>
+              <a:t>SUMA(número1,número2</a:t>
+            </a:r>
+            <a:r>
+              <a:rPr lang="es-ES" sz="2600" b="1" dirty="0" smtClean="0"/>
+              <a:t>,...): </a:t>
+            </a:r>
+            <a:r>
+              <a:rPr lang="es-ES" sz="2800" dirty="0"/>
+              <a:t> El resultado devuelto por esta función es la suma de los argumentos número1, número2, etc.. </a:t>
+            </a:r>
+            <a:endParaRPr lang="es-ES" sz="2800" dirty="0" smtClean="0"/>
+          </a:p>
+          <a:p>
+            <a:pPr lvl="1"/>
+            <a:r>
+              <a:rPr lang="pt-BR" sz="2400" dirty="0"/>
+              <a:t>SUMA(3,3,5,8) </a:t>
+            </a:r>
+            <a:r>
+              <a:rPr lang="pt-BR" sz="2400" dirty="0" smtClean="0"/>
+              <a:t>=&gt; </a:t>
+            </a:r>
+            <a:r>
+              <a:rPr lang="pt-BR" sz="2400" dirty="0"/>
+              <a:t>19</a:t>
+            </a:r>
+            <a:endParaRPr lang="es-ES" sz="2200" b="1" dirty="0"/>
+          </a:p>
+        </p:txBody>
+      </p:sp>
+    </p:spTree>
+    <p:extLst>
+      <p:ext uri="{BB962C8B-B14F-4D97-AF65-F5344CB8AC3E}">
+        <p14:creationId xmlns:p14="http://schemas.microsoft.com/office/powerpoint/2010/main" val="650534756"/>
+      </p:ext>
+    </p:extLst>
+  </p:cSld>
+  <p:clrMapOvr>
+    <a:masterClrMapping/>
+  </p:clrMapOvr>
+  <p:timing>
+    <p:tnLst>
+      <p:par>
+        <p:cTn id="1" dur="indefinite" restart="never" nodeType="tmRoot"/>
+      </p:par>
+    </p:tnLst>
+  </p:timing>
+</p:sld>
+</file>
+
+<file path=ppt/slides/slide12.xml><?xml version="1.0" encoding="utf-8"?>
+<p:sld xmlns:a="http://schemas.openxmlformats.org/drawingml/2006/main" xmlns:r="http://schemas.openxmlformats.org/officeDocument/2006/relationships" xmlns:p="http://schemas.openxmlformats.org/presentationml/2006/main">
+  <p:cSld>
+    <p:spTree>
+      <p:nvGrpSpPr>
+        <p:cNvPr id="1" name=""/>
+        <p:cNvGrpSpPr/>
+        <p:nvPr/>
+      </p:nvGrpSpPr>
+      <p:grpSpPr>
+        <a:xfrm>
+          <a:off x="0" y="0"/>
+          <a:ext cx="0" cy="0"/>
+          <a:chOff x="0" y="0"/>
+          <a:chExt cx="0" cy="0"/>
+        </a:xfrm>
+      </p:grpSpPr>
+      <p:sp>
+        <p:nvSpPr>
+          <p:cNvPr id="4" name="2 Marcador de contenido"/>
+          <p:cNvSpPr>
+            <a:spLocks noGrp="1"/>
+          </p:cNvSpPr>
+          <p:nvPr>
+            <p:ph idx="1"/>
+          </p:nvPr>
+        </p:nvSpPr>
+        <p:spPr>
+          <a:xfrm>
+            <a:off x="457200" y="548680"/>
+            <a:ext cx="8229600" cy="5904655"/>
+          </a:xfrm>
+        </p:spPr>
+        <p:txBody>
+          <a:bodyPr>
+            <a:normAutofit/>
+          </a:bodyPr>
+          <a:lstStyle/>
+          <a:p>
+            <a:r>
+              <a:rPr lang="es-ES" sz="2600" b="1" dirty="0"/>
+              <a:t>SUMA.CUADRADOS(número1,número2</a:t>
+            </a:r>
+            <a:r>
+              <a:rPr lang="es-ES" sz="2600" b="1" dirty="0" smtClean="0"/>
+              <a:t>,...): </a:t>
+            </a:r>
+            <a:r>
+              <a:rPr lang="es-ES" sz="2800" dirty="0" smtClean="0"/>
+              <a:t>Tal </a:t>
+            </a:r>
+            <a:r>
+              <a:rPr lang="es-ES" sz="2800" dirty="0"/>
+              <a:t>como con la función REDONDEAR</a:t>
+            </a:r>
+            <a:r>
+              <a:rPr lang="es-ES" sz="2600" dirty="0" smtClean="0"/>
+              <a:t>,  pero </a:t>
+            </a:r>
+            <a:r>
+              <a:rPr lang="es-ES" sz="2800" dirty="0"/>
+              <a:t>las aproximaciones de los decimales siempre los hace a los valores </a:t>
+            </a:r>
+            <a:r>
+              <a:rPr lang="es-ES" sz="2800" dirty="0" smtClean="0"/>
+              <a:t>superiores, </a:t>
+            </a:r>
+            <a:r>
+              <a:rPr lang="es-ES" sz="2600" dirty="0" err="1" smtClean="0"/>
+              <a:t>ej</a:t>
+            </a:r>
+            <a:r>
+              <a:rPr lang="es-ES" sz="2600" dirty="0" smtClean="0"/>
+              <a:t>:</a:t>
+            </a:r>
+          </a:p>
+          <a:p>
+            <a:pPr lvl="1"/>
+            <a:r>
+              <a:rPr lang="pt-BR" sz="2400" dirty="0"/>
+              <a:t>REDONDEAR.MAS(4.52,1) </a:t>
+            </a:r>
+            <a:r>
+              <a:rPr lang="pt-BR" sz="2400" dirty="0" smtClean="0"/>
+              <a:t>=&gt; 4.6</a:t>
+            </a:r>
+          </a:p>
+          <a:p>
+            <a:r>
+              <a:rPr lang="pt-BR" b="1" dirty="0" err="1" smtClean="0"/>
+              <a:t>Promedio</a:t>
+            </a:r>
+            <a:r>
+              <a:rPr lang="pt-BR" b="1" dirty="0" smtClean="0"/>
+              <a:t>:</a:t>
+            </a:r>
+            <a:r>
+              <a:rPr lang="pt-BR" dirty="0" smtClean="0"/>
+              <a:t> Calcula </a:t>
+            </a:r>
+            <a:r>
+              <a:rPr lang="pt-BR" dirty="0" err="1" smtClean="0"/>
+              <a:t>el</a:t>
+            </a:r>
+            <a:r>
+              <a:rPr lang="pt-BR" dirty="0" smtClean="0"/>
+              <a:t> </a:t>
+            </a:r>
+            <a:r>
+              <a:rPr lang="pt-BR" dirty="0" err="1" smtClean="0"/>
+              <a:t>promedio</a:t>
+            </a:r>
+            <a:r>
+              <a:rPr lang="pt-BR" dirty="0" smtClean="0"/>
+              <a:t> de um rango de </a:t>
+            </a:r>
+            <a:r>
+              <a:rPr lang="pt-BR" dirty="0" err="1" smtClean="0"/>
+              <a:t>celdas</a:t>
+            </a:r>
+            <a:r>
+              <a:rPr lang="pt-BR" dirty="0" smtClean="0"/>
+              <a:t>.</a:t>
+            </a:r>
+          </a:p>
+          <a:p>
+            <a:r>
+              <a:rPr lang="pt-BR" b="1" dirty="0" smtClean="0"/>
+              <a:t>Max:</a:t>
+            </a:r>
+            <a:r>
+              <a:rPr lang="pt-BR" dirty="0" smtClean="0"/>
+              <a:t> </a:t>
+            </a:r>
+            <a:r>
+              <a:rPr lang="pt-BR" dirty="0" err="1" smtClean="0"/>
+              <a:t>Encuentra</a:t>
+            </a:r>
+            <a:r>
+              <a:rPr lang="pt-BR" dirty="0" smtClean="0"/>
+              <a:t> </a:t>
+            </a:r>
+            <a:r>
+              <a:rPr lang="pt-BR" dirty="0" err="1" smtClean="0"/>
+              <a:t>el</a:t>
+            </a:r>
+            <a:r>
+              <a:rPr lang="pt-BR" dirty="0" smtClean="0"/>
+              <a:t> </a:t>
+            </a:r>
+            <a:r>
+              <a:rPr lang="pt-BR" dirty="0" err="1" smtClean="0"/>
+              <a:t>maximo</a:t>
+            </a:r>
+            <a:r>
+              <a:rPr lang="pt-BR" dirty="0" smtClean="0"/>
+              <a:t> de </a:t>
+            </a:r>
+            <a:r>
+              <a:rPr lang="pt-BR" dirty="0" err="1" smtClean="0"/>
+              <a:t>un</a:t>
+            </a:r>
+            <a:r>
+              <a:rPr lang="pt-BR" dirty="0" smtClean="0"/>
+              <a:t> rango de </a:t>
+            </a:r>
+            <a:r>
+              <a:rPr lang="pt-BR" dirty="0" err="1" smtClean="0"/>
+              <a:t>celdas</a:t>
+            </a:r>
+            <a:endParaRPr lang="pt-BR" dirty="0" smtClean="0"/>
+          </a:p>
+          <a:p>
+            <a:r>
+              <a:rPr lang="pt-BR" b="1" dirty="0" smtClean="0"/>
+              <a:t>Min:</a:t>
+            </a:r>
+            <a:r>
+              <a:rPr lang="pt-BR" dirty="0" smtClean="0"/>
+              <a:t> </a:t>
+            </a:r>
+            <a:r>
+              <a:rPr lang="pt-BR" dirty="0" err="1" smtClean="0"/>
+              <a:t>Encuentra</a:t>
+            </a:r>
+            <a:r>
+              <a:rPr lang="pt-BR" dirty="0" smtClean="0"/>
+              <a:t> </a:t>
+            </a:r>
+            <a:r>
+              <a:rPr lang="pt-BR" dirty="0" err="1" smtClean="0"/>
+              <a:t>el</a:t>
+            </a:r>
+            <a:r>
+              <a:rPr lang="pt-BR" dirty="0" smtClean="0"/>
+              <a:t> </a:t>
+            </a:r>
+            <a:r>
+              <a:rPr lang="pt-BR" dirty="0" err="1" smtClean="0"/>
+              <a:t>minimo</a:t>
+            </a:r>
+            <a:r>
+              <a:rPr lang="pt-BR" dirty="0" smtClean="0"/>
+              <a:t> de </a:t>
+            </a:r>
+            <a:r>
+              <a:rPr lang="pt-BR" dirty="0" err="1" smtClean="0"/>
+              <a:t>un</a:t>
+            </a:r>
+            <a:r>
+              <a:rPr lang="pt-BR" dirty="0" smtClean="0"/>
+              <a:t> rango de </a:t>
+            </a:r>
+            <a:r>
+              <a:rPr lang="pt-BR" dirty="0" err="1" smtClean="0"/>
+              <a:t>celdas</a:t>
+            </a:r>
+            <a:r>
+              <a:rPr lang="pt-BR" dirty="0" smtClean="0"/>
+              <a:t>.</a:t>
+            </a:r>
+          </a:p>
+          <a:p>
+            <a:endParaRPr lang="pt-BR" dirty="0" smtClean="0"/>
+          </a:p>
+        </p:txBody>
+      </p:sp>
+    </p:spTree>
+    <p:extLst>
+      <p:ext uri="{BB962C8B-B14F-4D97-AF65-F5344CB8AC3E}">
+        <p14:creationId xmlns:p14="http://schemas.microsoft.com/office/powerpoint/2010/main" val="1370580256"/>
+      </p:ext>
+    </p:extLst>
+  </p:cSld>
+  <p:clrMapOvr>
+    <a:masterClrMapping/>
+  </p:clrMapOvr>
+  <p:timing>
+    <p:tnLst>
+      <p:par>
+        <p:cTn id="1" dur="indefinite" restart="never" nodeType="tmRoot"/>
+      </p:par>
+    </p:tnLst>
+  </p:timing>
+</p:sld>
+</file>
+
+<file path=ppt/slides/slide13.xml><?xml version="1.0" encoding="utf-8"?>
+<p:sld xmlns:a="http://schemas.openxmlformats.org/drawingml/2006/main" xmlns:r="http://schemas.openxmlformats.org/officeDocument/2006/relationships" xmlns:p="http://schemas.openxmlformats.org/presentationml/2006/main">
+  <p:cSld>
+    <p:spTree>
+      <p:nvGrpSpPr>
+        <p:cNvPr id="1" name=""/>
+        <p:cNvGrpSpPr/>
+        <p:nvPr/>
+      </p:nvGrpSpPr>
+      <p:grpSpPr>
+        <a:xfrm>
+          <a:off x="0" y="0"/>
+          <a:ext cx="0" cy="0"/>
+          <a:chOff x="0" y="0"/>
+          <a:chExt cx="0" cy="0"/>
+        </a:xfrm>
+      </p:grpSpPr>
+      <p:sp>
+        <p:nvSpPr>
+          <p:cNvPr id="2" name="1 Título"/>
+          <p:cNvSpPr>
+            <a:spLocks noGrp="1"/>
+          </p:cNvSpPr>
+          <p:nvPr>
+            <p:ph type="title"/>
+          </p:nvPr>
+        </p:nvSpPr>
+        <p:spPr/>
+        <p:txBody>
+          <a:bodyPr/>
+          <a:lstStyle/>
+          <a:p>
+            <a:r>
+              <a:rPr lang="es-ES" dirty="0" smtClean="0"/>
+              <a:t>Practica</a:t>
+            </a:r>
+            <a:endParaRPr lang="es-ES" dirty="0"/>
+          </a:p>
+        </p:txBody>
+      </p:sp>
+      <p:sp>
+        <p:nvSpPr>
+          <p:cNvPr id="3" name="2 Marcador de contenido"/>
+          <p:cNvSpPr>
+            <a:spLocks noGrp="1"/>
+          </p:cNvSpPr>
+          <p:nvPr>
+            <p:ph idx="1"/>
+          </p:nvPr>
+        </p:nvSpPr>
+        <p:spPr>
+          <a:xfrm>
+            <a:off x="467544" y="1196752"/>
+            <a:ext cx="8229600" cy="5400600"/>
+          </a:xfrm>
+        </p:spPr>
+        <p:txBody>
+          <a:bodyPr>
+            <a:normAutofit/>
+          </a:bodyPr>
+          <a:lstStyle/>
+          <a:p>
+            <a:pPr marL="0" indent="0">
+              <a:buNone/>
+            </a:pPr>
+            <a:r>
+              <a:rPr lang="es-ES" dirty="0"/>
+              <a:t>Tabla de amortización para 12 periodos, con tasa de interés 1.95% mensual con </a:t>
+            </a:r>
+            <a:r>
+              <a:rPr lang="es-ES" dirty="0" err="1" smtClean="0"/>
+              <a:t>prestamo</a:t>
+            </a:r>
+            <a:r>
+              <a:rPr lang="es-ES" dirty="0" smtClean="0"/>
+              <a:t> </a:t>
+            </a:r>
+            <a:r>
+              <a:rPr lang="es-ES" dirty="0"/>
+              <a:t>de $ </a:t>
+            </a:r>
+            <a:r>
+              <a:rPr lang="es-ES" dirty="0" smtClean="0"/>
+              <a:t>10.000.000, </a:t>
+            </a:r>
+            <a:r>
+              <a:rPr lang="es-ES" dirty="0"/>
+              <a:t>con cuota fija a través del tiempo.</a:t>
+            </a:r>
+          </a:p>
+        </p:txBody>
+      </p:sp>
+    </p:spTree>
+    <p:extLst>
+      <p:ext uri="{BB962C8B-B14F-4D97-AF65-F5344CB8AC3E}">
+        <p14:creationId xmlns:p14="http://schemas.microsoft.com/office/powerpoint/2010/main" val="1377587547"/>
+      </p:ext>
+    </p:extLst>
+  </p:cSld>
+  <p:clrMapOvr>
+    <a:masterClrMapping/>
+  </p:clrMapOvr>
+  <p:timing>
+    <p:tnLst>
+      <p:par>
+        <p:cTn id="1" dur="indefinite" restart="never" nodeType="tmRoot"/>
+      </p:par>
+    </p:tnLst>
+  </p:timing>
 </p:sld>
 </file>
 
@@ -3127,41 +3896,53 @@
           <a:chExt cx="0" cy="0"/>
         </a:xfrm>
       </p:grpSpPr>
-      <p:sp>
-        <p:nvSpPr>
-          <p:cNvPr id="2" name="1 Título"/>
-          <p:cNvSpPr>
-            <a:spLocks noGrp="1"/>
-          </p:cNvSpPr>
-          <p:nvPr>
-            <p:ph type="title"/>
-          </p:nvPr>
-        </p:nvSpPr>
-        <p:spPr/>
-        <p:txBody>
-          <a:bodyPr>
-            <a:noAutofit/>
-          </a:bodyPr>
-          <a:lstStyle/>
-          <a:p>
-            <a:r>
-              <a:rPr lang="es-ES" sz="3600" dirty="0"/>
-              <a:t>Escalas de Color y Resaltar Reglas de Celda </a:t>
-            </a:r>
-            <a:endParaRPr lang="es-ES" sz="3600" dirty="0"/>
-          </a:p>
-        </p:txBody>
-      </p:sp>
+      <p:pic>
+        <p:nvPicPr>
+          <p:cNvPr id="5" name="4 Imagen"/>
+          <p:cNvPicPr>
+            <a:picLocks noChangeAspect="1"/>
+          </p:cNvPicPr>
+          <p:nvPr/>
+        </p:nvPicPr>
+        <p:blipFill>
+          <a:blip r:embed="rId2">
+            <a:extLst>
+              <a:ext uri="{28A0092B-C50C-407E-A947-70E740481C1C}">
+                <a14:useLocalDpi xmlns:a14="http://schemas.microsoft.com/office/drawing/2010/main" val="0"/>
+              </a:ext>
+            </a:extLst>
+          </a:blip>
+          <a:stretch>
+            <a:fillRect/>
+          </a:stretch>
+        </p:blipFill>
+        <p:spPr>
+          <a:xfrm>
+            <a:off x="80962" y="548680"/>
+            <a:ext cx="8982075" cy="5760640"/>
+          </a:xfrm>
+          <a:prstGeom prst="rect">
+            <a:avLst/>
+          </a:prstGeom>
+        </p:spPr>
+      </p:pic>
     </p:spTree>
     <p:extLst>
       <p:ext uri="{BB962C8B-B14F-4D97-AF65-F5344CB8AC3E}">
-        <p14:creationId xmlns:p14="http://schemas.microsoft.com/office/powerpoint/2010/main" val="13373830"/>
+        <p14:creationId xmlns:p14="http://schemas.microsoft.com/office/powerpoint/2010/main" val="2045674398"/>
       </p:ext>
     </p:extLst>
   </p:cSld>
   <p:clrMapOvr>
     <a:masterClrMapping/>
   </p:clrMapOvr>
+  <p:timing>
+    <p:tnLst>
+      <p:par>
+        <p:cTn id="1" dur="indefinite" restart="never" nodeType="tmRoot"/>
+      </p:par>
+    </p:tnLst>
+  </p:timing>
 </p:sld>
 </file>
 
@@ -3192,6 +3973,358 @@
             <p:ph type="title"/>
           </p:nvPr>
         </p:nvSpPr>
+        <p:spPr/>
+        <p:txBody>
+          <a:bodyPr>
+            <a:noAutofit/>
+          </a:bodyPr>
+          <a:lstStyle/>
+          <a:p>
+            <a:r>
+              <a:rPr lang="es-ES" sz="3600" dirty="0" smtClean="0"/>
+              <a:t>Resaltar </a:t>
+            </a:r>
+            <a:r>
+              <a:rPr lang="es-ES" sz="3600" dirty="0"/>
+              <a:t>Reglas de Celda </a:t>
+            </a:r>
+          </a:p>
+        </p:txBody>
+      </p:sp>
+      <p:pic>
+        <p:nvPicPr>
+          <p:cNvPr id="3" name="2 Imagen"/>
+          <p:cNvPicPr>
+            <a:picLocks noChangeAspect="1"/>
+          </p:cNvPicPr>
+          <p:nvPr/>
+        </p:nvPicPr>
+        <p:blipFill>
+          <a:blip r:embed="rId2">
+            <a:extLst>
+              <a:ext uri="{28A0092B-C50C-407E-A947-70E740481C1C}">
+                <a14:useLocalDpi xmlns:a14="http://schemas.microsoft.com/office/drawing/2010/main" val="0"/>
+              </a:ext>
+            </a:extLst>
+          </a:blip>
+          <a:stretch>
+            <a:fillRect/>
+          </a:stretch>
+        </p:blipFill>
+        <p:spPr>
+          <a:xfrm>
+            <a:off x="755576" y="1476435"/>
+            <a:ext cx="7272808" cy="4904893"/>
+          </a:xfrm>
+          <a:prstGeom prst="rect">
+            <a:avLst/>
+          </a:prstGeom>
+        </p:spPr>
+      </p:pic>
+    </p:spTree>
+    <p:extLst>
+      <p:ext uri="{BB962C8B-B14F-4D97-AF65-F5344CB8AC3E}">
+        <p14:creationId xmlns:p14="http://schemas.microsoft.com/office/powerpoint/2010/main" val="13373830"/>
+      </p:ext>
+    </p:extLst>
+  </p:cSld>
+  <p:clrMapOvr>
+    <a:masterClrMapping/>
+  </p:clrMapOvr>
+  <p:timing>
+    <p:tnLst>
+      <p:par>
+        <p:cTn id="1" dur="indefinite" restart="never" nodeType="tmRoot"/>
+      </p:par>
+    </p:tnLst>
+  </p:timing>
+</p:sld>
+</file>
+
+<file path=ppt/slides/slide4.xml><?xml version="1.0" encoding="utf-8"?>
+<p:sld xmlns:a="http://schemas.openxmlformats.org/drawingml/2006/main" xmlns:r="http://schemas.openxmlformats.org/officeDocument/2006/relationships" xmlns:p="http://schemas.openxmlformats.org/presentationml/2006/main">
+  <p:cSld>
+    <p:spTree>
+      <p:nvGrpSpPr>
+        <p:cNvPr id="1" name=""/>
+        <p:cNvGrpSpPr/>
+        <p:nvPr/>
+      </p:nvGrpSpPr>
+      <p:grpSpPr>
+        <a:xfrm>
+          <a:off x="0" y="0"/>
+          <a:ext cx="0" cy="0"/>
+          <a:chOff x="0" y="0"/>
+          <a:chExt cx="0" cy="0"/>
+        </a:xfrm>
+      </p:grpSpPr>
+      <p:pic>
+        <p:nvPicPr>
+          <p:cNvPr id="4" name="3 Imagen"/>
+          <p:cNvPicPr>
+            <a:picLocks noChangeAspect="1"/>
+          </p:cNvPicPr>
+          <p:nvPr/>
+        </p:nvPicPr>
+        <p:blipFill>
+          <a:blip r:embed="rId2">
+            <a:extLst>
+              <a:ext uri="{28A0092B-C50C-407E-A947-70E740481C1C}">
+                <a14:useLocalDpi xmlns:a14="http://schemas.microsoft.com/office/drawing/2010/main" val="0"/>
+              </a:ext>
+            </a:extLst>
+          </a:blip>
+          <a:stretch>
+            <a:fillRect/>
+          </a:stretch>
+        </p:blipFill>
+        <p:spPr>
+          <a:xfrm>
+            <a:off x="685800" y="548680"/>
+            <a:ext cx="8062664" cy="5760640"/>
+          </a:xfrm>
+          <a:prstGeom prst="rect">
+            <a:avLst/>
+          </a:prstGeom>
+        </p:spPr>
+      </p:pic>
+    </p:spTree>
+    <p:extLst>
+      <p:ext uri="{BB962C8B-B14F-4D97-AF65-F5344CB8AC3E}">
+        <p14:creationId xmlns:p14="http://schemas.microsoft.com/office/powerpoint/2010/main" val="1645207903"/>
+      </p:ext>
+    </p:extLst>
+  </p:cSld>
+  <p:clrMapOvr>
+    <a:masterClrMapping/>
+  </p:clrMapOvr>
+  <p:timing>
+    <p:tnLst>
+      <p:par>
+        <p:cTn id="1" dur="indefinite" restart="never" nodeType="tmRoot"/>
+      </p:par>
+    </p:tnLst>
+  </p:timing>
+</p:sld>
+</file>
+
+<file path=ppt/slides/slide5.xml><?xml version="1.0" encoding="utf-8"?>
+<p:sld xmlns:a="http://schemas.openxmlformats.org/drawingml/2006/main" xmlns:r="http://schemas.openxmlformats.org/officeDocument/2006/relationships" xmlns:p="http://schemas.openxmlformats.org/presentationml/2006/main">
+  <p:cSld>
+    <p:spTree>
+      <p:nvGrpSpPr>
+        <p:cNvPr id="1" name=""/>
+        <p:cNvGrpSpPr/>
+        <p:nvPr/>
+      </p:nvGrpSpPr>
+      <p:grpSpPr>
+        <a:xfrm>
+          <a:off x="0" y="0"/>
+          <a:ext cx="0" cy="0"/>
+          <a:chOff x="0" y="0"/>
+          <a:chExt cx="0" cy="0"/>
+        </a:xfrm>
+      </p:grpSpPr>
+      <p:sp>
+        <p:nvSpPr>
+          <p:cNvPr id="2" name="1 Título"/>
+          <p:cNvSpPr>
+            <a:spLocks noGrp="1"/>
+          </p:cNvSpPr>
+          <p:nvPr>
+            <p:ph type="title"/>
+          </p:nvPr>
+        </p:nvSpPr>
+        <p:spPr/>
+        <p:txBody>
+          <a:bodyPr/>
+          <a:lstStyle/>
+          <a:p>
+            <a:r>
+              <a:rPr lang="es-ES" dirty="0" smtClean="0"/>
+              <a:t>Escala de Color</a:t>
+            </a:r>
+            <a:endParaRPr lang="es-ES" dirty="0"/>
+          </a:p>
+        </p:txBody>
+      </p:sp>
+      <p:pic>
+        <p:nvPicPr>
+          <p:cNvPr id="4" name="3 Imagen"/>
+          <p:cNvPicPr>
+            <a:picLocks noChangeAspect="1"/>
+          </p:cNvPicPr>
+          <p:nvPr/>
+        </p:nvPicPr>
+        <p:blipFill>
+          <a:blip r:embed="rId2">
+            <a:extLst>
+              <a:ext uri="{28A0092B-C50C-407E-A947-70E740481C1C}">
+                <a14:useLocalDpi xmlns:a14="http://schemas.microsoft.com/office/drawing/2010/main" val="0"/>
+              </a:ext>
+            </a:extLst>
+          </a:blip>
+          <a:stretch>
+            <a:fillRect/>
+          </a:stretch>
+        </p:blipFill>
+        <p:spPr>
+          <a:xfrm>
+            <a:off x="827584" y="1484784"/>
+            <a:ext cx="7632848" cy="4896544"/>
+          </a:xfrm>
+          <a:prstGeom prst="rect">
+            <a:avLst/>
+          </a:prstGeom>
+        </p:spPr>
+      </p:pic>
+    </p:spTree>
+    <p:extLst>
+      <p:ext uri="{BB962C8B-B14F-4D97-AF65-F5344CB8AC3E}">
+        <p14:creationId xmlns:p14="http://schemas.microsoft.com/office/powerpoint/2010/main" val="2611518500"/>
+      </p:ext>
+    </p:extLst>
+  </p:cSld>
+  <p:clrMapOvr>
+    <a:masterClrMapping/>
+  </p:clrMapOvr>
+  <p:timing>
+    <p:tnLst>
+      <p:par>
+        <p:cTn id="1" dur="indefinite" restart="never" nodeType="tmRoot"/>
+      </p:par>
+    </p:tnLst>
+  </p:timing>
+</p:sld>
+</file>
+
+<file path=ppt/slides/slide6.xml><?xml version="1.0" encoding="utf-8"?>
+<p:sld xmlns:a="http://schemas.openxmlformats.org/drawingml/2006/main" xmlns:r="http://schemas.openxmlformats.org/officeDocument/2006/relationships" xmlns:p="http://schemas.openxmlformats.org/presentationml/2006/main">
+  <p:cSld>
+    <p:spTree>
+      <p:nvGrpSpPr>
+        <p:cNvPr id="1" name=""/>
+        <p:cNvGrpSpPr/>
+        <p:nvPr/>
+      </p:nvGrpSpPr>
+      <p:grpSpPr>
+        <a:xfrm>
+          <a:off x="0" y="0"/>
+          <a:ext cx="0" cy="0"/>
+          <a:chOff x="0" y="0"/>
+          <a:chExt cx="0" cy="0"/>
+        </a:xfrm>
+      </p:grpSpPr>
+      <p:pic>
+        <p:nvPicPr>
+          <p:cNvPr id="4" name="3 Imagen"/>
+          <p:cNvPicPr>
+            <a:picLocks noChangeAspect="1"/>
+          </p:cNvPicPr>
+          <p:nvPr/>
+        </p:nvPicPr>
+        <p:blipFill>
+          <a:blip r:embed="rId2">
+            <a:extLst>
+              <a:ext uri="{28A0092B-C50C-407E-A947-70E740481C1C}">
+                <a14:useLocalDpi xmlns:a14="http://schemas.microsoft.com/office/drawing/2010/main" val="0"/>
+              </a:ext>
+            </a:extLst>
+          </a:blip>
+          <a:stretch>
+            <a:fillRect/>
+          </a:stretch>
+        </p:blipFill>
+        <p:spPr>
+          <a:xfrm>
+            <a:off x="4499992" y="764704"/>
+            <a:ext cx="4471789" cy="5472608"/>
+          </a:xfrm>
+          <a:prstGeom prst="rect">
+            <a:avLst/>
+          </a:prstGeom>
+        </p:spPr>
+      </p:pic>
+      <p:sp>
+        <p:nvSpPr>
+          <p:cNvPr id="5" name="2 Marcador de contenido"/>
+          <p:cNvSpPr>
+            <a:spLocks noGrp="1"/>
+          </p:cNvSpPr>
+          <p:nvPr>
+            <p:ph idx="1"/>
+          </p:nvPr>
+        </p:nvSpPr>
+        <p:spPr>
+          <a:xfrm>
+            <a:off x="323528" y="1268760"/>
+            <a:ext cx="4042792" cy="4032448"/>
+          </a:xfrm>
+        </p:spPr>
+        <p:txBody>
+          <a:bodyPr>
+            <a:normAutofit/>
+          </a:bodyPr>
+          <a:lstStyle/>
+          <a:p>
+            <a:pPr marL="0" indent="0">
+              <a:buNone/>
+            </a:pPr>
+            <a:r>
+              <a:rPr lang="es-ES" dirty="0" smtClean="0"/>
+              <a:t>En el caso de la escala de colores, verde y blanco, mientras mayor es el numero, tiene mayor tonificación verde, y en cambio mientras sea menor, mas blanco es.</a:t>
+            </a:r>
+            <a:endParaRPr lang="es-ES" dirty="0"/>
+          </a:p>
+        </p:txBody>
+      </p:sp>
+    </p:spTree>
+    <p:extLst>
+      <p:ext uri="{BB962C8B-B14F-4D97-AF65-F5344CB8AC3E}">
+        <p14:creationId xmlns:p14="http://schemas.microsoft.com/office/powerpoint/2010/main" val="3964492425"/>
+      </p:ext>
+    </p:extLst>
+  </p:cSld>
+  <p:clrMapOvr>
+    <a:masterClrMapping/>
+  </p:clrMapOvr>
+  <p:timing>
+    <p:tnLst>
+      <p:par>
+        <p:cTn id="1" dur="indefinite" restart="never" nodeType="tmRoot"/>
+      </p:par>
+    </p:tnLst>
+  </p:timing>
+</p:sld>
+</file>
+
+<file path=ppt/slides/slide7.xml><?xml version="1.0" encoding="utf-8"?>
+<p:sld xmlns:a="http://schemas.openxmlformats.org/drawingml/2006/main" xmlns:r="http://schemas.openxmlformats.org/officeDocument/2006/relationships" xmlns:p="http://schemas.openxmlformats.org/presentationml/2006/main">
+  <p:cSld>
+    <p:spTree>
+      <p:nvGrpSpPr>
+        <p:cNvPr id="1" name=""/>
+        <p:cNvGrpSpPr/>
+        <p:nvPr/>
+      </p:nvGrpSpPr>
+      <p:grpSpPr>
+        <a:xfrm>
+          <a:off x="0" y="0"/>
+          <a:ext cx="0" cy="0"/>
+          <a:chOff x="0" y="0"/>
+          <a:chExt cx="0" cy="0"/>
+        </a:xfrm>
+      </p:grpSpPr>
+      <p:sp>
+        <p:nvSpPr>
+          <p:cNvPr id="2" name="1 Título"/>
+          <p:cNvSpPr>
+            <a:spLocks noGrp="1"/>
+          </p:cNvSpPr>
+          <p:nvPr>
+            <p:ph type="title"/>
+          </p:nvPr>
+        </p:nvSpPr>
         <p:spPr>
           <a:xfrm>
             <a:off x="755576" y="2924944"/>
@@ -3233,10 +4366,17 @@
   <p:clrMapOvr>
     <a:masterClrMapping/>
   </p:clrMapOvr>
+  <p:timing>
+    <p:tnLst>
+      <p:par>
+        <p:cTn id="1" dur="indefinite" restart="never" nodeType="tmRoot"/>
+      </p:par>
+    </p:tnLst>
+  </p:timing>
 </p:sld>
 </file>
 
-<file path=ppt/slides/slide4.xml><?xml version="1.0" encoding="utf-8"?>
+<file path=ppt/slides/slide8.xml><?xml version="1.0" encoding="utf-8"?>
 <p:sld xmlns:a="http://schemas.openxmlformats.org/drawingml/2006/main" xmlns:r="http://schemas.openxmlformats.org/officeDocument/2006/relationships" xmlns:p="http://schemas.openxmlformats.org/presentationml/2006/main">
   <p:cSld>
     <p:spTree>
@@ -3436,10 +4576,17 @@
   <p:clrMapOvr>
     <a:masterClrMapping/>
   </p:clrMapOvr>
+  <p:timing>
+    <p:tnLst>
+      <p:par>
+        <p:cTn id="1" dur="indefinite" restart="never" nodeType="tmRoot"/>
+      </p:par>
+    </p:tnLst>
+  </p:timing>
 </p:sld>
 </file>
 
-<file path=ppt/slides/slide5.xml><?xml version="1.0" encoding="utf-8"?>
+<file path=ppt/slides/slide9.xml><?xml version="1.0" encoding="utf-8"?>
 <p:sld xmlns:a="http://schemas.openxmlformats.org/drawingml/2006/main" xmlns:r="http://schemas.openxmlformats.org/officeDocument/2006/relationships" xmlns:p="http://schemas.openxmlformats.org/presentationml/2006/main">
   <p:cSld>
     <p:spTree>
@@ -3458,26 +4605,7 @@
       </p:grpSpPr>
       <p:sp>
         <p:nvSpPr>
-          <p:cNvPr id="2" name="1 Título"/>
-          <p:cNvSpPr>
-            <a:spLocks noGrp="1"/>
-          </p:cNvSpPr>
-          <p:nvPr>
-            <p:ph type="title"/>
-          </p:nvPr>
-        </p:nvSpPr>
-        <p:spPr/>
-        <p:txBody>
-          <a:bodyPr/>
-          <a:lstStyle/>
-          <a:p>
-            <a:endParaRPr lang="es-ES"/>
-          </a:p>
-        </p:txBody>
-      </p:sp>
-      <p:sp>
-        <p:nvSpPr>
-          <p:cNvPr id="3" name="2 Marcador de contenido"/>
+          <p:cNvPr id="4" name="2 Marcador de contenido"/>
           <p:cNvSpPr>
             <a:spLocks noGrp="1"/>
           </p:cNvSpPr>
@@ -3485,10 +4613,168 @@
             <p:ph idx="1"/>
           </p:nvPr>
         </p:nvSpPr>
-        <p:spPr/>
-        <p:txBody>
-          <a:bodyPr/>
-          <a:lstStyle/>
+        <p:spPr>
+          <a:xfrm>
+            <a:off x="457200" y="548680"/>
+            <a:ext cx="8229600" cy="5577483"/>
+          </a:xfrm>
+        </p:spPr>
+        <p:txBody>
+          <a:bodyPr>
+            <a:normAutofit/>
+          </a:bodyPr>
+          <a:lstStyle/>
+          <a:p>
+            <a:r>
+              <a:rPr lang="es-ES" sz="2600" b="1" dirty="0"/>
+              <a:t>PRODUCTO</a:t>
+            </a:r>
+            <a:r>
+              <a:rPr lang="es-ES" sz="2600" b="1" dirty="0"/>
+              <a:t> </a:t>
+            </a:r>
+            <a:r>
+              <a:rPr lang="es-ES" sz="2600" dirty="0" smtClean="0"/>
+              <a:t>: </a:t>
+            </a:r>
+            <a:r>
+              <a:rPr lang="es-ES" sz="2800" dirty="0"/>
+              <a:t>Multiplica todos los valores dados como argumentos</a:t>
+            </a:r>
+            <a:r>
+              <a:rPr lang="es-ES" sz="2600" dirty="0" smtClean="0"/>
+              <a:t>, </a:t>
+            </a:r>
+            <a:r>
+              <a:rPr lang="es-ES" sz="2600" dirty="0" err="1" smtClean="0"/>
+              <a:t>ej</a:t>
+            </a:r>
+            <a:r>
+              <a:rPr lang="es-ES" sz="2600" dirty="0" smtClean="0"/>
+              <a:t>:</a:t>
+            </a:r>
+          </a:p>
+          <a:p>
+            <a:pPr lvl="1"/>
+            <a:r>
+              <a:rPr lang="es-ES" sz="2600" dirty="0" smtClean="0"/>
+              <a:t>PRODUCTO(4;5)</a:t>
+            </a:r>
+            <a:r>
+              <a:rPr lang="es-ES" sz="2600" dirty="0" smtClean="0"/>
+              <a:t>  =&gt; </a:t>
+            </a:r>
+            <a:r>
+              <a:rPr lang="es-ES" sz="2600" dirty="0" smtClean="0"/>
+              <a:t>20</a:t>
+            </a:r>
+          </a:p>
+          <a:p>
+            <a:r>
+              <a:rPr lang="es-ES" sz="2600" b="1" dirty="0" smtClean="0"/>
+              <a:t>POTENCIA </a:t>
+            </a:r>
+            <a:r>
+              <a:rPr lang="es-ES" sz="2600" dirty="0"/>
+              <a:t>: </a:t>
+            </a:r>
+            <a:r>
+              <a:rPr lang="es-ES" sz="2800" dirty="0"/>
+              <a:t>Toma el argumento número y lo eleva a la potencia indicada por el </a:t>
+            </a:r>
+            <a:r>
+              <a:rPr lang="es-ES" sz="2800" dirty="0" smtClean="0"/>
+              <a:t>argumento potencia</a:t>
+            </a:r>
+            <a:r>
+              <a:rPr lang="es-ES" sz="2600" dirty="0" smtClean="0"/>
+              <a:t>, </a:t>
+            </a:r>
+            <a:r>
+              <a:rPr lang="es-ES" sz="2600" dirty="0" err="1"/>
+              <a:t>ej</a:t>
+            </a:r>
+            <a:r>
+              <a:rPr lang="es-ES" sz="2600" dirty="0"/>
+              <a:t>:</a:t>
+            </a:r>
+          </a:p>
+          <a:p>
+            <a:pPr lvl="1"/>
+            <a:r>
+              <a:rPr lang="es-ES" sz="2600" dirty="0" smtClean="0"/>
+              <a:t>POTENCIA(2;5)</a:t>
+            </a:r>
+            <a:r>
+              <a:rPr lang="es-ES" sz="2600" dirty="0"/>
+              <a:t>  =&gt; </a:t>
+            </a:r>
+            <a:r>
+              <a:rPr lang="es-ES" sz="2600" dirty="0" smtClean="0"/>
+              <a:t>32</a:t>
+            </a:r>
+          </a:p>
+          <a:p>
+            <a:r>
+              <a:rPr lang="es-ES" sz="2600" b="1" dirty="0"/>
+              <a:t>REDONDEAR(número, </a:t>
+            </a:r>
+            <a:r>
+              <a:rPr lang="es-ES" sz="2600" b="1" dirty="0" err="1"/>
+              <a:t>núm_decimales</a:t>
+            </a:r>
+            <a:r>
+              <a:rPr lang="es-ES" sz="2600" b="1" dirty="0" smtClean="0"/>
+              <a:t>): </a:t>
+            </a:r>
+            <a:r>
+              <a:rPr lang="es-ES" sz="2800" dirty="0"/>
+              <a:t>Devuelve el argumento número, con la </a:t>
+            </a:r>
+            <a:r>
+              <a:rPr lang="es-ES" sz="2800" dirty="0" smtClean="0"/>
+              <a:t>cantidad </a:t>
+            </a:r>
+            <a:r>
+              <a:rPr lang="es-ES" sz="2800" dirty="0"/>
+              <a:t>de decimales especificados en el argumento </a:t>
+            </a:r>
+            <a:r>
+              <a:rPr lang="es-ES" sz="2800" dirty="0" err="1" smtClean="0"/>
+              <a:t>núm_decimales</a:t>
+            </a:r>
+            <a:r>
+              <a:rPr lang="es-ES" sz="2800" dirty="0" smtClean="0"/>
+              <a:t>, </a:t>
+            </a:r>
+            <a:r>
+              <a:rPr lang="es-ES" sz="2800" dirty="0" err="1" smtClean="0"/>
+              <a:t>ej</a:t>
+            </a:r>
+            <a:r>
+              <a:rPr lang="es-ES" sz="2800" dirty="0" smtClean="0"/>
+              <a:t>:</a:t>
+            </a:r>
+            <a:endParaRPr lang="es-ES" sz="2600" b="1" dirty="0"/>
+          </a:p>
+          <a:p>
+            <a:pPr lvl="2"/>
+            <a:r>
+              <a:rPr lang="pt-BR" dirty="0"/>
+              <a:t>REDONDEAR(1.4545, 2) </a:t>
+            </a:r>
+            <a:r>
+              <a:rPr lang="pt-BR" dirty="0" smtClean="0"/>
+              <a:t>=&gt;1.45</a:t>
+            </a:r>
+            <a:endParaRPr lang="es-ES" dirty="0"/>
+          </a:p>
+          <a:p>
+            <a:pPr marL="457200" lvl="1" indent="0">
+              <a:buNone/>
+            </a:pPr>
+            <a:endParaRPr lang="es-ES" dirty="0" smtClean="0"/>
+          </a:p>
           <a:p>
             <a:endParaRPr lang="es-ES" dirty="0"/>
           </a:p>
@@ -3504,6 +4790,13 @@
   <p:clrMapOvr>
     <a:masterClrMapping/>
   </p:clrMapOvr>
+  <p:timing>
+    <p:tnLst>
+      <p:par>
+        <p:cTn id="1" dur="indefinite" restart="never" nodeType="tmRoot"/>
+      </p:par>
+    </p:tnLst>
+  </p:timing>
 </p:sld>
 </file>
 

</xml_diff>

<commit_message>
se termino clase aplicadas 2
</commit_message>
<xml_diff>
--- a/2015-2016/clases/computacion_aplicada_2/clase_2/clase_2.pptx
+++ b/2015-2016/clases/computacion_aplicada_2/clase_2/clase_2.pptx
@@ -2,7 +2,7 @@
 <file path=ppt/presentation.xml><?xml version="1.0" encoding="utf-8"?>
 <p:presentation xmlns:a="http://schemas.openxmlformats.org/drawingml/2006/main" xmlns:r="http://schemas.openxmlformats.org/officeDocument/2006/relationships" xmlns:p="http://schemas.openxmlformats.org/presentationml/2006/main" saveSubsetFonts="1">
   <p:sldMasterIdLst>
-    <p:sldMasterId id="2147483648" r:id="rId1"/>
+    <p:sldMasterId id="2147483660" r:id="rId1"/>
   </p:sldMasterIdLst>
   <p:sldIdLst>
     <p:sldId id="256" r:id="rId2"/>
@@ -138,7 +138,78 @@
       </p:grpSpPr>
       <p:sp>
         <p:nvSpPr>
-          <p:cNvPr id="2" name="1 Título"/>
+          <p:cNvPr id="7" name="6 Triángulo isósceles"/>
+          <p:cNvSpPr/>
+          <p:nvPr/>
+        </p:nvSpPr>
+        <p:spPr>
+          <a:xfrm rot="16200000">
+            <a:off x="7554353" y="5254283"/>
+            <a:ext cx="1892949" cy="1294228"/>
+          </a:xfrm>
+          <a:prstGeom prst="triangle">
+            <a:avLst>
+              <a:gd name="adj" fmla="val 51323"/>
+            </a:avLst>
+          </a:prstGeom>
+          <a:gradFill flip="none" rotWithShape="1">
+            <a:gsLst>
+              <a:gs pos="0">
+                <a:schemeClr val="accent1">
+                  <a:shade val="30000"/>
+                  <a:satMod val="155000"/>
+                  <a:alpha val="100000"/>
+                </a:schemeClr>
+              </a:gs>
+              <a:gs pos="60000">
+                <a:schemeClr val="accent1">
+                  <a:satMod val="160000"/>
+                  <a:alpha val="100000"/>
+                </a:schemeClr>
+              </a:gs>
+              <a:gs pos="100000">
+                <a:schemeClr val="accent1">
+                  <a:tint val="70000"/>
+                  <a:satMod val="200000"/>
+                  <a:alpha val="100000"/>
+                </a:schemeClr>
+              </a:gs>
+            </a:gsLst>
+            <a:lin ang="15500000" scaled="1"/>
+            <a:tileRect/>
+          </a:gradFill>
+          <a:ln w="38100" cap="rnd" cmpd="sng" algn="ctr">
+            <a:noFill/>
+            <a:prstDash val="solid"/>
+          </a:ln>
+          <a:effectLst/>
+        </p:spPr>
+        <p:style>
+          <a:lnRef idx="3">
+            <a:schemeClr val="lt1"/>
+          </a:lnRef>
+          <a:fillRef idx="1">
+            <a:schemeClr val="accent1"/>
+          </a:fillRef>
+          <a:effectRef idx="1">
+            <a:schemeClr val="accent1"/>
+          </a:effectRef>
+          <a:fontRef idx="minor">
+            <a:schemeClr val="lt1"/>
+          </a:fontRef>
+        </p:style>
+        <p:txBody>
+          <a:bodyPr anchor="ctr"/>
+          <a:lstStyle/>
+          <a:p>
+            <a:pPr algn="ctr" eaLnBrk="1" latinLnBrk="0" hangingPunct="1"/>
+            <a:endParaRPr kumimoji="0" lang="en-US"/>
+          </a:p>
+        </p:txBody>
+      </p:sp>
+      <p:sp>
+        <p:nvSpPr>
+          <p:cNvPr id="8" name="7 Título"/>
           <p:cNvSpPr>
             <a:spLocks noGrp="1"/>
           </p:cNvSpPr>
@@ -148,25 +219,31 @@
         </p:nvSpPr>
         <p:spPr>
           <a:xfrm>
-            <a:off x="685800" y="2130425"/>
-            <a:ext cx="7772400" cy="1470025"/>
-          </a:xfrm>
-        </p:spPr>
-        <p:txBody>
-          <a:bodyPr/>
-          <a:lstStyle/>
-          <a:p>
-            <a:r>
-              <a:rPr lang="es-ES" smtClean="0"/>
+            <a:off x="540544" y="776288"/>
+            <a:ext cx="8062912" cy="1470025"/>
+          </a:xfrm>
+        </p:spPr>
+        <p:txBody>
+          <a:bodyPr anchor="b">
+            <a:normAutofit/>
+          </a:bodyPr>
+          <a:lstStyle>
+            <a:lvl1pPr algn="r">
+              <a:defRPr sz="4400"/>
+            </a:lvl1pPr>
+          </a:lstStyle>
+          <a:p>
+            <a:r>
+              <a:rPr kumimoji="0" lang="es-ES" smtClean="0"/>
               <a:t>Haga clic para modificar el estilo de título del patrón</a:t>
             </a:r>
-            <a:endParaRPr lang="es-ES"/>
-          </a:p>
-        </p:txBody>
-      </p:sp>
-      <p:sp>
-        <p:nvSpPr>
-          <p:cNvPr id="3" name="2 Subtítulo"/>
+            <a:endParaRPr kumimoji="0" lang="en-US"/>
+          </a:p>
+        </p:txBody>
+      </p:sp>
+      <p:sp>
+        <p:nvSpPr>
+          <p:cNvPr id="9" name="8 Subtítulo"/>
           <p:cNvSpPr>
             <a:spLocks noGrp="1"/>
           </p:cNvSpPr>
@@ -176,16 +253,24 @@
         </p:nvSpPr>
         <p:spPr>
           <a:xfrm>
-            <a:off x="1371600" y="3886200"/>
-            <a:ext cx="6400800" cy="1752600"/>
+            <a:off x="540544" y="2250280"/>
+            <a:ext cx="8062912" cy="1752600"/>
           </a:xfrm>
         </p:spPr>
         <p:txBody>
           <a:bodyPr/>
           <a:lstStyle>
-            <a:lvl1pPr marL="0" indent="0" algn="ctr">
+            <a:lvl1pPr marL="0" marR="36576" indent="0" algn="r">
+              <a:spcBef>
+                <a:spcPts val="0"/>
+              </a:spcBef>
               <a:buNone/>
               <a:defRPr>
+                <a:ln>
+                  <a:solidFill>
+                    <a:schemeClr val="bg2"/>
+                  </a:solidFill>
+                </a:ln>
                 <a:solidFill>
                   <a:schemeClr val="tx1">
                     <a:tint val="75000"/>
@@ -195,150 +280,125 @@
             </a:lvl1pPr>
             <a:lvl2pPr marL="457200" indent="0" algn="ctr">
               <a:buNone/>
-              <a:defRPr>
-                <a:solidFill>
-                  <a:schemeClr val="tx1">
-                    <a:tint val="75000"/>
-                  </a:schemeClr>
-                </a:solidFill>
-              </a:defRPr>
             </a:lvl2pPr>
             <a:lvl3pPr marL="914400" indent="0" algn="ctr">
               <a:buNone/>
-              <a:defRPr>
-                <a:solidFill>
-                  <a:schemeClr val="tx1">
-                    <a:tint val="75000"/>
-                  </a:schemeClr>
-                </a:solidFill>
-              </a:defRPr>
             </a:lvl3pPr>
             <a:lvl4pPr marL="1371600" indent="0" algn="ctr">
               <a:buNone/>
-              <a:defRPr>
-                <a:solidFill>
-                  <a:schemeClr val="tx1">
-                    <a:tint val="75000"/>
-                  </a:schemeClr>
-                </a:solidFill>
-              </a:defRPr>
             </a:lvl4pPr>
             <a:lvl5pPr marL="1828800" indent="0" algn="ctr">
               <a:buNone/>
-              <a:defRPr>
-                <a:solidFill>
-                  <a:schemeClr val="tx1">
-                    <a:tint val="75000"/>
-                  </a:schemeClr>
-                </a:solidFill>
-              </a:defRPr>
             </a:lvl5pPr>
             <a:lvl6pPr marL="2286000" indent="0" algn="ctr">
               <a:buNone/>
-              <a:defRPr>
-                <a:solidFill>
-                  <a:schemeClr val="tx1">
-                    <a:tint val="75000"/>
-                  </a:schemeClr>
-                </a:solidFill>
-              </a:defRPr>
             </a:lvl6pPr>
             <a:lvl7pPr marL="2743200" indent="0" algn="ctr">
               <a:buNone/>
-              <a:defRPr>
-                <a:solidFill>
-                  <a:schemeClr val="tx1">
-                    <a:tint val="75000"/>
-                  </a:schemeClr>
-                </a:solidFill>
-              </a:defRPr>
             </a:lvl7pPr>
             <a:lvl8pPr marL="3200400" indent="0" algn="ctr">
               <a:buNone/>
-              <a:defRPr>
-                <a:solidFill>
-                  <a:schemeClr val="tx1">
-                    <a:tint val="75000"/>
-                  </a:schemeClr>
-                </a:solidFill>
-              </a:defRPr>
             </a:lvl8pPr>
             <a:lvl9pPr marL="3657600" indent="0" algn="ctr">
               <a:buNone/>
-              <a:defRPr>
+            </a:lvl9pPr>
+          </a:lstStyle>
+          <a:p>
+            <a:r>
+              <a:rPr kumimoji="0" lang="es-ES" smtClean="0"/>
+              <a:t>Haga clic para modificar el estilo de subtítulo del patrón</a:t>
+            </a:r>
+            <a:endParaRPr kumimoji="0" lang="en-US"/>
+          </a:p>
+        </p:txBody>
+      </p:sp>
+      <p:sp>
+        <p:nvSpPr>
+          <p:cNvPr id="28" name="27 Marcador de fecha"/>
+          <p:cNvSpPr>
+            <a:spLocks noGrp="1"/>
+          </p:cNvSpPr>
+          <p:nvPr>
+            <p:ph type="dt" sz="half" idx="10"/>
+          </p:nvPr>
+        </p:nvSpPr>
+        <p:spPr>
+          <a:xfrm>
+            <a:off x="1371600" y="6012656"/>
+            <a:ext cx="5791200" cy="365125"/>
+          </a:xfrm>
+        </p:spPr>
+        <p:txBody>
+          <a:bodyPr tIns="0" bIns="0" anchor="t"/>
+          <a:lstStyle>
+            <a:lvl1pPr algn="r">
+              <a:defRPr sz="1000"/>
+            </a:lvl1pPr>
+          </a:lstStyle>
+          <a:p>
+            <a:fld id="{7A847CFC-816F-41D0-AAC0-9BF4FEBC753E}" type="datetimeFigureOut">
+              <a:rPr lang="es-ES" smtClean="0"/>
+              <a:t>21/05/2015</a:t>
+            </a:fld>
+            <a:endParaRPr lang="es-ES"/>
+          </a:p>
+        </p:txBody>
+      </p:sp>
+      <p:sp>
+        <p:nvSpPr>
+          <p:cNvPr id="17" name="16 Marcador de pie de página"/>
+          <p:cNvSpPr>
+            <a:spLocks noGrp="1"/>
+          </p:cNvSpPr>
+          <p:nvPr>
+            <p:ph type="ftr" sz="quarter" idx="11"/>
+          </p:nvPr>
+        </p:nvSpPr>
+        <p:spPr>
+          <a:xfrm>
+            <a:off x="1371600" y="5650704"/>
+            <a:ext cx="5791200" cy="365125"/>
+          </a:xfrm>
+        </p:spPr>
+        <p:txBody>
+          <a:bodyPr tIns="0" bIns="0" anchor="b"/>
+          <a:lstStyle>
+            <a:lvl1pPr algn="r">
+              <a:defRPr sz="1100"/>
+            </a:lvl1pPr>
+          </a:lstStyle>
+          <a:p>
+            <a:endParaRPr lang="es-ES"/>
+          </a:p>
+        </p:txBody>
+      </p:sp>
+      <p:sp>
+        <p:nvSpPr>
+          <p:cNvPr id="29" name="28 Marcador de número de diapositiva"/>
+          <p:cNvSpPr>
+            <a:spLocks noGrp="1"/>
+          </p:cNvSpPr>
+          <p:nvPr>
+            <p:ph type="sldNum" sz="quarter" idx="12"/>
+          </p:nvPr>
+        </p:nvSpPr>
+        <p:spPr>
+          <a:xfrm>
+            <a:off x="8392247" y="5752307"/>
+            <a:ext cx="502920" cy="365125"/>
+          </a:xfrm>
+        </p:spPr>
+        <p:txBody>
+          <a:bodyPr anchor="ctr"/>
+          <a:lstStyle>
+            <a:lvl1pPr algn="ctr">
+              <a:defRPr sz="1300">
                 <a:solidFill>
-                  <a:schemeClr val="tx1">
-                    <a:tint val="75000"/>
-                  </a:schemeClr>
+                  <a:srgbClr val="FFFFFF"/>
                 </a:solidFill>
               </a:defRPr>
-            </a:lvl9pPr>
+            </a:lvl1pPr>
           </a:lstStyle>
-          <a:p>
-            <a:r>
-              <a:rPr lang="es-ES" smtClean="0"/>
-              <a:t>Haga clic para modificar el estilo de subtítulo del patrón</a:t>
-            </a:r>
-            <a:endParaRPr lang="es-ES"/>
-          </a:p>
-        </p:txBody>
-      </p:sp>
-      <p:sp>
-        <p:nvSpPr>
-          <p:cNvPr id="4" name="3 Marcador de fecha"/>
-          <p:cNvSpPr>
-            <a:spLocks noGrp="1"/>
-          </p:cNvSpPr>
-          <p:nvPr>
-            <p:ph type="dt" sz="half" idx="10"/>
-          </p:nvPr>
-        </p:nvSpPr>
-        <p:spPr/>
-        <p:txBody>
-          <a:bodyPr/>
-          <a:lstStyle/>
-          <a:p>
-            <a:fld id="{7A847CFC-816F-41D0-AAC0-9BF4FEBC753E}" type="datetimeFigureOut">
-              <a:rPr lang="es-ES" smtClean="0"/>
-              <a:t>19/05/2015</a:t>
-            </a:fld>
-            <a:endParaRPr lang="es-ES"/>
-          </a:p>
-        </p:txBody>
-      </p:sp>
-      <p:sp>
-        <p:nvSpPr>
-          <p:cNvPr id="5" name="4 Marcador de pie de página"/>
-          <p:cNvSpPr>
-            <a:spLocks noGrp="1"/>
-          </p:cNvSpPr>
-          <p:nvPr>
-            <p:ph type="ftr" sz="quarter" idx="11"/>
-          </p:nvPr>
-        </p:nvSpPr>
-        <p:spPr/>
-        <p:txBody>
-          <a:bodyPr/>
-          <a:lstStyle/>
-          <a:p>
-            <a:endParaRPr lang="es-ES"/>
-          </a:p>
-        </p:txBody>
-      </p:sp>
-      <p:sp>
-        <p:nvSpPr>
-          <p:cNvPr id="6" name="5 Marcador de número de diapositiva"/>
-          <p:cNvSpPr>
-            <a:spLocks noGrp="1"/>
-          </p:cNvSpPr>
-          <p:nvPr>
-            <p:ph type="sldNum" sz="quarter" idx="12"/>
-          </p:nvPr>
-        </p:nvSpPr>
-        <p:spPr/>
-        <p:txBody>
-          <a:bodyPr/>
-          <a:lstStyle/>
           <a:p>
             <a:fld id="{132FADFE-3B8F-471C-ABF0-DBC7717ECBBC}" type="slidenum">
               <a:rPr lang="es-ES" smtClean="0"/>
@@ -389,10 +449,10 @@
           <a:lstStyle/>
           <a:p>
             <a:r>
-              <a:rPr lang="es-ES" smtClean="0"/>
+              <a:rPr kumimoji="0" lang="es-ES" smtClean="0"/>
               <a:t>Haga clic para modificar el estilo de título del patrón</a:t>
             </a:r>
-            <a:endParaRPr lang="es-ES"/>
+            <a:endParaRPr kumimoji="0" lang="en-US"/>
           </a:p>
         </p:txBody>
       </p:sp>
@@ -411,40 +471,40 @@
           <a:bodyPr vert="eaVert"/>
           <a:lstStyle/>
           <a:p>
-            <a:pPr lvl="0"/>
+            <a:pPr lvl="0" eaLnBrk="1" latinLnBrk="0" hangingPunct="1"/>
             <a:r>
               <a:rPr lang="es-ES" smtClean="0"/>
               <a:t>Haga clic para modificar el estilo de texto del patrón</a:t>
             </a:r>
           </a:p>
           <a:p>
-            <a:pPr lvl="1"/>
+            <a:pPr lvl="1" eaLnBrk="1" latinLnBrk="0" hangingPunct="1"/>
             <a:r>
               <a:rPr lang="es-ES" smtClean="0"/>
               <a:t>Segundo nivel</a:t>
             </a:r>
           </a:p>
           <a:p>
-            <a:pPr lvl="2"/>
+            <a:pPr lvl="2" eaLnBrk="1" latinLnBrk="0" hangingPunct="1"/>
             <a:r>
               <a:rPr lang="es-ES" smtClean="0"/>
               <a:t>Tercer nivel</a:t>
             </a:r>
           </a:p>
           <a:p>
-            <a:pPr lvl="3"/>
+            <a:pPr lvl="3" eaLnBrk="1" latinLnBrk="0" hangingPunct="1"/>
             <a:r>
               <a:rPr lang="es-ES" smtClean="0"/>
               <a:t>Cuarto nivel</a:t>
             </a:r>
           </a:p>
           <a:p>
-            <a:pPr lvl="4"/>
+            <a:pPr lvl="4" eaLnBrk="1" latinLnBrk="0" hangingPunct="1"/>
             <a:r>
               <a:rPr lang="es-ES" smtClean="0"/>
               <a:t>Quinto nivel</a:t>
             </a:r>
-            <a:endParaRPr lang="es-ES"/>
+            <a:endParaRPr kumimoji="0" lang="en-US"/>
           </a:p>
         </p:txBody>
       </p:sp>
@@ -465,7 +525,7 @@
           <a:p>
             <a:fld id="{7A847CFC-816F-41D0-AAC0-9BF4FEBC753E}" type="datetimeFigureOut">
               <a:rPr lang="es-ES" smtClean="0"/>
-              <a:t>19/05/2015</a:t>
+              <a:t>21/05/2015</a:t>
             </a:fld>
             <a:endParaRPr lang="es-ES"/>
           </a:p>
@@ -550,8 +610,8 @@
         </p:nvSpPr>
         <p:spPr>
           <a:xfrm>
-            <a:off x="6629400" y="274638"/>
-            <a:ext cx="2057400" cy="5851525"/>
+            <a:off x="6781800" y="381000"/>
+            <a:ext cx="1905000" cy="5486400"/>
           </a:xfrm>
         </p:spPr>
         <p:txBody>
@@ -559,10 +619,10 @@
           <a:lstStyle/>
           <a:p>
             <a:r>
-              <a:rPr lang="es-ES" smtClean="0"/>
+              <a:rPr kumimoji="0" lang="es-ES" smtClean="0"/>
               <a:t>Haga clic para modificar el estilo de título del patrón</a:t>
             </a:r>
-            <a:endParaRPr lang="es-ES"/>
+            <a:endParaRPr kumimoji="0" lang="en-US"/>
           </a:p>
         </p:txBody>
       </p:sp>
@@ -578,48 +638,48 @@
         </p:nvSpPr>
         <p:spPr>
           <a:xfrm>
-            <a:off x="457200" y="274638"/>
-            <a:ext cx="6019800" cy="5851525"/>
+            <a:off x="457200" y="381000"/>
+            <a:ext cx="6248400" cy="5486400"/>
           </a:xfrm>
         </p:spPr>
         <p:txBody>
           <a:bodyPr vert="eaVert"/>
           <a:lstStyle/>
           <a:p>
-            <a:pPr lvl="0"/>
+            <a:pPr lvl="0" eaLnBrk="1" latinLnBrk="0" hangingPunct="1"/>
             <a:r>
               <a:rPr lang="es-ES" smtClean="0"/>
               <a:t>Haga clic para modificar el estilo de texto del patrón</a:t>
             </a:r>
           </a:p>
           <a:p>
-            <a:pPr lvl="1"/>
+            <a:pPr lvl="1" eaLnBrk="1" latinLnBrk="0" hangingPunct="1"/>
             <a:r>
               <a:rPr lang="es-ES" smtClean="0"/>
               <a:t>Segundo nivel</a:t>
             </a:r>
           </a:p>
           <a:p>
-            <a:pPr lvl="2"/>
+            <a:pPr lvl="2" eaLnBrk="1" latinLnBrk="0" hangingPunct="1"/>
             <a:r>
               <a:rPr lang="es-ES" smtClean="0"/>
               <a:t>Tercer nivel</a:t>
             </a:r>
           </a:p>
           <a:p>
-            <a:pPr lvl="3"/>
+            <a:pPr lvl="3" eaLnBrk="1" latinLnBrk="0" hangingPunct="1"/>
             <a:r>
               <a:rPr lang="es-ES" smtClean="0"/>
               <a:t>Cuarto nivel</a:t>
             </a:r>
           </a:p>
           <a:p>
-            <a:pPr lvl="4"/>
+            <a:pPr lvl="4" eaLnBrk="1" latinLnBrk="0" hangingPunct="1"/>
             <a:r>
               <a:rPr lang="es-ES" smtClean="0"/>
               <a:t>Quinto nivel</a:t>
             </a:r>
-            <a:endParaRPr lang="es-ES"/>
+            <a:endParaRPr kumimoji="0" lang="en-US"/>
           </a:p>
         </p:txBody>
       </p:sp>
@@ -640,7 +700,7 @@
           <a:p>
             <a:fld id="{7A847CFC-816F-41D0-AAC0-9BF4FEBC753E}" type="datetimeFigureOut">
               <a:rPr lang="es-ES" smtClean="0"/>
-              <a:t>19/05/2015</a:t>
+              <a:t>21/05/2015</a:t>
             </a:fld>
             <a:endParaRPr lang="es-ES"/>
           </a:p>
@@ -723,16 +783,21 @@
             <p:ph type="title"/>
           </p:nvPr>
         </p:nvSpPr>
-        <p:spPr/>
+        <p:spPr>
+          <a:xfrm>
+            <a:off x="457200" y="267494"/>
+            <a:ext cx="8229600" cy="1399032"/>
+          </a:xfrm>
+        </p:spPr>
         <p:txBody>
           <a:bodyPr/>
           <a:lstStyle/>
           <a:p>
             <a:r>
-              <a:rPr lang="es-ES" smtClean="0"/>
+              <a:rPr kumimoji="0" lang="es-ES" smtClean="0"/>
               <a:t>Haga clic para modificar el estilo de título del patrón</a:t>
             </a:r>
-            <a:endParaRPr lang="es-ES"/>
+            <a:endParaRPr kumimoji="0" lang="en-US"/>
           </a:p>
         </p:txBody>
       </p:sp>
@@ -746,45 +811,50 @@
             <p:ph idx="1"/>
           </p:nvPr>
         </p:nvSpPr>
-        <p:spPr/>
+        <p:spPr>
+          <a:xfrm>
+            <a:off x="457200" y="1882808"/>
+            <a:ext cx="8229600" cy="4572000"/>
+          </a:xfrm>
+        </p:spPr>
         <p:txBody>
           <a:bodyPr/>
           <a:lstStyle/>
           <a:p>
-            <a:pPr lvl="0"/>
+            <a:pPr lvl="0" eaLnBrk="1" latinLnBrk="0" hangingPunct="1"/>
             <a:r>
               <a:rPr lang="es-ES" smtClean="0"/>
               <a:t>Haga clic para modificar el estilo de texto del patrón</a:t>
             </a:r>
           </a:p>
           <a:p>
-            <a:pPr lvl="1"/>
+            <a:pPr lvl="1" eaLnBrk="1" latinLnBrk="0" hangingPunct="1"/>
             <a:r>
               <a:rPr lang="es-ES" smtClean="0"/>
               <a:t>Segundo nivel</a:t>
             </a:r>
           </a:p>
           <a:p>
-            <a:pPr lvl="2"/>
+            <a:pPr lvl="2" eaLnBrk="1" latinLnBrk="0" hangingPunct="1"/>
             <a:r>
               <a:rPr lang="es-ES" smtClean="0"/>
               <a:t>Tercer nivel</a:t>
             </a:r>
           </a:p>
           <a:p>
-            <a:pPr lvl="3"/>
+            <a:pPr lvl="3" eaLnBrk="1" latinLnBrk="0" hangingPunct="1"/>
             <a:r>
               <a:rPr lang="es-ES" smtClean="0"/>
               <a:t>Cuarto nivel</a:t>
             </a:r>
           </a:p>
           <a:p>
-            <a:pPr lvl="4"/>
+            <a:pPr lvl="4" eaLnBrk="1" latinLnBrk="0" hangingPunct="1"/>
             <a:r>
               <a:rPr lang="es-ES" smtClean="0"/>
               <a:t>Quinto nivel</a:t>
             </a:r>
-            <a:endParaRPr lang="es-ES"/>
+            <a:endParaRPr kumimoji="0" lang="en-US"/>
           </a:p>
         </p:txBody>
       </p:sp>
@@ -798,14 +868,19 @@
             <p:ph type="dt" sz="half" idx="10"/>
           </p:nvPr>
         </p:nvSpPr>
-        <p:spPr/>
+        <p:spPr>
+          <a:xfrm>
+            <a:off x="4791456" y="6480048"/>
+            <a:ext cx="2133600" cy="301752"/>
+          </a:xfrm>
+        </p:spPr>
         <p:txBody>
           <a:bodyPr/>
           <a:lstStyle/>
           <a:p>
             <a:fld id="{7A847CFC-816F-41D0-AAC0-9BF4FEBC753E}" type="datetimeFigureOut">
               <a:rPr lang="es-ES" smtClean="0"/>
-              <a:t>19/05/2015</a:t>
+              <a:t>21/05/2015</a:t>
             </a:fld>
             <a:endParaRPr lang="es-ES"/>
           </a:p>
@@ -821,7 +896,12 @@
             <p:ph type="ftr" sz="quarter" idx="11"/>
           </p:nvPr>
         </p:nvSpPr>
-        <p:spPr/>
+        <p:spPr>
+          <a:xfrm>
+            <a:off x="457200" y="6480969"/>
+            <a:ext cx="4260056" cy="300831"/>
+          </a:xfrm>
+        </p:spPr>
         <p:txBody>
           <a:bodyPr/>
           <a:lstStyle/>
@@ -862,8 +942,13 @@
 </file>
 
 <file path=ppt/slideLayouts/slideLayout3.xml><?xml version="1.0" encoding="utf-8"?>
-<p:sldLayout xmlns:a="http://schemas.openxmlformats.org/drawingml/2006/main" xmlns:r="http://schemas.openxmlformats.org/officeDocument/2006/relationships" xmlns:p="http://schemas.openxmlformats.org/presentationml/2006/main" type="secHead" preserve="1">
+<p:sldLayout xmlns:a="http://schemas.openxmlformats.org/drawingml/2006/main" xmlns:r="http://schemas.openxmlformats.org/officeDocument/2006/relationships" xmlns:p="http://schemas.openxmlformats.org/presentationml/2006/main" showMasterSp="0" type="secHead" preserve="1">
   <p:cSld name="Encabezado de sección">
+    <p:bg>
+      <p:bgRef idx="1002">
+        <a:schemeClr val="bg1"/>
+      </p:bgRef>
+    </p:bg>
     <p:spTree>
       <p:nvGrpSpPr>
         <p:cNvPr id="1" name=""/>
@@ -880,6 +965,312 @@
       </p:grpSpPr>
       <p:sp>
         <p:nvSpPr>
+          <p:cNvPr id="9" name="8 Triángulo rectángulo"/>
+          <p:cNvSpPr/>
+          <p:nvPr/>
+        </p:nvSpPr>
+        <p:spPr>
+          <a:xfrm flipV="1">
+            <a:off x="7034" y="7034"/>
+            <a:ext cx="9129932" cy="6836899"/>
+          </a:xfrm>
+          <a:prstGeom prst="rtTriangle">
+            <a:avLst/>
+          </a:prstGeom>
+          <a:gradFill flip="none" rotWithShape="1">
+            <a:gsLst>
+              <a:gs pos="0">
+                <a:schemeClr val="tx2">
+                  <a:alpha val="10000"/>
+                </a:schemeClr>
+              </a:gs>
+              <a:gs pos="70000">
+                <a:schemeClr val="tx2">
+                  <a:alpha val="8000"/>
+                </a:schemeClr>
+              </a:gs>
+              <a:gs pos="100000">
+                <a:schemeClr val="tx2">
+                  <a:alpha val="1000"/>
+                </a:schemeClr>
+              </a:gs>
+            </a:gsLst>
+            <a:lin ang="8000000" scaled="1"/>
+            <a:tileRect/>
+          </a:gradFill>
+          <a:ln w="38100" cap="rnd" cmpd="sng" algn="ctr">
+            <a:noFill/>
+            <a:prstDash val="solid"/>
+          </a:ln>
+          <a:effectLst/>
+        </p:spPr>
+        <p:style>
+          <a:lnRef idx="3">
+            <a:schemeClr val="lt1"/>
+          </a:lnRef>
+          <a:fillRef idx="1">
+            <a:schemeClr val="accent1"/>
+          </a:fillRef>
+          <a:effectRef idx="1">
+            <a:schemeClr val="accent1"/>
+          </a:effectRef>
+          <a:fontRef idx="minor">
+            <a:schemeClr val="lt1"/>
+          </a:fontRef>
+        </p:style>
+        <p:txBody>
+          <a:bodyPr anchor="ctr"/>
+          <a:lstStyle/>
+          <a:p>
+            <a:pPr marL="0" algn="ctr" defTabSz="914400" rtl="0" eaLnBrk="1" latinLnBrk="0" hangingPunct="1"/>
+            <a:endParaRPr kumimoji="0" lang="en-US" sz="1800" kern="1200">
+              <a:solidFill>
+                <a:schemeClr val="lt1"/>
+              </a:solidFill>
+              <a:latin typeface="+mn-lt"/>
+              <a:ea typeface="+mn-ea"/>
+              <a:cs typeface="+mn-cs"/>
+            </a:endParaRPr>
+          </a:p>
+        </p:txBody>
+      </p:sp>
+      <p:sp>
+        <p:nvSpPr>
+          <p:cNvPr id="8" name="7 Triángulo isósceles"/>
+          <p:cNvSpPr/>
+          <p:nvPr/>
+        </p:nvSpPr>
+        <p:spPr>
+          <a:xfrm rot="5400000" flipV="1">
+            <a:off x="7554353" y="309490"/>
+            <a:ext cx="1892949" cy="1294228"/>
+          </a:xfrm>
+          <a:prstGeom prst="triangle">
+            <a:avLst>
+              <a:gd name="adj" fmla="val 51323"/>
+            </a:avLst>
+          </a:prstGeom>
+          <a:gradFill flip="none" rotWithShape="1">
+            <a:gsLst>
+              <a:gs pos="0">
+                <a:schemeClr val="accent1">
+                  <a:shade val="30000"/>
+                  <a:satMod val="155000"/>
+                  <a:alpha val="100000"/>
+                </a:schemeClr>
+              </a:gs>
+              <a:gs pos="60000">
+                <a:schemeClr val="accent1">
+                  <a:satMod val="160000"/>
+                  <a:alpha val="100000"/>
+                </a:schemeClr>
+              </a:gs>
+              <a:gs pos="100000">
+                <a:schemeClr val="accent1">
+                  <a:tint val="70000"/>
+                  <a:satMod val="200000"/>
+                  <a:alpha val="100000"/>
+                </a:schemeClr>
+              </a:gs>
+            </a:gsLst>
+            <a:lin ang="15500000" scaled="1"/>
+            <a:tileRect/>
+          </a:gradFill>
+          <a:ln w="38100" cap="rnd" cmpd="sng" algn="ctr">
+            <a:noFill/>
+            <a:prstDash val="solid"/>
+          </a:ln>
+          <a:effectLst/>
+        </p:spPr>
+        <p:style>
+          <a:lnRef idx="3">
+            <a:schemeClr val="lt1"/>
+          </a:lnRef>
+          <a:fillRef idx="1">
+            <a:schemeClr val="accent1"/>
+          </a:fillRef>
+          <a:effectRef idx="1">
+            <a:schemeClr val="accent1"/>
+          </a:effectRef>
+          <a:fontRef idx="minor">
+            <a:schemeClr val="lt1"/>
+          </a:fontRef>
+        </p:style>
+        <p:txBody>
+          <a:bodyPr anchor="ctr"/>
+          <a:lstStyle/>
+          <a:p>
+            <a:pPr algn="ctr" eaLnBrk="1" latinLnBrk="0" hangingPunct="1"/>
+            <a:endParaRPr kumimoji="0" lang="en-US"/>
+          </a:p>
+        </p:txBody>
+      </p:sp>
+      <p:sp>
+        <p:nvSpPr>
+          <p:cNvPr id="4" name="3 Marcador de fecha"/>
+          <p:cNvSpPr>
+            <a:spLocks noGrp="1"/>
+          </p:cNvSpPr>
+          <p:nvPr>
+            <p:ph type="dt" sz="half" idx="10"/>
+          </p:nvPr>
+        </p:nvSpPr>
+        <p:spPr>
+          <a:xfrm>
+            <a:off x="6955632" y="6477000"/>
+            <a:ext cx="2133600" cy="304800"/>
+          </a:xfrm>
+        </p:spPr>
+        <p:txBody>
+          <a:bodyPr/>
+          <a:lstStyle/>
+          <a:p>
+            <a:fld id="{7A847CFC-816F-41D0-AAC0-9BF4FEBC753E}" type="datetimeFigureOut">
+              <a:rPr lang="es-ES" smtClean="0"/>
+              <a:t>21/05/2015</a:t>
+            </a:fld>
+            <a:endParaRPr lang="es-ES"/>
+          </a:p>
+        </p:txBody>
+      </p:sp>
+      <p:sp>
+        <p:nvSpPr>
+          <p:cNvPr id="5" name="4 Marcador de pie de página"/>
+          <p:cNvSpPr>
+            <a:spLocks noGrp="1"/>
+          </p:cNvSpPr>
+          <p:nvPr>
+            <p:ph type="ftr" sz="quarter" idx="11"/>
+          </p:nvPr>
+        </p:nvSpPr>
+        <p:spPr>
+          <a:xfrm>
+            <a:off x="2619376" y="6480969"/>
+            <a:ext cx="4260056" cy="300831"/>
+          </a:xfrm>
+        </p:spPr>
+        <p:txBody>
+          <a:bodyPr/>
+          <a:lstStyle/>
+          <a:p>
+            <a:endParaRPr lang="es-ES"/>
+          </a:p>
+        </p:txBody>
+      </p:sp>
+      <p:sp>
+        <p:nvSpPr>
+          <p:cNvPr id="6" name="5 Marcador de número de diapositiva"/>
+          <p:cNvSpPr>
+            <a:spLocks noGrp="1"/>
+          </p:cNvSpPr>
+          <p:nvPr>
+            <p:ph type="sldNum" sz="quarter" idx="12"/>
+          </p:nvPr>
+        </p:nvSpPr>
+        <p:spPr>
+          <a:xfrm>
+            <a:off x="8451056" y="809624"/>
+            <a:ext cx="502920" cy="300831"/>
+          </a:xfrm>
+        </p:spPr>
+        <p:txBody>
+          <a:bodyPr/>
+          <a:lstStyle/>
+          <a:p>
+            <a:fld id="{132FADFE-3B8F-471C-ABF0-DBC7717ECBBC}" type="slidenum">
+              <a:rPr lang="es-ES" smtClean="0"/>
+              <a:t>‹Nº›</a:t>
+            </a:fld>
+            <a:endParaRPr lang="es-ES"/>
+          </a:p>
+        </p:txBody>
+      </p:sp>
+      <p:cxnSp>
+        <p:nvCxnSpPr>
+          <p:cNvPr id="11" name="10 Conector recto"/>
+          <p:cNvCxnSpPr/>
+          <p:nvPr/>
+        </p:nvCxnSpPr>
+        <p:spPr>
+          <a:xfrm rot="10800000">
+            <a:off x="6468794" y="9381"/>
+            <a:ext cx="2672861" cy="1900210"/>
+          </a:xfrm>
+          <a:prstGeom prst="line">
+            <a:avLst/>
+          </a:prstGeom>
+          <a:noFill/>
+          <a:ln w="6000" cap="rnd" cmpd="sng" algn="ctr">
+            <a:solidFill>
+              <a:schemeClr val="bg2">
+                <a:tint val="50000"/>
+                <a:satMod val="200000"/>
+                <a:alpha val="45000"/>
+              </a:schemeClr>
+            </a:solidFill>
+            <a:prstDash val="solid"/>
+          </a:ln>
+          <a:effectLst/>
+        </p:spPr>
+        <p:style>
+          <a:lnRef idx="2">
+            <a:schemeClr val="accent1"/>
+          </a:lnRef>
+          <a:fillRef idx="0">
+            <a:schemeClr val="accent1"/>
+          </a:fillRef>
+          <a:effectRef idx="1">
+            <a:schemeClr val="accent1"/>
+          </a:effectRef>
+          <a:fontRef idx="minor">
+            <a:schemeClr val="tx1"/>
+          </a:fontRef>
+        </p:style>
+      </p:cxnSp>
+      <p:cxnSp>
+        <p:nvCxnSpPr>
+          <p:cNvPr id="10" name="9 Conector recto"/>
+          <p:cNvCxnSpPr/>
+          <p:nvPr/>
+        </p:nvCxnSpPr>
+        <p:spPr>
+          <a:xfrm flipV="1">
+            <a:off x="0" y="7034"/>
+            <a:ext cx="9136966" cy="6843933"/>
+          </a:xfrm>
+          <a:prstGeom prst="line">
+            <a:avLst/>
+          </a:prstGeom>
+          <a:noFill/>
+          <a:ln w="5000" cap="rnd" cmpd="sng" algn="ctr">
+            <a:solidFill>
+              <a:schemeClr val="bg2">
+                <a:tint val="55000"/>
+                <a:satMod val="200000"/>
+                <a:alpha val="35000"/>
+              </a:schemeClr>
+            </a:solidFill>
+            <a:prstDash val="solid"/>
+          </a:ln>
+          <a:effectLst/>
+        </p:spPr>
+        <p:style>
+          <a:lnRef idx="2">
+            <a:schemeClr val="accent1"/>
+          </a:lnRef>
+          <a:fillRef idx="0">
+            <a:schemeClr val="accent1"/>
+          </a:fillRef>
+          <a:effectRef idx="1">
+            <a:schemeClr val="accent1"/>
+          </a:effectRef>
+          <a:fontRef idx="minor">
+            <a:schemeClr val="tx1"/>
+          </a:fontRef>
+        </p:style>
+      </p:cxnSp>
+      <p:sp>
+        <p:nvSpPr>
           <p:cNvPr id="2" name="1 Título"/>
           <p:cNvSpPr>
             <a:spLocks noGrp="1"/>
@@ -890,46 +1281,47 @@
         </p:nvSpPr>
         <p:spPr>
           <a:xfrm>
-            <a:off x="722313" y="4406900"/>
-            <a:ext cx="7772400" cy="1362075"/>
+            <a:off x="381000" y="271464"/>
+            <a:ext cx="7239000" cy="1362075"/>
+          </a:xfrm>
+        </p:spPr>
+        <p:txBody>
+          <a:bodyPr anchor="ctr"/>
+          <a:lstStyle>
+            <a:lvl1pPr marL="0" algn="l">
+              <a:buNone/>
+              <a:defRPr sz="3600" b="1" cap="none" baseline="0"/>
+            </a:lvl1pPr>
+          </a:lstStyle>
+          <a:p>
+            <a:r>
+              <a:rPr kumimoji="0" lang="es-ES" smtClean="0"/>
+              <a:t>Haga clic para modificar el estilo de título del patrón</a:t>
+            </a:r>
+            <a:endParaRPr kumimoji="0" lang="en-US"/>
+          </a:p>
+        </p:txBody>
+      </p:sp>
+      <p:sp>
+        <p:nvSpPr>
+          <p:cNvPr id="3" name="2 Marcador de texto"/>
+          <p:cNvSpPr>
+            <a:spLocks noGrp="1"/>
+          </p:cNvSpPr>
+          <p:nvPr>
+            <p:ph type="body" idx="1"/>
+          </p:nvPr>
+        </p:nvSpPr>
+        <p:spPr>
+          <a:xfrm>
+            <a:off x="381000" y="1633536"/>
+            <a:ext cx="3886200" cy="2286000"/>
           </a:xfrm>
         </p:spPr>
         <p:txBody>
           <a:bodyPr anchor="t"/>
           <a:lstStyle>
-            <a:lvl1pPr algn="l">
-              <a:defRPr sz="4000" b="1" cap="all"/>
-            </a:lvl1pPr>
-          </a:lstStyle>
-          <a:p>
-            <a:r>
-              <a:rPr lang="es-ES" smtClean="0"/>
-              <a:t>Haga clic para modificar el estilo de título del patrón</a:t>
-            </a:r>
-            <a:endParaRPr lang="es-ES"/>
-          </a:p>
-        </p:txBody>
-      </p:sp>
-      <p:sp>
-        <p:nvSpPr>
-          <p:cNvPr id="3" name="2 Marcador de texto"/>
-          <p:cNvSpPr>
-            <a:spLocks noGrp="1"/>
-          </p:cNvSpPr>
-          <p:nvPr>
-            <p:ph type="body" idx="1"/>
-          </p:nvPr>
-        </p:nvSpPr>
-        <p:spPr>
-          <a:xfrm>
-            <a:off x="722313" y="2906713"/>
-            <a:ext cx="7772400" cy="1500187"/>
-          </a:xfrm>
-        </p:spPr>
-        <p:txBody>
-          <a:bodyPr anchor="b"/>
-          <a:lstStyle>
-            <a:lvl1pPr marL="0" indent="0">
+            <a:lvl1pPr marL="54864" indent="0" algn="l">
               <a:buNone/>
               <a:defRPr sz="2000">
                 <a:solidFill>
@@ -939,7 +1331,7 @@
                 </a:solidFill>
               </a:defRPr>
             </a:lvl1pPr>
-            <a:lvl2pPr marL="457200" indent="0">
+            <a:lvl2pPr>
               <a:buNone/>
               <a:defRPr sz="1800">
                 <a:solidFill>
@@ -949,7 +1341,7 @@
                 </a:solidFill>
               </a:defRPr>
             </a:lvl2pPr>
-            <a:lvl3pPr marL="914400" indent="0">
+            <a:lvl3pPr>
               <a:buNone/>
               <a:defRPr sz="1600">
                 <a:solidFill>
@@ -959,7 +1351,7 @@
                 </a:solidFill>
               </a:defRPr>
             </a:lvl3pPr>
-            <a:lvl4pPr marL="1371600" indent="0">
+            <a:lvl4pPr>
               <a:buNone/>
               <a:defRPr sz="1400">
                 <a:solidFill>
@@ -969,7 +1361,7 @@
                 </a:solidFill>
               </a:defRPr>
             </a:lvl4pPr>
-            <a:lvl5pPr marL="1828800" indent="0">
+            <a:lvl5pPr>
               <a:buNone/>
               <a:defRPr sz="1400">
                 <a:solidFill>
@@ -979,125 +1371,20 @@
                 </a:solidFill>
               </a:defRPr>
             </a:lvl5pPr>
-            <a:lvl6pPr marL="2286000" indent="0">
-              <a:buNone/>
-              <a:defRPr sz="1400">
-                <a:solidFill>
-                  <a:schemeClr val="tx1">
-                    <a:tint val="75000"/>
-                  </a:schemeClr>
-                </a:solidFill>
-              </a:defRPr>
-            </a:lvl6pPr>
-            <a:lvl7pPr marL="2743200" indent="0">
-              <a:buNone/>
-              <a:defRPr sz="1400">
-                <a:solidFill>
-                  <a:schemeClr val="tx1">
-                    <a:tint val="75000"/>
-                  </a:schemeClr>
-                </a:solidFill>
-              </a:defRPr>
-            </a:lvl7pPr>
-            <a:lvl8pPr marL="3200400" indent="0">
-              <a:buNone/>
-              <a:defRPr sz="1400">
-                <a:solidFill>
-                  <a:schemeClr val="tx1">
-                    <a:tint val="75000"/>
-                  </a:schemeClr>
-                </a:solidFill>
-              </a:defRPr>
-            </a:lvl8pPr>
-            <a:lvl9pPr marL="3657600" indent="0">
-              <a:buNone/>
-              <a:defRPr sz="1400">
-                <a:solidFill>
-                  <a:schemeClr val="tx1">
-                    <a:tint val="75000"/>
-                  </a:schemeClr>
-                </a:solidFill>
-              </a:defRPr>
-            </a:lvl9pPr>
           </a:lstStyle>
           <a:p>
-            <a:pPr lvl="0"/>
-            <a:r>
-              <a:rPr lang="es-ES" smtClean="0"/>
+            <a:pPr lvl="0" eaLnBrk="1" latinLnBrk="0" hangingPunct="1"/>
+            <a:r>
+              <a:rPr kumimoji="0" lang="es-ES" smtClean="0"/>
               <a:t>Haga clic para modificar el estilo de texto del patrón</a:t>
             </a:r>
-          </a:p>
-        </p:txBody>
-      </p:sp>
-      <p:sp>
-        <p:nvSpPr>
-          <p:cNvPr id="4" name="3 Marcador de fecha"/>
-          <p:cNvSpPr>
-            <a:spLocks noGrp="1"/>
-          </p:cNvSpPr>
-          <p:nvPr>
-            <p:ph type="dt" sz="half" idx="10"/>
-          </p:nvPr>
-        </p:nvSpPr>
-        <p:spPr/>
-        <p:txBody>
-          <a:bodyPr/>
-          <a:lstStyle/>
-          <a:p>
-            <a:fld id="{7A847CFC-816F-41D0-AAC0-9BF4FEBC753E}" type="datetimeFigureOut">
-              <a:rPr lang="es-ES" smtClean="0"/>
-              <a:t>19/05/2015</a:t>
-            </a:fld>
-            <a:endParaRPr lang="es-ES"/>
-          </a:p>
-        </p:txBody>
-      </p:sp>
-      <p:sp>
-        <p:nvSpPr>
-          <p:cNvPr id="5" name="4 Marcador de pie de página"/>
-          <p:cNvSpPr>
-            <a:spLocks noGrp="1"/>
-          </p:cNvSpPr>
-          <p:nvPr>
-            <p:ph type="ftr" sz="quarter" idx="11"/>
-          </p:nvPr>
-        </p:nvSpPr>
-        <p:spPr/>
-        <p:txBody>
-          <a:bodyPr/>
-          <a:lstStyle/>
-          <a:p>
-            <a:endParaRPr lang="es-ES"/>
-          </a:p>
-        </p:txBody>
-      </p:sp>
-      <p:sp>
-        <p:nvSpPr>
-          <p:cNvPr id="6" name="5 Marcador de número de diapositiva"/>
-          <p:cNvSpPr>
-            <a:spLocks noGrp="1"/>
-          </p:cNvSpPr>
-          <p:nvPr>
-            <p:ph type="sldNum" sz="quarter" idx="12"/>
-          </p:nvPr>
-        </p:nvSpPr>
-        <p:spPr/>
-        <p:txBody>
-          <a:bodyPr/>
-          <a:lstStyle/>
-          <a:p>
-            <a:fld id="{132FADFE-3B8F-471C-ABF0-DBC7717ECBBC}" type="slidenum">
-              <a:rPr lang="es-ES" smtClean="0"/>
-              <a:t>‹Nº›</a:t>
-            </a:fld>
-            <a:endParaRPr lang="es-ES"/>
           </a:p>
         </p:txBody>
       </p:sp>
     </p:spTree>
   </p:cSld>
   <p:clrMapOvr>
-    <a:masterClrMapping/>
+    <a:overrideClrMapping bg1="dk1" tx1="lt1" bg2="dk2" tx2="lt2" accent1="accent1" accent2="accent2" accent3="accent3" accent4="accent4" accent5="accent5" accent6="accent6" hlink="hlink" folHlink="folHlink"/>
   </p:clrMapOvr>
 </p:sldLayout>
 </file>
@@ -1132,13 +1419,17 @@
         <p:spPr/>
         <p:txBody>
           <a:bodyPr/>
-          <a:lstStyle/>
-          <a:p>
-            <a:r>
-              <a:rPr lang="es-ES" smtClean="0"/>
+          <a:lstStyle>
+            <a:lvl1pPr marL="0" algn="l">
+              <a:defRPr/>
+            </a:lvl1pPr>
+          </a:lstStyle>
+          <a:p>
+            <a:r>
+              <a:rPr kumimoji="0" lang="es-ES" smtClean="0"/>
               <a:t>Haga clic para modificar el estilo de título del patrón</a:t>
             </a:r>
-            <a:endParaRPr lang="es-ES"/>
+            <a:endParaRPr kumimoji="0" lang="en-US"/>
           </a:p>
         </p:txBody>
       </p:sp>
@@ -1154,7 +1445,7 @@
         </p:nvSpPr>
         <p:spPr>
           <a:xfrm>
-            <a:off x="457200" y="1600200"/>
+            <a:off x="457200" y="1722437"/>
             <a:ext cx="4038600" cy="4525963"/>
           </a:xfrm>
         </p:spPr>
@@ -1162,7 +1453,7 @@
           <a:bodyPr/>
           <a:lstStyle>
             <a:lvl1pPr>
-              <a:defRPr sz="2800"/>
+              <a:defRPr sz="2600"/>
             </a:lvl1pPr>
             <a:lvl2pPr>
               <a:defRPr sz="2400"/>
@@ -1176,54 +1467,42 @@
             <a:lvl5pPr>
               <a:defRPr sz="1800"/>
             </a:lvl5pPr>
-            <a:lvl6pPr>
-              <a:defRPr sz="1800"/>
-            </a:lvl6pPr>
-            <a:lvl7pPr>
-              <a:defRPr sz="1800"/>
-            </a:lvl7pPr>
-            <a:lvl8pPr>
-              <a:defRPr sz="1800"/>
-            </a:lvl8pPr>
-            <a:lvl9pPr>
-              <a:defRPr sz="1800"/>
-            </a:lvl9pPr>
           </a:lstStyle>
           <a:p>
-            <a:pPr lvl="0"/>
+            <a:pPr lvl="0" eaLnBrk="1" latinLnBrk="0" hangingPunct="1"/>
             <a:r>
               <a:rPr lang="es-ES" smtClean="0"/>
               <a:t>Haga clic para modificar el estilo de texto del patrón</a:t>
             </a:r>
           </a:p>
           <a:p>
-            <a:pPr lvl="1"/>
+            <a:pPr lvl="1" eaLnBrk="1" latinLnBrk="0" hangingPunct="1"/>
             <a:r>
               <a:rPr lang="es-ES" smtClean="0"/>
               <a:t>Segundo nivel</a:t>
             </a:r>
           </a:p>
           <a:p>
-            <a:pPr lvl="2"/>
+            <a:pPr lvl="2" eaLnBrk="1" latinLnBrk="0" hangingPunct="1"/>
             <a:r>
               <a:rPr lang="es-ES" smtClean="0"/>
               <a:t>Tercer nivel</a:t>
             </a:r>
           </a:p>
           <a:p>
-            <a:pPr lvl="3"/>
+            <a:pPr lvl="3" eaLnBrk="1" latinLnBrk="0" hangingPunct="1"/>
             <a:r>
               <a:rPr lang="es-ES" smtClean="0"/>
               <a:t>Cuarto nivel</a:t>
             </a:r>
           </a:p>
           <a:p>
-            <a:pPr lvl="4"/>
+            <a:pPr lvl="4" eaLnBrk="1" latinLnBrk="0" hangingPunct="1"/>
             <a:r>
               <a:rPr lang="es-ES" smtClean="0"/>
               <a:t>Quinto nivel</a:t>
             </a:r>
-            <a:endParaRPr lang="es-ES"/>
+            <a:endParaRPr kumimoji="0" lang="en-US"/>
           </a:p>
         </p:txBody>
       </p:sp>
@@ -1239,7 +1518,7 @@
         </p:nvSpPr>
         <p:spPr>
           <a:xfrm>
-            <a:off x="4648200" y="1600200"/>
+            <a:off x="4648200" y="1722437"/>
             <a:ext cx="4038600" cy="4525963"/>
           </a:xfrm>
         </p:spPr>
@@ -1247,7 +1526,7 @@
           <a:bodyPr/>
           <a:lstStyle>
             <a:lvl1pPr>
-              <a:defRPr sz="2800"/>
+              <a:defRPr sz="2600"/>
             </a:lvl1pPr>
             <a:lvl2pPr>
               <a:defRPr sz="2400"/>
@@ -1261,54 +1540,42 @@
             <a:lvl5pPr>
               <a:defRPr sz="1800"/>
             </a:lvl5pPr>
-            <a:lvl6pPr>
-              <a:defRPr sz="1800"/>
-            </a:lvl6pPr>
-            <a:lvl7pPr>
-              <a:defRPr sz="1800"/>
-            </a:lvl7pPr>
-            <a:lvl8pPr>
-              <a:defRPr sz="1800"/>
-            </a:lvl8pPr>
-            <a:lvl9pPr>
-              <a:defRPr sz="1800"/>
-            </a:lvl9pPr>
           </a:lstStyle>
           <a:p>
-            <a:pPr lvl="0"/>
+            <a:pPr lvl="0" eaLnBrk="1" latinLnBrk="0" hangingPunct="1"/>
             <a:r>
               <a:rPr lang="es-ES" smtClean="0"/>
               <a:t>Haga clic para modificar el estilo de texto del patrón</a:t>
             </a:r>
           </a:p>
           <a:p>
-            <a:pPr lvl="1"/>
+            <a:pPr lvl="1" eaLnBrk="1" latinLnBrk="0" hangingPunct="1"/>
             <a:r>
               <a:rPr lang="es-ES" smtClean="0"/>
               <a:t>Segundo nivel</a:t>
             </a:r>
           </a:p>
           <a:p>
-            <a:pPr lvl="2"/>
+            <a:pPr lvl="2" eaLnBrk="1" latinLnBrk="0" hangingPunct="1"/>
             <a:r>
               <a:rPr lang="es-ES" smtClean="0"/>
               <a:t>Tercer nivel</a:t>
             </a:r>
           </a:p>
           <a:p>
-            <a:pPr lvl="3"/>
+            <a:pPr lvl="3" eaLnBrk="1" latinLnBrk="0" hangingPunct="1"/>
             <a:r>
               <a:rPr lang="es-ES" smtClean="0"/>
               <a:t>Cuarto nivel</a:t>
             </a:r>
           </a:p>
           <a:p>
-            <a:pPr lvl="4"/>
+            <a:pPr lvl="4" eaLnBrk="1" latinLnBrk="0" hangingPunct="1"/>
             <a:r>
               <a:rPr lang="es-ES" smtClean="0"/>
               <a:t>Quinto nivel</a:t>
             </a:r>
-            <a:endParaRPr lang="es-ES"/>
+            <a:endParaRPr kumimoji="0" lang="en-US"/>
           </a:p>
         </p:txBody>
       </p:sp>
@@ -1322,14 +1589,19 @@
             <p:ph type="dt" sz="half" idx="10"/>
           </p:nvPr>
         </p:nvSpPr>
-        <p:spPr/>
+        <p:spPr>
+          <a:xfrm>
+            <a:off x="4791456" y="6480969"/>
+            <a:ext cx="2133600" cy="301752"/>
+          </a:xfrm>
+        </p:spPr>
         <p:txBody>
           <a:bodyPr/>
           <a:lstStyle/>
           <a:p>
             <a:fld id="{7A847CFC-816F-41D0-AAC0-9BF4FEBC753E}" type="datetimeFigureOut">
               <a:rPr lang="es-ES" smtClean="0"/>
-              <a:t>19/05/2015</a:t>
+              <a:t>21/05/2015</a:t>
             </a:fld>
             <a:endParaRPr lang="es-ES"/>
           </a:p>
@@ -1345,7 +1617,12 @@
             <p:ph type="ftr" sz="quarter" idx="11"/>
           </p:nvPr>
         </p:nvSpPr>
-        <p:spPr/>
+        <p:spPr>
+          <a:xfrm>
+            <a:off x="457200" y="6480969"/>
+            <a:ext cx="4260056" cy="301752"/>
+          </a:xfrm>
+        </p:spPr>
         <p:txBody>
           <a:bodyPr/>
           <a:lstStyle/>
@@ -1364,7 +1641,12 @@
             <p:ph type="sldNum" sz="quarter" idx="12"/>
           </p:nvPr>
         </p:nvSpPr>
-        <p:spPr/>
+        <p:spPr>
+          <a:xfrm>
+            <a:off x="7589520" y="6480969"/>
+            <a:ext cx="502920" cy="301752"/>
+          </a:xfrm>
+        </p:spPr>
         <p:txBody>
           <a:bodyPr/>
           <a:lstStyle/>
@@ -1386,8 +1668,13 @@
 </file>
 
 <file path=ppt/slideLayouts/slideLayout5.xml><?xml version="1.0" encoding="utf-8"?>
-<p:sldLayout xmlns:a="http://schemas.openxmlformats.org/drawingml/2006/main" xmlns:r="http://schemas.openxmlformats.org/officeDocument/2006/relationships" xmlns:p="http://schemas.openxmlformats.org/presentationml/2006/main" type="twoTxTwoObj" preserve="1">
+<p:sldLayout xmlns:a="http://schemas.openxmlformats.org/drawingml/2006/main" xmlns:r="http://schemas.openxmlformats.org/officeDocument/2006/relationships" xmlns:p="http://schemas.openxmlformats.org/presentationml/2006/main" showMasterSp="0" type="twoTxTwoObj" preserve="1">
   <p:cSld name="Comparación">
+    <p:bg>
+      <p:bgRef idx="1002">
+        <a:schemeClr val="bg2"/>
+      </p:bgRef>
+    </p:bg>
     <p:spTree>
       <p:nvGrpSpPr>
         <p:cNvPr id="1" name=""/>
@@ -1412,20 +1699,34 @@
             <p:ph type="title"/>
           </p:nvPr>
         </p:nvSpPr>
-        <p:spPr/>
-        <p:txBody>
-          <a:bodyPr/>
+        <p:spPr>
+          <a:xfrm>
+            <a:off x="248198" y="290732"/>
+            <a:ext cx="1066800" cy="6153912"/>
+          </a:xfrm>
+        </p:spPr>
+        <p:txBody>
+          <a:bodyPr vert="vert270" anchor="b"/>
           <a:lstStyle>
-            <a:lvl1pPr>
-              <a:defRPr/>
+            <a:lvl1pPr marL="0" algn="ctr">
+              <a:defRPr sz="3300" b="1">
+                <a:ln w="6350">
+                  <a:solidFill>
+                    <a:schemeClr val="tx1"/>
+                  </a:solidFill>
+                </a:ln>
+                <a:solidFill>
+                  <a:schemeClr val="tx1"/>
+                </a:solidFill>
+              </a:defRPr>
             </a:lvl1pPr>
           </a:lstStyle>
           <a:p>
             <a:r>
-              <a:rPr lang="es-ES" smtClean="0"/>
+              <a:rPr kumimoji="0" lang="es-ES" smtClean="0"/>
               <a:t>Haga clic para modificar el estilo de título del patrón</a:t>
             </a:r>
-            <a:endParaRPr lang="es-ES"/>
+            <a:endParaRPr kumimoji="0" lang="en-US"/>
           </a:p>
         </p:txBody>
       </p:sp>
@@ -1441,54 +1742,107 @@
         </p:nvSpPr>
         <p:spPr>
           <a:xfrm>
-            <a:off x="457200" y="1535113"/>
-            <a:ext cx="4040188" cy="639762"/>
-          </a:xfrm>
-        </p:spPr>
-        <p:txBody>
-          <a:bodyPr anchor="b"/>
+            <a:off x="1365006" y="290732"/>
+            <a:ext cx="581024" cy="3017520"/>
+          </a:xfrm>
+          <a:solidFill>
+            <a:schemeClr val="bg1"/>
+          </a:solidFill>
+          <a:ln w="12700">
+            <a:noFill/>
+          </a:ln>
+        </p:spPr>
+        <p:txBody>
+          <a:bodyPr vert="vert270" anchor="ctr"/>
           <a:lstStyle>
-            <a:lvl1pPr marL="0" indent="0">
+            <a:lvl1pPr marL="0" indent="0" algn="ctr">
               <a:buNone/>
-              <a:defRPr sz="2400" b="1"/>
+              <a:defRPr sz="1600" b="0">
+                <a:solidFill>
+                  <a:schemeClr val="tx1"/>
+                </a:solidFill>
+              </a:defRPr>
             </a:lvl1pPr>
-            <a:lvl2pPr marL="457200" indent="0">
+            <a:lvl2pPr>
               <a:buNone/>
               <a:defRPr sz="2000" b="1"/>
             </a:lvl2pPr>
-            <a:lvl3pPr marL="914400" indent="0">
+            <a:lvl3pPr>
               <a:buNone/>
               <a:defRPr sz="1800" b="1"/>
             </a:lvl3pPr>
-            <a:lvl4pPr marL="1371600" indent="0">
+            <a:lvl4pPr>
               <a:buNone/>
               <a:defRPr sz="1600" b="1"/>
             </a:lvl4pPr>
-            <a:lvl5pPr marL="1828800" indent="0">
+            <a:lvl5pPr>
               <a:buNone/>
               <a:defRPr sz="1600" b="1"/>
             </a:lvl5pPr>
-            <a:lvl6pPr marL="2286000" indent="0">
+          </a:lstStyle>
+          <a:p>
+            <a:pPr lvl="0" eaLnBrk="1" latinLnBrk="0" hangingPunct="1"/>
+            <a:r>
+              <a:rPr kumimoji="0" lang="es-ES" smtClean="0"/>
+              <a:t>Haga clic para modificar el estilo de texto del patrón</a:t>
+            </a:r>
+          </a:p>
+        </p:txBody>
+      </p:sp>
+      <p:sp>
+        <p:nvSpPr>
+          <p:cNvPr id="4" name="3 Marcador de texto"/>
+          <p:cNvSpPr>
+            <a:spLocks noGrp="1"/>
+          </p:cNvSpPr>
+          <p:nvPr>
+            <p:ph type="body" sz="half" idx="3"/>
+          </p:nvPr>
+        </p:nvSpPr>
+        <p:spPr>
+          <a:xfrm>
+            <a:off x="1365006" y="3427124"/>
+            <a:ext cx="581024" cy="3017520"/>
+          </a:xfrm>
+          <a:solidFill>
+            <a:schemeClr val="bg1"/>
+          </a:solidFill>
+          <a:ln w="12700">
+            <a:noFill/>
+          </a:ln>
+        </p:spPr>
+        <p:txBody>
+          <a:bodyPr vert="vert270" anchor="ctr"/>
+          <a:lstStyle>
+            <a:lvl1pPr marL="0" indent="0" algn="ctr">
+              <a:buNone/>
+              <a:defRPr sz="1600" b="0">
+                <a:solidFill>
+                  <a:schemeClr val="tx1"/>
+                </a:solidFill>
+              </a:defRPr>
+            </a:lvl1pPr>
+            <a:lvl2pPr>
+              <a:buNone/>
+              <a:defRPr sz="2000" b="1"/>
+            </a:lvl2pPr>
+            <a:lvl3pPr>
+              <a:buNone/>
+              <a:defRPr sz="1800" b="1"/>
+            </a:lvl3pPr>
+            <a:lvl4pPr>
               <a:buNone/>
               <a:defRPr sz="1600" b="1"/>
-            </a:lvl6pPr>
-            <a:lvl7pPr marL="2743200" indent="0">
+            </a:lvl4pPr>
+            <a:lvl5pPr>
               <a:buNone/>
               <a:defRPr sz="1600" b="1"/>
-            </a:lvl7pPr>
-            <a:lvl8pPr marL="3200400" indent="0">
-              <a:buNone/>
-              <a:defRPr sz="1600" b="1"/>
-            </a:lvl8pPr>
-            <a:lvl9pPr marL="3657600" indent="0">
-              <a:buNone/>
-              <a:defRPr sz="1600" b="1"/>
-            </a:lvl9pPr>
+            </a:lvl5pPr>
           </a:lstStyle>
           <a:p>
-            <a:pPr lvl="0"/>
-            <a:r>
-              <a:rPr lang="es-ES" smtClean="0"/>
+            <a:pPr lvl="0" eaLnBrk="1" latinLnBrk="0" hangingPunct="1"/>
+            <a:r>
+              <a:rPr kumimoji="0" lang="es-ES" smtClean="0"/>
               <a:t>Haga clic para modificar el estilo de texto del patrón</a:t>
             </a:r>
           </a:p>
@@ -1496,18 +1850,91 @@
       </p:sp>
       <p:sp>
         <p:nvSpPr>
-          <p:cNvPr id="4" name="3 Marcador de contenido"/>
-          <p:cNvSpPr>
-            <a:spLocks noGrp="1"/>
-          </p:cNvSpPr>
-          <p:nvPr>
-            <p:ph sz="half" idx="2"/>
-          </p:nvPr>
-        </p:nvSpPr>
-        <p:spPr>
-          <a:xfrm>
-            <a:off x="457200" y="2174875"/>
-            <a:ext cx="4040188" cy="3951288"/>
+          <p:cNvPr id="5" name="4 Marcador de contenido"/>
+          <p:cNvSpPr>
+            <a:spLocks noGrp="1"/>
+          </p:cNvSpPr>
+          <p:nvPr>
+            <p:ph sz="quarter" idx="2"/>
+          </p:nvPr>
+        </p:nvSpPr>
+        <p:spPr>
+          <a:xfrm>
+            <a:off x="2022230" y="290732"/>
+            <a:ext cx="6858000" cy="3017520"/>
+          </a:xfrm>
+        </p:spPr>
+        <p:txBody>
+          <a:bodyPr/>
+          <a:lstStyle>
+            <a:lvl1pPr algn="l">
+              <a:defRPr sz="2400"/>
+            </a:lvl1pPr>
+            <a:lvl2pPr algn="l">
+              <a:defRPr sz="2000"/>
+            </a:lvl2pPr>
+            <a:lvl3pPr algn="l">
+              <a:defRPr sz="1800"/>
+            </a:lvl3pPr>
+            <a:lvl4pPr algn="l">
+              <a:defRPr sz="1600"/>
+            </a:lvl4pPr>
+            <a:lvl5pPr algn="l">
+              <a:defRPr sz="1600"/>
+            </a:lvl5pPr>
+          </a:lstStyle>
+          <a:p>
+            <a:pPr lvl="0" eaLnBrk="1" latinLnBrk="0" hangingPunct="1"/>
+            <a:r>
+              <a:rPr lang="es-ES" smtClean="0"/>
+              <a:t>Haga clic para modificar el estilo de texto del patrón</a:t>
+            </a:r>
+          </a:p>
+          <a:p>
+            <a:pPr lvl="1" eaLnBrk="1" latinLnBrk="0" hangingPunct="1"/>
+            <a:r>
+              <a:rPr lang="es-ES" smtClean="0"/>
+              <a:t>Segundo nivel</a:t>
+            </a:r>
+          </a:p>
+          <a:p>
+            <a:pPr lvl="2" eaLnBrk="1" latinLnBrk="0" hangingPunct="1"/>
+            <a:r>
+              <a:rPr lang="es-ES" smtClean="0"/>
+              <a:t>Tercer nivel</a:t>
+            </a:r>
+          </a:p>
+          <a:p>
+            <a:pPr lvl="3" eaLnBrk="1" latinLnBrk="0" hangingPunct="1"/>
+            <a:r>
+              <a:rPr lang="es-ES" smtClean="0"/>
+              <a:t>Cuarto nivel</a:t>
+            </a:r>
+          </a:p>
+          <a:p>
+            <a:pPr lvl="4" eaLnBrk="1" latinLnBrk="0" hangingPunct="1"/>
+            <a:r>
+              <a:rPr lang="es-ES" smtClean="0"/>
+              <a:t>Quinto nivel</a:t>
+            </a:r>
+            <a:endParaRPr kumimoji="0" lang="en-US"/>
+          </a:p>
+        </p:txBody>
+      </p:sp>
+      <p:sp>
+        <p:nvSpPr>
+          <p:cNvPr id="6" name="5 Marcador de contenido"/>
+          <p:cNvSpPr>
+            <a:spLocks noGrp="1"/>
+          </p:cNvSpPr>
+          <p:nvPr>
+            <p:ph sz="quarter" idx="4"/>
+          </p:nvPr>
+        </p:nvSpPr>
+        <p:spPr>
+          <a:xfrm>
+            <a:off x="2022230" y="3427124"/>
+            <a:ext cx="6858000" cy="3017520"/>
           </a:xfrm>
         </p:spPr>
         <p:txBody>
@@ -1528,263 +1955,120 @@
             <a:lvl5pPr>
               <a:defRPr sz="1600"/>
             </a:lvl5pPr>
-            <a:lvl6pPr>
-              <a:defRPr sz="1600"/>
-            </a:lvl6pPr>
-            <a:lvl7pPr>
-              <a:defRPr sz="1600"/>
-            </a:lvl7pPr>
-            <a:lvl8pPr>
-              <a:defRPr sz="1600"/>
-            </a:lvl8pPr>
-            <a:lvl9pPr>
-              <a:defRPr sz="1600"/>
-            </a:lvl9pPr>
           </a:lstStyle>
           <a:p>
-            <a:pPr lvl="0"/>
+            <a:pPr lvl="0" eaLnBrk="1" latinLnBrk="0" hangingPunct="1"/>
             <a:r>
               <a:rPr lang="es-ES" smtClean="0"/>
               <a:t>Haga clic para modificar el estilo de texto del patrón</a:t>
             </a:r>
           </a:p>
           <a:p>
-            <a:pPr lvl="1"/>
+            <a:pPr lvl="1" eaLnBrk="1" latinLnBrk="0" hangingPunct="1"/>
             <a:r>
               <a:rPr lang="es-ES" smtClean="0"/>
               <a:t>Segundo nivel</a:t>
             </a:r>
           </a:p>
           <a:p>
-            <a:pPr lvl="2"/>
+            <a:pPr lvl="2" eaLnBrk="1" latinLnBrk="0" hangingPunct="1"/>
             <a:r>
               <a:rPr lang="es-ES" smtClean="0"/>
               <a:t>Tercer nivel</a:t>
             </a:r>
           </a:p>
           <a:p>
-            <a:pPr lvl="3"/>
+            <a:pPr lvl="3" eaLnBrk="1" latinLnBrk="0" hangingPunct="1"/>
             <a:r>
               <a:rPr lang="es-ES" smtClean="0"/>
               <a:t>Cuarto nivel</a:t>
             </a:r>
           </a:p>
           <a:p>
-            <a:pPr lvl="4"/>
+            <a:pPr lvl="4" eaLnBrk="1" latinLnBrk="0" hangingPunct="1"/>
             <a:r>
               <a:rPr lang="es-ES" smtClean="0"/>
               <a:t>Quinto nivel</a:t>
             </a:r>
+            <a:endParaRPr kumimoji="0" lang="en-US"/>
+          </a:p>
+        </p:txBody>
+      </p:sp>
+      <p:sp>
+        <p:nvSpPr>
+          <p:cNvPr id="7" name="6 Marcador de fecha"/>
+          <p:cNvSpPr>
+            <a:spLocks noGrp="1"/>
+          </p:cNvSpPr>
+          <p:nvPr>
+            <p:ph type="dt" sz="half" idx="10"/>
+          </p:nvPr>
+        </p:nvSpPr>
+        <p:spPr>
+          <a:xfrm>
+            <a:off x="4791456" y="6480969"/>
+            <a:ext cx="2130552" cy="301752"/>
+          </a:xfrm>
+        </p:spPr>
+        <p:txBody>
+          <a:bodyPr/>
+          <a:lstStyle/>
+          <a:p>
+            <a:fld id="{7A847CFC-816F-41D0-AAC0-9BF4FEBC753E}" type="datetimeFigureOut">
+              <a:rPr lang="es-ES" smtClean="0"/>
+              <a:t>21/05/2015</a:t>
+            </a:fld>
             <a:endParaRPr lang="es-ES"/>
           </a:p>
         </p:txBody>
       </p:sp>
       <p:sp>
         <p:nvSpPr>
-          <p:cNvPr id="5" name="4 Marcador de texto"/>
-          <p:cNvSpPr>
-            <a:spLocks noGrp="1"/>
-          </p:cNvSpPr>
-          <p:nvPr>
-            <p:ph type="body" sz="quarter" idx="3"/>
-          </p:nvPr>
-        </p:nvSpPr>
-        <p:spPr>
-          <a:xfrm>
-            <a:off x="4645025" y="1535113"/>
-            <a:ext cx="4041775" cy="639762"/>
-          </a:xfrm>
-        </p:spPr>
-        <p:txBody>
-          <a:bodyPr anchor="b"/>
-          <a:lstStyle>
-            <a:lvl1pPr marL="0" indent="0">
-              <a:buNone/>
-              <a:defRPr sz="2400" b="1"/>
-            </a:lvl1pPr>
-            <a:lvl2pPr marL="457200" indent="0">
-              <a:buNone/>
-              <a:defRPr sz="2000" b="1"/>
-            </a:lvl2pPr>
-            <a:lvl3pPr marL="914400" indent="0">
-              <a:buNone/>
-              <a:defRPr sz="1800" b="1"/>
-            </a:lvl3pPr>
-            <a:lvl4pPr marL="1371600" indent="0">
-              <a:buNone/>
-              <a:defRPr sz="1600" b="1"/>
-            </a:lvl4pPr>
-            <a:lvl5pPr marL="1828800" indent="0">
-              <a:buNone/>
-              <a:defRPr sz="1600" b="1"/>
-            </a:lvl5pPr>
-            <a:lvl6pPr marL="2286000" indent="0">
-              <a:buNone/>
-              <a:defRPr sz="1600" b="1"/>
-            </a:lvl6pPr>
-            <a:lvl7pPr marL="2743200" indent="0">
-              <a:buNone/>
-              <a:defRPr sz="1600" b="1"/>
-            </a:lvl7pPr>
-            <a:lvl8pPr marL="3200400" indent="0">
-              <a:buNone/>
-              <a:defRPr sz="1600" b="1"/>
-            </a:lvl8pPr>
-            <a:lvl9pPr marL="3657600" indent="0">
-              <a:buNone/>
-              <a:defRPr sz="1600" b="1"/>
-            </a:lvl9pPr>
-          </a:lstStyle>
-          <a:p>
-            <a:pPr lvl="0"/>
-            <a:r>
-              <a:rPr lang="es-ES" smtClean="0"/>
-              <a:t>Haga clic para modificar el estilo de texto del patrón</a:t>
-            </a:r>
-          </a:p>
-        </p:txBody>
-      </p:sp>
-      <p:sp>
-        <p:nvSpPr>
-          <p:cNvPr id="6" name="5 Marcador de contenido"/>
-          <p:cNvSpPr>
-            <a:spLocks noGrp="1"/>
-          </p:cNvSpPr>
-          <p:nvPr>
-            <p:ph sz="quarter" idx="4"/>
-          </p:nvPr>
-        </p:nvSpPr>
-        <p:spPr>
-          <a:xfrm>
-            <a:off x="4645025" y="2174875"/>
-            <a:ext cx="4041775" cy="3951288"/>
+          <p:cNvPr id="8" name="7 Marcador de pie de página"/>
+          <p:cNvSpPr>
+            <a:spLocks noGrp="1"/>
+          </p:cNvSpPr>
+          <p:nvPr>
+            <p:ph type="ftr" sz="quarter" idx="11"/>
+          </p:nvPr>
+        </p:nvSpPr>
+        <p:spPr>
+          <a:xfrm>
+            <a:off x="457200" y="6480969"/>
+            <a:ext cx="4261104" cy="301752"/>
+          </a:xfrm>
+        </p:spPr>
+        <p:txBody>
+          <a:bodyPr/>
+          <a:lstStyle/>
+          <a:p>
+            <a:endParaRPr lang="es-ES"/>
+          </a:p>
+        </p:txBody>
+      </p:sp>
+      <p:sp>
+        <p:nvSpPr>
+          <p:cNvPr id="9" name="8 Marcador de número de diapositiva"/>
+          <p:cNvSpPr>
+            <a:spLocks noGrp="1"/>
+          </p:cNvSpPr>
+          <p:nvPr>
+            <p:ph type="sldNum" sz="quarter" idx="12"/>
+          </p:nvPr>
+        </p:nvSpPr>
+        <p:spPr>
+          <a:xfrm>
+            <a:off x="7589520" y="6483096"/>
+            <a:ext cx="502920" cy="301752"/>
           </a:xfrm>
         </p:spPr>
         <p:txBody>
           <a:bodyPr/>
           <a:lstStyle>
-            <a:lvl1pPr>
-              <a:defRPr sz="2400"/>
+            <a:lvl1pPr algn="ctr">
+              <a:defRPr/>
             </a:lvl1pPr>
-            <a:lvl2pPr>
-              <a:defRPr sz="2000"/>
-            </a:lvl2pPr>
-            <a:lvl3pPr>
-              <a:defRPr sz="1800"/>
-            </a:lvl3pPr>
-            <a:lvl4pPr>
-              <a:defRPr sz="1600"/>
-            </a:lvl4pPr>
-            <a:lvl5pPr>
-              <a:defRPr sz="1600"/>
-            </a:lvl5pPr>
-            <a:lvl6pPr>
-              <a:defRPr sz="1600"/>
-            </a:lvl6pPr>
-            <a:lvl7pPr>
-              <a:defRPr sz="1600"/>
-            </a:lvl7pPr>
-            <a:lvl8pPr>
-              <a:defRPr sz="1600"/>
-            </a:lvl8pPr>
-            <a:lvl9pPr>
-              <a:defRPr sz="1600"/>
-            </a:lvl9pPr>
           </a:lstStyle>
-          <a:p>
-            <a:pPr lvl="0"/>
-            <a:r>
-              <a:rPr lang="es-ES" smtClean="0"/>
-              <a:t>Haga clic para modificar el estilo de texto del patrón</a:t>
-            </a:r>
-          </a:p>
-          <a:p>
-            <a:pPr lvl="1"/>
-            <a:r>
-              <a:rPr lang="es-ES" smtClean="0"/>
-              <a:t>Segundo nivel</a:t>
-            </a:r>
-          </a:p>
-          <a:p>
-            <a:pPr lvl="2"/>
-            <a:r>
-              <a:rPr lang="es-ES" smtClean="0"/>
-              <a:t>Tercer nivel</a:t>
-            </a:r>
-          </a:p>
-          <a:p>
-            <a:pPr lvl="3"/>
-            <a:r>
-              <a:rPr lang="es-ES" smtClean="0"/>
-              <a:t>Cuarto nivel</a:t>
-            </a:r>
-          </a:p>
-          <a:p>
-            <a:pPr lvl="4"/>
-            <a:r>
-              <a:rPr lang="es-ES" smtClean="0"/>
-              <a:t>Quinto nivel</a:t>
-            </a:r>
-            <a:endParaRPr lang="es-ES"/>
-          </a:p>
-        </p:txBody>
-      </p:sp>
-      <p:sp>
-        <p:nvSpPr>
-          <p:cNvPr id="7" name="6 Marcador de fecha"/>
-          <p:cNvSpPr>
-            <a:spLocks noGrp="1"/>
-          </p:cNvSpPr>
-          <p:nvPr>
-            <p:ph type="dt" sz="half" idx="10"/>
-          </p:nvPr>
-        </p:nvSpPr>
-        <p:spPr/>
-        <p:txBody>
-          <a:bodyPr/>
-          <a:lstStyle/>
-          <a:p>
-            <a:fld id="{7A847CFC-816F-41D0-AAC0-9BF4FEBC753E}" type="datetimeFigureOut">
-              <a:rPr lang="es-ES" smtClean="0"/>
-              <a:t>19/05/2015</a:t>
-            </a:fld>
-            <a:endParaRPr lang="es-ES"/>
-          </a:p>
-        </p:txBody>
-      </p:sp>
-      <p:sp>
-        <p:nvSpPr>
-          <p:cNvPr id="8" name="7 Marcador de pie de página"/>
-          <p:cNvSpPr>
-            <a:spLocks noGrp="1"/>
-          </p:cNvSpPr>
-          <p:nvPr>
-            <p:ph type="ftr" sz="quarter" idx="11"/>
-          </p:nvPr>
-        </p:nvSpPr>
-        <p:spPr/>
-        <p:txBody>
-          <a:bodyPr/>
-          <a:lstStyle/>
-          <a:p>
-            <a:endParaRPr lang="es-ES"/>
-          </a:p>
-        </p:txBody>
-      </p:sp>
-      <p:sp>
-        <p:nvSpPr>
-          <p:cNvPr id="9" name="8 Marcador de número de diapositiva"/>
-          <p:cNvSpPr>
-            <a:spLocks noGrp="1"/>
-          </p:cNvSpPr>
-          <p:nvPr>
-            <p:ph type="sldNum" sz="quarter" idx="12"/>
-          </p:nvPr>
-        </p:nvSpPr>
-        <p:spPr/>
-        <p:txBody>
-          <a:bodyPr/>
-          <a:lstStyle/>
           <a:p>
             <a:fld id="{132FADFE-3B8F-471C-ABF0-DBC7717ECBBC}" type="slidenum">
               <a:rPr lang="es-ES" smtClean="0"/>
@@ -1797,7 +2081,7 @@
     </p:spTree>
   </p:cSld>
   <p:clrMapOvr>
-    <a:masterClrMapping/>
+    <a:overrideClrMapping bg1="dk1" tx1="lt1" bg2="dk2" tx2="lt2" accent1="accent1" accent2="accent2" accent3="accent3" accent4="accent4" accent5="accent5" accent6="accent6" hlink="hlink" folHlink="folHlink"/>
   </p:clrMapOvr>
 </p:sldLayout>
 </file>
@@ -1832,13 +2116,17 @@
         <p:spPr/>
         <p:txBody>
           <a:bodyPr/>
-          <a:lstStyle/>
-          <a:p>
-            <a:r>
-              <a:rPr lang="es-ES" smtClean="0"/>
+          <a:lstStyle>
+            <a:lvl1pPr>
+              <a:defRPr b="0"/>
+            </a:lvl1pPr>
+          </a:lstStyle>
+          <a:p>
+            <a:r>
+              <a:rPr kumimoji="0" lang="es-ES" smtClean="0"/>
               <a:t>Haga clic para modificar el estilo de título del patrón</a:t>
             </a:r>
-            <a:endParaRPr lang="es-ES"/>
+            <a:endParaRPr kumimoji="0" lang="en-US"/>
           </a:p>
         </p:txBody>
       </p:sp>
@@ -1859,7 +2147,7 @@
           <a:p>
             <a:fld id="{7A847CFC-816F-41D0-AAC0-9BF4FEBC753E}" type="datetimeFigureOut">
               <a:rPr lang="es-ES" smtClean="0"/>
-              <a:t>19/05/2015</a:t>
+              <a:t>21/05/2015</a:t>
             </a:fld>
             <a:endParaRPr lang="es-ES"/>
           </a:p>
@@ -1942,14 +2230,19 @@
             <p:ph type="dt" sz="half" idx="10"/>
           </p:nvPr>
         </p:nvSpPr>
-        <p:spPr/>
+        <p:spPr>
+          <a:xfrm>
+            <a:off x="4791456" y="6480969"/>
+            <a:ext cx="2133600" cy="301752"/>
+          </a:xfrm>
+        </p:spPr>
         <p:txBody>
           <a:bodyPr/>
           <a:lstStyle/>
           <a:p>
             <a:fld id="{7A847CFC-816F-41D0-AAC0-9BF4FEBC753E}" type="datetimeFigureOut">
               <a:rPr lang="es-ES" smtClean="0"/>
-              <a:t>19/05/2015</a:t>
+              <a:t>21/05/2015</a:t>
             </a:fld>
             <a:endParaRPr lang="es-ES"/>
           </a:p>
@@ -1965,7 +2258,12 @@
             <p:ph type="ftr" sz="quarter" idx="11"/>
           </p:nvPr>
         </p:nvSpPr>
-        <p:spPr/>
+        <p:spPr>
+          <a:xfrm>
+            <a:off x="457200" y="6481890"/>
+            <a:ext cx="4260056" cy="300831"/>
+          </a:xfrm>
+        </p:spPr>
         <p:txBody>
           <a:bodyPr/>
           <a:lstStyle/>
@@ -1984,7 +2282,12 @@
             <p:ph type="sldNum" sz="quarter" idx="12"/>
           </p:nvPr>
         </p:nvSpPr>
-        <p:spPr/>
+        <p:spPr>
+          <a:xfrm>
+            <a:off x="7589520" y="6480969"/>
+            <a:ext cx="502920" cy="301752"/>
+          </a:xfrm>
+        </p:spPr>
         <p:txBody>
           <a:bodyPr/>
           <a:lstStyle/>
@@ -2006,8 +2309,13 @@
 </file>
 
 <file path=ppt/slideLayouts/slideLayout8.xml><?xml version="1.0" encoding="utf-8"?>
-<p:sldLayout xmlns:a="http://schemas.openxmlformats.org/drawingml/2006/main" xmlns:r="http://schemas.openxmlformats.org/officeDocument/2006/relationships" xmlns:p="http://schemas.openxmlformats.org/presentationml/2006/main" type="objTx" preserve="1">
+<p:sldLayout xmlns:a="http://schemas.openxmlformats.org/drawingml/2006/main" xmlns:r="http://schemas.openxmlformats.org/officeDocument/2006/relationships" xmlns:p="http://schemas.openxmlformats.org/presentationml/2006/main" showMasterSp="0" type="objTx" preserve="1">
   <p:cSld name="Contenido con título">
+    <p:bg>
+      <p:bgRef idx="1002">
+        <a:schemeClr val="bg2"/>
+      </p:bgRef>
+    </p:bg>
     <p:spTree>
       <p:nvGrpSpPr>
         <p:cNvPr id="1" name=""/>
@@ -2034,50 +2342,109 @@
         </p:nvSpPr>
         <p:spPr>
           <a:xfrm>
-            <a:off x="457200" y="273050"/>
-            <a:ext cx="3008313" cy="1162050"/>
-          </a:xfrm>
-        </p:spPr>
-        <p:txBody>
-          <a:bodyPr anchor="b"/>
+            <a:off x="219456" y="367664"/>
+            <a:ext cx="914400" cy="5943600"/>
+          </a:xfrm>
+        </p:spPr>
+        <p:txBody>
+          <a:bodyPr vert="vert270" anchor="b"/>
           <a:lstStyle>
-            <a:lvl1pPr algn="l">
-              <a:defRPr sz="2000" b="1"/>
+            <a:lvl1pPr marL="0" marR="18288" algn="r">
+              <a:spcBef>
+                <a:spcPts val="0"/>
+              </a:spcBef>
+              <a:buNone/>
+              <a:defRPr sz="2900" b="0" cap="all" baseline="0"/>
             </a:lvl1pPr>
           </a:lstStyle>
           <a:p>
             <a:r>
-              <a:rPr lang="es-ES" smtClean="0"/>
+              <a:rPr kumimoji="0" lang="es-ES" smtClean="0"/>
               <a:t>Haga clic para modificar el estilo de título del patrón</a:t>
             </a:r>
-            <a:endParaRPr lang="es-ES"/>
-          </a:p>
-        </p:txBody>
-      </p:sp>
-      <p:sp>
-        <p:nvSpPr>
-          <p:cNvPr id="3" name="2 Marcador de contenido"/>
-          <p:cNvSpPr>
-            <a:spLocks noGrp="1"/>
-          </p:cNvSpPr>
-          <p:nvPr>
-            <p:ph idx="1"/>
-          </p:nvPr>
-        </p:nvSpPr>
-        <p:spPr>
-          <a:xfrm>
-            <a:off x="3575050" y="273050"/>
-            <a:ext cx="5111750" cy="5853113"/>
+            <a:endParaRPr kumimoji="0" lang="en-US"/>
+          </a:p>
+        </p:txBody>
+      </p:sp>
+      <p:sp>
+        <p:nvSpPr>
+          <p:cNvPr id="3" name="2 Marcador de texto"/>
+          <p:cNvSpPr>
+            <a:spLocks noGrp="1"/>
+          </p:cNvSpPr>
+          <p:nvPr>
+            <p:ph type="body" idx="2"/>
+          </p:nvPr>
+        </p:nvSpPr>
+        <p:spPr>
+          <a:xfrm>
+            <a:off x="1135856" y="367664"/>
+            <a:ext cx="2438400" cy="5943600"/>
+          </a:xfrm>
+        </p:spPr>
+        <p:txBody>
+          <a:bodyPr anchor="t"/>
+          <a:lstStyle>
+            <a:lvl1pPr marL="0" indent="0">
+              <a:spcBef>
+                <a:spcPts val="0"/>
+              </a:spcBef>
+              <a:buNone/>
+              <a:defRPr sz="1400"/>
+            </a:lvl1pPr>
+            <a:lvl2pPr>
+              <a:buNone/>
+              <a:defRPr sz="1200"/>
+            </a:lvl2pPr>
+            <a:lvl3pPr>
+              <a:buNone/>
+              <a:defRPr sz="1000"/>
+            </a:lvl3pPr>
+            <a:lvl4pPr>
+              <a:buNone/>
+              <a:defRPr sz="900"/>
+            </a:lvl4pPr>
+            <a:lvl5pPr>
+              <a:buNone/>
+              <a:defRPr sz="900"/>
+            </a:lvl5pPr>
+          </a:lstStyle>
+          <a:p>
+            <a:pPr lvl="0" eaLnBrk="1" latinLnBrk="0" hangingPunct="1"/>
+            <a:r>
+              <a:rPr kumimoji="0" lang="es-ES" smtClean="0"/>
+              <a:t>Haga clic para modificar el estilo de texto del patrón</a:t>
+            </a:r>
+          </a:p>
+        </p:txBody>
+      </p:sp>
+      <p:sp>
+        <p:nvSpPr>
+          <p:cNvPr id="4" name="3 Marcador de contenido"/>
+          <p:cNvSpPr>
+            <a:spLocks noGrp="1"/>
+          </p:cNvSpPr>
+          <p:nvPr>
+            <p:ph sz="half" idx="1"/>
+          </p:nvPr>
+        </p:nvSpPr>
+        <p:spPr>
+          <a:xfrm>
+            <a:off x="3651250" y="320040"/>
+            <a:ext cx="5276088" cy="5989320"/>
           </a:xfrm>
         </p:spPr>
         <p:txBody>
           <a:bodyPr/>
           <a:lstStyle>
             <a:lvl1pPr>
-              <a:defRPr sz="3200"/>
+              <a:spcBef>
+                <a:spcPts val="0"/>
+              </a:spcBef>
+              <a:defRPr sz="3000"/>
             </a:lvl1pPr>
             <a:lvl2pPr>
-              <a:defRPr sz="2800"/>
+              <a:defRPr sz="2600"/>
             </a:lvl2pPr>
             <a:lvl3pPr>
               <a:defRPr sz="2400"/>
@@ -2088,140 +2455,72 @@
             <a:lvl5pPr>
               <a:defRPr sz="2000"/>
             </a:lvl5pPr>
-            <a:lvl6pPr>
-              <a:defRPr sz="2000"/>
-            </a:lvl6pPr>
-            <a:lvl7pPr>
-              <a:defRPr sz="2000"/>
-            </a:lvl7pPr>
-            <a:lvl8pPr>
-              <a:defRPr sz="2000"/>
-            </a:lvl8pPr>
-            <a:lvl9pPr>
-              <a:defRPr sz="2000"/>
-            </a:lvl9pPr>
           </a:lstStyle>
           <a:p>
-            <a:pPr lvl="0"/>
+            <a:pPr lvl="0" eaLnBrk="1" latinLnBrk="0" hangingPunct="1"/>
             <a:r>
               <a:rPr lang="es-ES" smtClean="0"/>
               <a:t>Haga clic para modificar el estilo de texto del patrón</a:t>
             </a:r>
           </a:p>
           <a:p>
-            <a:pPr lvl="1"/>
+            <a:pPr lvl="1" eaLnBrk="1" latinLnBrk="0" hangingPunct="1"/>
             <a:r>
               <a:rPr lang="es-ES" smtClean="0"/>
               <a:t>Segundo nivel</a:t>
             </a:r>
           </a:p>
           <a:p>
-            <a:pPr lvl="2"/>
+            <a:pPr lvl="2" eaLnBrk="1" latinLnBrk="0" hangingPunct="1"/>
             <a:r>
               <a:rPr lang="es-ES" smtClean="0"/>
               <a:t>Tercer nivel</a:t>
             </a:r>
           </a:p>
           <a:p>
-            <a:pPr lvl="3"/>
+            <a:pPr lvl="3" eaLnBrk="1" latinLnBrk="0" hangingPunct="1"/>
             <a:r>
               <a:rPr lang="es-ES" smtClean="0"/>
               <a:t>Cuarto nivel</a:t>
             </a:r>
           </a:p>
           <a:p>
-            <a:pPr lvl="4"/>
+            <a:pPr lvl="4" eaLnBrk="1" latinLnBrk="0" hangingPunct="1"/>
             <a:r>
               <a:rPr lang="es-ES" smtClean="0"/>
               <a:t>Quinto nivel</a:t>
             </a:r>
-            <a:endParaRPr lang="es-ES"/>
-          </a:p>
-        </p:txBody>
-      </p:sp>
-      <p:sp>
-        <p:nvSpPr>
-          <p:cNvPr id="4" name="3 Marcador de texto"/>
-          <p:cNvSpPr>
-            <a:spLocks noGrp="1"/>
-          </p:cNvSpPr>
-          <p:nvPr>
-            <p:ph type="body" sz="half" idx="2"/>
-          </p:nvPr>
-        </p:nvSpPr>
-        <p:spPr>
-          <a:xfrm>
-            <a:off x="457200" y="1435100"/>
-            <a:ext cx="3008313" cy="4691063"/>
+            <a:endParaRPr kumimoji="0" lang="en-US"/>
+          </a:p>
+        </p:txBody>
+      </p:sp>
+      <p:sp>
+        <p:nvSpPr>
+          <p:cNvPr id="5" name="4 Marcador de fecha"/>
+          <p:cNvSpPr>
+            <a:spLocks noGrp="1"/>
+          </p:cNvSpPr>
+          <p:nvPr>
+            <p:ph type="dt" sz="half" idx="10"/>
+          </p:nvPr>
+        </p:nvSpPr>
+        <p:spPr>
+          <a:xfrm>
+            <a:off x="6278976" y="6556248"/>
+            <a:ext cx="2133600" cy="301752"/>
           </a:xfrm>
         </p:spPr>
         <p:txBody>
           <a:bodyPr/>
           <a:lstStyle>
-            <a:lvl1pPr marL="0" indent="0">
-              <a:buNone/>
-              <a:defRPr sz="1400"/>
+            <a:lvl1pPr>
+              <a:defRPr sz="900"/>
             </a:lvl1pPr>
-            <a:lvl2pPr marL="457200" indent="0">
-              <a:buNone/>
-              <a:defRPr sz="1200"/>
-            </a:lvl2pPr>
-            <a:lvl3pPr marL="914400" indent="0">
-              <a:buNone/>
-              <a:defRPr sz="1000"/>
-            </a:lvl3pPr>
-            <a:lvl4pPr marL="1371600" indent="0">
-              <a:buNone/>
-              <a:defRPr sz="900"/>
-            </a:lvl4pPr>
-            <a:lvl5pPr marL="1828800" indent="0">
-              <a:buNone/>
-              <a:defRPr sz="900"/>
-            </a:lvl5pPr>
-            <a:lvl6pPr marL="2286000" indent="0">
-              <a:buNone/>
-              <a:defRPr sz="900"/>
-            </a:lvl6pPr>
-            <a:lvl7pPr marL="2743200" indent="0">
-              <a:buNone/>
-              <a:defRPr sz="900"/>
-            </a:lvl7pPr>
-            <a:lvl8pPr marL="3200400" indent="0">
-              <a:buNone/>
-              <a:defRPr sz="900"/>
-            </a:lvl8pPr>
-            <a:lvl9pPr marL="3657600" indent="0">
-              <a:buNone/>
-              <a:defRPr sz="900"/>
-            </a:lvl9pPr>
           </a:lstStyle>
           <a:p>
-            <a:pPr lvl="0"/>
-            <a:r>
-              <a:rPr lang="es-ES" smtClean="0"/>
-              <a:t>Haga clic para modificar el estilo de texto del patrón</a:t>
-            </a:r>
-          </a:p>
-        </p:txBody>
-      </p:sp>
-      <p:sp>
-        <p:nvSpPr>
-          <p:cNvPr id="5" name="4 Marcador de fecha"/>
-          <p:cNvSpPr>
-            <a:spLocks noGrp="1"/>
-          </p:cNvSpPr>
-          <p:nvPr>
-            <p:ph type="dt" sz="half" idx="10"/>
-          </p:nvPr>
-        </p:nvSpPr>
-        <p:spPr/>
-        <p:txBody>
-          <a:bodyPr/>
-          <a:lstStyle/>
-          <a:p>
             <a:fld id="{7A847CFC-816F-41D0-AAC0-9BF4FEBC753E}" type="datetimeFigureOut">
               <a:rPr lang="es-ES" smtClean="0"/>
-              <a:t>19/05/2015</a:t>
+              <a:t>21/05/2015</a:t>
             </a:fld>
             <a:endParaRPr lang="es-ES"/>
           </a:p>
@@ -2237,10 +2536,19 @@
             <p:ph type="ftr" sz="quarter" idx="11"/>
           </p:nvPr>
         </p:nvSpPr>
-        <p:spPr/>
+        <p:spPr>
+          <a:xfrm>
+            <a:off x="1135856" y="6556248"/>
+            <a:ext cx="5143120" cy="301752"/>
+          </a:xfrm>
+        </p:spPr>
         <p:txBody>
           <a:bodyPr/>
-          <a:lstStyle/>
+          <a:lstStyle>
+            <a:lvl1pPr>
+              <a:defRPr sz="900"/>
+            </a:lvl1pPr>
+          </a:lstStyle>
           <a:p>
             <a:endParaRPr lang="es-ES"/>
           </a:p>
@@ -2256,10 +2564,19 @@
             <p:ph type="sldNum" sz="quarter" idx="12"/>
           </p:nvPr>
         </p:nvSpPr>
-        <p:spPr/>
+        <p:spPr>
+          <a:xfrm>
+            <a:off x="8410576" y="6556248"/>
+            <a:ext cx="502920" cy="301752"/>
+          </a:xfrm>
+        </p:spPr>
         <p:txBody>
           <a:bodyPr/>
-          <a:lstStyle/>
+          <a:lstStyle>
+            <a:lvl1pPr>
+              <a:defRPr sz="900"/>
+            </a:lvl1pPr>
+          </a:lstStyle>
           <a:p>
             <a:fld id="{132FADFE-3B8F-471C-ABF0-DBC7717ECBBC}" type="slidenum">
               <a:rPr lang="es-ES" smtClean="0"/>
@@ -2272,264 +2589,16 @@
     </p:spTree>
   </p:cSld>
   <p:clrMapOvr>
-    <a:masterClrMapping/>
+    <a:overrideClrMapping bg1="dk1" tx1="lt1" bg2="dk2" tx2="lt2" accent1="accent1" accent2="accent2" accent3="accent3" accent4="accent4" accent5="accent5" accent6="accent6" hlink="hlink" folHlink="folHlink"/>
   </p:clrMapOvr>
 </p:sldLayout>
 </file>
 
 <file path=ppt/slideLayouts/slideLayout9.xml><?xml version="1.0" encoding="utf-8"?>
-<p:sldLayout xmlns:a="http://schemas.openxmlformats.org/drawingml/2006/main" xmlns:r="http://schemas.openxmlformats.org/officeDocument/2006/relationships" xmlns:p="http://schemas.openxmlformats.org/presentationml/2006/main" type="picTx" preserve="1">
+<p:sldLayout xmlns:a="http://schemas.openxmlformats.org/drawingml/2006/main" xmlns:r="http://schemas.openxmlformats.org/officeDocument/2006/relationships" xmlns:p="http://schemas.openxmlformats.org/presentationml/2006/main" showMasterSp="0" type="picTx" preserve="1">
   <p:cSld name="Imagen con título">
-    <p:spTree>
-      <p:nvGrpSpPr>
-        <p:cNvPr id="1" name=""/>
-        <p:cNvGrpSpPr/>
-        <p:nvPr/>
-      </p:nvGrpSpPr>
-      <p:grpSpPr>
-        <a:xfrm>
-          <a:off x="0" y="0"/>
-          <a:ext cx="0" cy="0"/>
-          <a:chOff x="0" y="0"/>
-          <a:chExt cx="0" cy="0"/>
-        </a:xfrm>
-      </p:grpSpPr>
-      <p:sp>
-        <p:nvSpPr>
-          <p:cNvPr id="2" name="1 Título"/>
-          <p:cNvSpPr>
-            <a:spLocks noGrp="1"/>
-          </p:cNvSpPr>
-          <p:nvPr>
-            <p:ph type="title"/>
-          </p:nvPr>
-        </p:nvSpPr>
-        <p:spPr>
-          <a:xfrm>
-            <a:off x="1792288" y="4800600"/>
-            <a:ext cx="5486400" cy="566738"/>
-          </a:xfrm>
-        </p:spPr>
-        <p:txBody>
-          <a:bodyPr anchor="b"/>
-          <a:lstStyle>
-            <a:lvl1pPr algn="l">
-              <a:defRPr sz="2000" b="1"/>
-            </a:lvl1pPr>
-          </a:lstStyle>
-          <a:p>
-            <a:r>
-              <a:rPr lang="es-ES" smtClean="0"/>
-              <a:t>Haga clic para modificar el estilo de título del patrón</a:t>
-            </a:r>
-            <a:endParaRPr lang="es-ES"/>
-          </a:p>
-        </p:txBody>
-      </p:sp>
-      <p:sp>
-        <p:nvSpPr>
-          <p:cNvPr id="3" name="2 Marcador de posición de imagen"/>
-          <p:cNvSpPr>
-            <a:spLocks noGrp="1"/>
-          </p:cNvSpPr>
-          <p:nvPr>
-            <p:ph type="pic" idx="1"/>
-          </p:nvPr>
-        </p:nvSpPr>
-        <p:spPr>
-          <a:xfrm>
-            <a:off x="1792288" y="612775"/>
-            <a:ext cx="5486400" cy="4114800"/>
-          </a:xfrm>
-        </p:spPr>
-        <p:txBody>
-          <a:bodyPr/>
-          <a:lstStyle>
-            <a:lvl1pPr marL="0" indent="0">
-              <a:buNone/>
-              <a:defRPr sz="3200"/>
-            </a:lvl1pPr>
-            <a:lvl2pPr marL="457200" indent="0">
-              <a:buNone/>
-              <a:defRPr sz="2800"/>
-            </a:lvl2pPr>
-            <a:lvl3pPr marL="914400" indent="0">
-              <a:buNone/>
-              <a:defRPr sz="2400"/>
-            </a:lvl3pPr>
-            <a:lvl4pPr marL="1371600" indent="0">
-              <a:buNone/>
-              <a:defRPr sz="2000"/>
-            </a:lvl4pPr>
-            <a:lvl5pPr marL="1828800" indent="0">
-              <a:buNone/>
-              <a:defRPr sz="2000"/>
-            </a:lvl5pPr>
-            <a:lvl6pPr marL="2286000" indent="0">
-              <a:buNone/>
-              <a:defRPr sz="2000"/>
-            </a:lvl6pPr>
-            <a:lvl7pPr marL="2743200" indent="0">
-              <a:buNone/>
-              <a:defRPr sz="2000"/>
-            </a:lvl7pPr>
-            <a:lvl8pPr marL="3200400" indent="0">
-              <a:buNone/>
-              <a:defRPr sz="2000"/>
-            </a:lvl8pPr>
-            <a:lvl9pPr marL="3657600" indent="0">
-              <a:buNone/>
-              <a:defRPr sz="2000"/>
-            </a:lvl9pPr>
-          </a:lstStyle>
-          <a:p>
-            <a:endParaRPr lang="es-ES"/>
-          </a:p>
-        </p:txBody>
-      </p:sp>
-      <p:sp>
-        <p:nvSpPr>
-          <p:cNvPr id="4" name="3 Marcador de texto"/>
-          <p:cNvSpPr>
-            <a:spLocks noGrp="1"/>
-          </p:cNvSpPr>
-          <p:nvPr>
-            <p:ph type="body" sz="half" idx="2"/>
-          </p:nvPr>
-        </p:nvSpPr>
-        <p:spPr>
-          <a:xfrm>
-            <a:off x="1792288" y="5367338"/>
-            <a:ext cx="5486400" cy="804862"/>
-          </a:xfrm>
-        </p:spPr>
-        <p:txBody>
-          <a:bodyPr/>
-          <a:lstStyle>
-            <a:lvl1pPr marL="0" indent="0">
-              <a:buNone/>
-              <a:defRPr sz="1400"/>
-            </a:lvl1pPr>
-            <a:lvl2pPr marL="457200" indent="0">
-              <a:buNone/>
-              <a:defRPr sz="1200"/>
-            </a:lvl2pPr>
-            <a:lvl3pPr marL="914400" indent="0">
-              <a:buNone/>
-              <a:defRPr sz="1000"/>
-            </a:lvl3pPr>
-            <a:lvl4pPr marL="1371600" indent="0">
-              <a:buNone/>
-              <a:defRPr sz="900"/>
-            </a:lvl4pPr>
-            <a:lvl5pPr marL="1828800" indent="0">
-              <a:buNone/>
-              <a:defRPr sz="900"/>
-            </a:lvl5pPr>
-            <a:lvl6pPr marL="2286000" indent="0">
-              <a:buNone/>
-              <a:defRPr sz="900"/>
-            </a:lvl6pPr>
-            <a:lvl7pPr marL="2743200" indent="0">
-              <a:buNone/>
-              <a:defRPr sz="900"/>
-            </a:lvl7pPr>
-            <a:lvl8pPr marL="3200400" indent="0">
-              <a:buNone/>
-              <a:defRPr sz="900"/>
-            </a:lvl8pPr>
-            <a:lvl9pPr marL="3657600" indent="0">
-              <a:buNone/>
-              <a:defRPr sz="900"/>
-            </a:lvl9pPr>
-          </a:lstStyle>
-          <a:p>
-            <a:pPr lvl="0"/>
-            <a:r>
-              <a:rPr lang="es-ES" smtClean="0"/>
-              <a:t>Haga clic para modificar el estilo de texto del patrón</a:t>
-            </a:r>
-          </a:p>
-        </p:txBody>
-      </p:sp>
-      <p:sp>
-        <p:nvSpPr>
-          <p:cNvPr id="5" name="4 Marcador de fecha"/>
-          <p:cNvSpPr>
-            <a:spLocks noGrp="1"/>
-          </p:cNvSpPr>
-          <p:nvPr>
-            <p:ph type="dt" sz="half" idx="10"/>
-          </p:nvPr>
-        </p:nvSpPr>
-        <p:spPr/>
-        <p:txBody>
-          <a:bodyPr/>
-          <a:lstStyle/>
-          <a:p>
-            <a:fld id="{7A847CFC-816F-41D0-AAC0-9BF4FEBC753E}" type="datetimeFigureOut">
-              <a:rPr lang="es-ES" smtClean="0"/>
-              <a:t>19/05/2015</a:t>
-            </a:fld>
-            <a:endParaRPr lang="es-ES"/>
-          </a:p>
-        </p:txBody>
-      </p:sp>
-      <p:sp>
-        <p:nvSpPr>
-          <p:cNvPr id="6" name="5 Marcador de pie de página"/>
-          <p:cNvSpPr>
-            <a:spLocks noGrp="1"/>
-          </p:cNvSpPr>
-          <p:nvPr>
-            <p:ph type="ftr" sz="quarter" idx="11"/>
-          </p:nvPr>
-        </p:nvSpPr>
-        <p:spPr/>
-        <p:txBody>
-          <a:bodyPr/>
-          <a:lstStyle/>
-          <a:p>
-            <a:endParaRPr lang="es-ES"/>
-          </a:p>
-        </p:txBody>
-      </p:sp>
-      <p:sp>
-        <p:nvSpPr>
-          <p:cNvPr id="7" name="6 Marcador de número de diapositiva"/>
-          <p:cNvSpPr>
-            <a:spLocks noGrp="1"/>
-          </p:cNvSpPr>
-          <p:nvPr>
-            <p:ph type="sldNum" sz="quarter" idx="12"/>
-          </p:nvPr>
-        </p:nvSpPr>
-        <p:spPr/>
-        <p:txBody>
-          <a:bodyPr/>
-          <a:lstStyle/>
-          <a:p>
-            <a:fld id="{132FADFE-3B8F-471C-ABF0-DBC7717ECBBC}" type="slidenum">
-              <a:rPr lang="es-ES" smtClean="0"/>
-              <a:t>‹Nº›</a:t>
-            </a:fld>
-            <a:endParaRPr lang="es-ES"/>
-          </a:p>
-        </p:txBody>
-      </p:sp>
-    </p:spTree>
-  </p:cSld>
-  <p:clrMapOvr>
-    <a:masterClrMapping/>
-  </p:clrMapOvr>
-</p:sldLayout>
-</file>
-
-<file path=ppt/slideMasters/slideMaster1.xml><?xml version="1.0" encoding="utf-8"?>
-<p:sldMaster xmlns:a="http://schemas.openxmlformats.org/drawingml/2006/main" xmlns:r="http://schemas.openxmlformats.org/officeDocument/2006/relationships" xmlns:p="http://schemas.openxmlformats.org/presentationml/2006/main">
-  <p:cSld>
     <p:bg>
-      <p:bgRef idx="1001">
+      <p:bgRef idx="1002">
         <a:schemeClr val="bg1"/>
       </p:bgRef>
     </p:bg>
@@ -2549,7 +2618,7 @@
       </p:grpSpPr>
       <p:sp>
         <p:nvSpPr>
-          <p:cNvPr id="2" name="1 Marcador de título"/>
+          <p:cNvPr id="2" name="1 Título"/>
           <p:cNvSpPr>
             <a:spLocks noGrp="1"/>
           </p:cNvSpPr>
@@ -2559,30 +2628,430 @@
         </p:nvSpPr>
         <p:spPr>
           <a:xfrm>
-            <a:off x="457200" y="274638"/>
-            <a:ext cx="8229600" cy="1143000"/>
+            <a:off x="219456" y="150896"/>
+            <a:ext cx="914400" cy="6400800"/>
+          </a:xfrm>
+        </p:spPr>
+        <p:txBody>
+          <a:bodyPr vert="vert270" anchor="b"/>
+          <a:lstStyle>
+            <a:lvl1pPr marL="0" algn="l">
+              <a:buNone/>
+              <a:defRPr sz="3000" b="0" cap="all" baseline="0"/>
+            </a:lvl1pPr>
+          </a:lstStyle>
+          <a:p>
+            <a:r>
+              <a:rPr kumimoji="0" lang="es-ES" smtClean="0"/>
+              <a:t>Haga clic para modificar el estilo de título del patrón</a:t>
+            </a:r>
+            <a:endParaRPr kumimoji="0" lang="en-US"/>
+          </a:p>
+        </p:txBody>
+      </p:sp>
+      <p:sp>
+        <p:nvSpPr>
+          <p:cNvPr id="3" name="2 Marcador de posición de imagen"/>
+          <p:cNvSpPr>
+            <a:spLocks noGrp="1"/>
+          </p:cNvSpPr>
+          <p:nvPr>
+            <p:ph type="pic" idx="1"/>
+          </p:nvPr>
+        </p:nvSpPr>
+        <p:spPr>
+          <a:xfrm>
+            <a:off x="1138237" y="373966"/>
+            <a:ext cx="7333488" cy="5486400"/>
+          </a:xfrm>
+          <a:solidFill>
+            <a:schemeClr val="bg2">
+              <a:shade val="50000"/>
+            </a:schemeClr>
+          </a:solidFill>
+        </p:spPr>
+        <p:txBody>
+          <a:bodyPr/>
+          <a:lstStyle>
+            <a:lvl1pPr marL="0" indent="0">
+              <a:buNone/>
+              <a:defRPr sz="3200"/>
+            </a:lvl1pPr>
+          </a:lstStyle>
+          <a:p>
+            <a:r>
+              <a:rPr kumimoji="0" lang="es-ES" smtClean="0"/>
+              <a:t>Haga clic en el icono para agregar una imagen</a:t>
+            </a:r>
+            <a:endParaRPr kumimoji="0" lang="en-US" dirty="0"/>
+          </a:p>
+        </p:txBody>
+      </p:sp>
+      <p:sp>
+        <p:nvSpPr>
+          <p:cNvPr id="4" name="3 Marcador de texto"/>
+          <p:cNvSpPr>
+            <a:spLocks noGrp="1"/>
+          </p:cNvSpPr>
+          <p:nvPr>
+            <p:ph type="body" sz="half" idx="2"/>
+          </p:nvPr>
+        </p:nvSpPr>
+        <p:spPr>
+          <a:xfrm>
+            <a:off x="1143000" y="5867400"/>
+            <a:ext cx="7333488" cy="685800"/>
+          </a:xfrm>
+          <a:solidFill>
+            <a:schemeClr val="accent1">
+              <a:alpha val="15000"/>
+            </a:schemeClr>
+          </a:solidFill>
+          <a:ln>
+            <a:solidFill>
+              <a:schemeClr val="accent1"/>
+            </a:solidFill>
+            <a:miter lim="800000"/>
+          </a:ln>
+        </p:spPr>
+        <p:txBody>
+          <a:bodyPr/>
+          <a:lstStyle>
+            <a:lvl1pPr marL="0" indent="0">
+              <a:spcBef>
+                <a:spcPts val="0"/>
+              </a:spcBef>
+              <a:buNone/>
+              <a:defRPr sz="1400"/>
+            </a:lvl1pPr>
+            <a:lvl2pPr>
+              <a:defRPr sz="1200"/>
+            </a:lvl2pPr>
+            <a:lvl3pPr>
+              <a:defRPr sz="1000"/>
+            </a:lvl3pPr>
+            <a:lvl4pPr>
+              <a:defRPr sz="900"/>
+            </a:lvl4pPr>
+            <a:lvl5pPr>
+              <a:defRPr sz="900"/>
+            </a:lvl5pPr>
+          </a:lstStyle>
+          <a:p>
+            <a:pPr lvl="0" eaLnBrk="1" latinLnBrk="0" hangingPunct="1"/>
+            <a:r>
+              <a:rPr kumimoji="0" lang="es-ES" smtClean="0"/>
+              <a:t>Haga clic para modificar el estilo de texto del patrón</a:t>
+            </a:r>
+          </a:p>
+        </p:txBody>
+      </p:sp>
+      <p:sp>
+        <p:nvSpPr>
+          <p:cNvPr id="5" name="4 Marcador de fecha"/>
+          <p:cNvSpPr>
+            <a:spLocks noGrp="1"/>
+          </p:cNvSpPr>
+          <p:nvPr>
+            <p:ph type="dt" sz="half" idx="10"/>
+          </p:nvPr>
+        </p:nvSpPr>
+        <p:spPr>
+          <a:xfrm>
+            <a:off x="6108192" y="6556248"/>
+            <a:ext cx="2103120" cy="301752"/>
+          </a:xfrm>
+        </p:spPr>
+        <p:txBody>
+          <a:bodyPr/>
+          <a:lstStyle>
+            <a:lvl1pPr>
+              <a:defRPr sz="900"/>
+            </a:lvl1pPr>
+          </a:lstStyle>
+          <a:p>
+            <a:fld id="{7A847CFC-816F-41D0-AAC0-9BF4FEBC753E}" type="datetimeFigureOut">
+              <a:rPr lang="es-ES" smtClean="0"/>
+              <a:t>21/05/2015</a:t>
+            </a:fld>
+            <a:endParaRPr lang="es-ES"/>
+          </a:p>
+        </p:txBody>
+      </p:sp>
+      <p:sp>
+        <p:nvSpPr>
+          <p:cNvPr id="6" name="5 Marcador de pie de página"/>
+          <p:cNvSpPr>
+            <a:spLocks noGrp="1"/>
+          </p:cNvSpPr>
+          <p:nvPr>
+            <p:ph type="ftr" sz="quarter" idx="11"/>
+          </p:nvPr>
+        </p:nvSpPr>
+        <p:spPr>
+          <a:xfrm>
+            <a:off x="1170432" y="6557169"/>
+            <a:ext cx="4948072" cy="301752"/>
+          </a:xfrm>
+        </p:spPr>
+        <p:txBody>
+          <a:bodyPr/>
+          <a:lstStyle>
+            <a:lvl1pPr>
+              <a:defRPr sz="900"/>
+            </a:lvl1pPr>
+          </a:lstStyle>
+          <a:p>
+            <a:endParaRPr lang="es-ES"/>
+          </a:p>
+        </p:txBody>
+      </p:sp>
+      <p:sp>
+        <p:nvSpPr>
+          <p:cNvPr id="7" name="6 Marcador de número de diapositiva"/>
+          <p:cNvSpPr>
+            <a:spLocks noGrp="1"/>
+          </p:cNvSpPr>
+          <p:nvPr>
+            <p:ph type="sldNum" sz="quarter" idx="12"/>
+          </p:nvPr>
+        </p:nvSpPr>
+        <p:spPr>
+          <a:xfrm>
+            <a:off x="8217192" y="6556248"/>
+            <a:ext cx="365760" cy="301752"/>
+          </a:xfrm>
+        </p:spPr>
+        <p:txBody>
+          <a:bodyPr/>
+          <a:lstStyle>
+            <a:lvl1pPr algn="ctr">
+              <a:defRPr sz="900"/>
+            </a:lvl1pPr>
+          </a:lstStyle>
+          <a:p>
+            <a:fld id="{132FADFE-3B8F-471C-ABF0-DBC7717ECBBC}" type="slidenum">
+              <a:rPr lang="es-ES" smtClean="0"/>
+              <a:t>‹Nº›</a:t>
+            </a:fld>
+            <a:endParaRPr lang="es-ES"/>
+          </a:p>
+        </p:txBody>
+      </p:sp>
+    </p:spTree>
+  </p:cSld>
+  <p:clrMapOvr>
+    <a:overrideClrMapping bg1="dk1" tx1="lt1" bg2="dk2" tx2="lt2" accent1="accent1" accent2="accent2" accent3="accent3" accent4="accent4" accent5="accent5" accent6="accent6" hlink="hlink" folHlink="folHlink"/>
+  </p:clrMapOvr>
+</p:sldLayout>
+</file>
+
+<file path=ppt/slideMasters/slideMaster1.xml><?xml version="1.0" encoding="utf-8"?>
+<p:sldMaster xmlns:a="http://schemas.openxmlformats.org/drawingml/2006/main" xmlns:r="http://schemas.openxmlformats.org/officeDocument/2006/relationships" xmlns:p="http://schemas.openxmlformats.org/presentationml/2006/main">
+  <p:cSld>
+    <p:bg>
+      <p:bgRef idx="1002">
+        <a:schemeClr val="bg2"/>
+      </p:bgRef>
+    </p:bg>
+    <p:spTree>
+      <p:nvGrpSpPr>
+        <p:cNvPr id="1" name=""/>
+        <p:cNvGrpSpPr/>
+        <p:nvPr/>
+      </p:nvGrpSpPr>
+      <p:grpSpPr>
+        <a:xfrm>
+          <a:off x="0" y="0"/>
+          <a:ext cx="0" cy="0"/>
+          <a:chOff x="0" y="0"/>
+          <a:chExt cx="0" cy="0"/>
+        </a:xfrm>
+      </p:grpSpPr>
+      <p:sp>
+        <p:nvSpPr>
+          <p:cNvPr id="11" name="10 Triángulo rectángulo"/>
+          <p:cNvSpPr/>
+          <p:nvPr/>
+        </p:nvSpPr>
+        <p:spPr>
+          <a:xfrm>
+            <a:off x="7034" y="14068"/>
+            <a:ext cx="9129932" cy="6836899"/>
+          </a:xfrm>
+          <a:prstGeom prst="rtTriangle">
+            <a:avLst/>
+          </a:prstGeom>
+          <a:gradFill flip="none" rotWithShape="1">
+            <a:gsLst>
+              <a:gs pos="0">
+                <a:schemeClr val="tx2">
+                  <a:alpha val="10000"/>
+                </a:schemeClr>
+              </a:gs>
+              <a:gs pos="70000">
+                <a:schemeClr val="tx2">
+                  <a:alpha val="8000"/>
+                </a:schemeClr>
+              </a:gs>
+              <a:gs pos="100000">
+                <a:schemeClr val="tx2">
+                  <a:alpha val="1000"/>
+                </a:schemeClr>
+              </a:gs>
+            </a:gsLst>
+            <a:lin ang="8000000" scaled="1"/>
+            <a:tileRect/>
+          </a:gradFill>
+          <a:ln w="38100" cap="rnd" cmpd="sng" algn="ctr">
+            <a:noFill/>
+            <a:prstDash val="solid"/>
+          </a:ln>
+          <a:effectLst/>
+        </p:spPr>
+        <p:style>
+          <a:lnRef idx="3">
+            <a:schemeClr val="lt1"/>
+          </a:lnRef>
+          <a:fillRef idx="1">
+            <a:schemeClr val="accent1"/>
+          </a:fillRef>
+          <a:effectRef idx="1">
+            <a:schemeClr val="accent1"/>
+          </a:effectRef>
+          <a:fontRef idx="minor">
+            <a:schemeClr val="lt1"/>
+          </a:fontRef>
+        </p:style>
+        <p:txBody>
+          <a:bodyPr anchor="ctr"/>
+          <a:lstStyle/>
+          <a:p>
+            <a:pPr algn="ctr" eaLnBrk="1" latinLnBrk="0" hangingPunct="1"/>
+            <a:endParaRPr kumimoji="0" lang="en-US"/>
+          </a:p>
+        </p:txBody>
+      </p:sp>
+      <p:cxnSp>
+        <p:nvCxnSpPr>
+          <p:cNvPr id="8" name="7 Conector recto"/>
+          <p:cNvCxnSpPr/>
+          <p:nvPr/>
+        </p:nvCxnSpPr>
+        <p:spPr>
+          <a:xfrm>
+            <a:off x="0" y="7034"/>
+            <a:ext cx="9136966" cy="6843933"/>
+          </a:xfrm>
+          <a:prstGeom prst="line">
+            <a:avLst/>
+          </a:prstGeom>
+          <a:noFill/>
+          <a:ln w="5000" cap="rnd" cmpd="sng" algn="ctr">
+            <a:solidFill>
+              <a:schemeClr val="bg2">
+                <a:tint val="55000"/>
+                <a:satMod val="200000"/>
+                <a:alpha val="35000"/>
+              </a:schemeClr>
+            </a:solidFill>
+            <a:prstDash val="solid"/>
+          </a:ln>
+          <a:effectLst/>
+        </p:spPr>
+        <p:style>
+          <a:lnRef idx="2">
+            <a:schemeClr val="accent1"/>
+          </a:lnRef>
+          <a:fillRef idx="0">
+            <a:schemeClr val="accent1"/>
+          </a:fillRef>
+          <a:effectRef idx="1">
+            <a:schemeClr val="accent1"/>
+          </a:effectRef>
+          <a:fontRef idx="minor">
+            <a:schemeClr val="tx1"/>
+          </a:fontRef>
+        </p:style>
+      </p:cxnSp>
+      <p:cxnSp>
+        <p:nvCxnSpPr>
+          <p:cNvPr id="9" name="8 Conector recto"/>
+          <p:cNvCxnSpPr/>
+          <p:nvPr/>
+        </p:nvCxnSpPr>
+        <p:spPr>
+          <a:xfrm rot="10800000" flipV="1">
+            <a:off x="6468794" y="4948410"/>
+            <a:ext cx="2672861" cy="1900210"/>
+          </a:xfrm>
+          <a:prstGeom prst="line">
+            <a:avLst/>
+          </a:prstGeom>
+          <a:noFill/>
+          <a:ln w="6000" cap="rnd" cmpd="sng" algn="ctr">
+            <a:solidFill>
+              <a:schemeClr val="bg2">
+                <a:tint val="50000"/>
+                <a:satMod val="200000"/>
+                <a:alpha val="45000"/>
+              </a:schemeClr>
+            </a:solidFill>
+            <a:prstDash val="solid"/>
+          </a:ln>
+          <a:effectLst/>
+        </p:spPr>
+        <p:style>
+          <a:lnRef idx="2">
+            <a:schemeClr val="accent1"/>
+          </a:lnRef>
+          <a:fillRef idx="0">
+            <a:schemeClr val="accent1"/>
+          </a:fillRef>
+          <a:effectRef idx="1">
+            <a:schemeClr val="accent1"/>
+          </a:effectRef>
+          <a:fontRef idx="minor">
+            <a:schemeClr val="tx1"/>
+          </a:fontRef>
+        </p:style>
+      </p:cxnSp>
+      <p:sp>
+        <p:nvSpPr>
+          <p:cNvPr id="22" name="21 Marcador de título"/>
+          <p:cNvSpPr>
+            <a:spLocks noGrp="1"/>
+          </p:cNvSpPr>
+          <p:nvPr>
+            <p:ph type="title"/>
+          </p:nvPr>
+        </p:nvSpPr>
+        <p:spPr>
+          <a:xfrm>
+            <a:off x="457200" y="267494"/>
+            <a:ext cx="8229600" cy="1399032"/>
           </a:xfrm>
           <a:prstGeom prst="rect">
             <a:avLst/>
           </a:prstGeom>
         </p:spPr>
         <p:txBody>
-          <a:bodyPr vert="horz" lIns="91440" tIns="45720" rIns="91440" bIns="45720" rtlCol="0" anchor="ctr">
+          <a:bodyPr vert="horz" anchor="ctr">
             <a:normAutofit/>
           </a:bodyPr>
           <a:lstStyle/>
           <a:p>
             <a:r>
-              <a:rPr lang="es-ES" smtClean="0"/>
+              <a:rPr kumimoji="0" lang="es-ES" smtClean="0"/>
               <a:t>Haga clic para modificar el estilo de título del patrón</a:t>
             </a:r>
-            <a:endParaRPr lang="es-ES"/>
-          </a:p>
-        </p:txBody>
-      </p:sp>
-      <p:sp>
-        <p:nvSpPr>
-          <p:cNvPr id="3" name="2 Marcador de texto"/>
+            <a:endParaRPr kumimoji="0" lang="en-US"/>
+          </a:p>
+        </p:txBody>
+      </p:sp>
+      <p:sp>
+        <p:nvSpPr>
+          <p:cNvPr id="13" name="12 Marcador de texto"/>
           <p:cNvSpPr>
             <a:spLocks noGrp="1"/>
           </p:cNvSpPr>
@@ -2592,59 +3061,59 @@
         </p:nvSpPr>
         <p:spPr>
           <a:xfrm>
-            <a:off x="457200" y="1600200"/>
-            <a:ext cx="8229600" cy="4525963"/>
+            <a:off x="457200" y="1882808"/>
+            <a:ext cx="8229600" cy="4572000"/>
           </a:xfrm>
           <a:prstGeom prst="rect">
             <a:avLst/>
           </a:prstGeom>
         </p:spPr>
         <p:txBody>
-          <a:bodyPr vert="horz" lIns="91440" tIns="45720" rIns="91440" bIns="45720" rtlCol="0">
+          <a:bodyPr vert="horz" anchor="t">
             <a:normAutofit/>
           </a:bodyPr>
           <a:lstStyle/>
           <a:p>
-            <a:pPr lvl="0"/>
-            <a:r>
-              <a:rPr lang="es-ES" smtClean="0"/>
+            <a:pPr lvl="0" eaLnBrk="1" latinLnBrk="0" hangingPunct="1"/>
+            <a:r>
+              <a:rPr kumimoji="0" lang="es-ES" smtClean="0"/>
               <a:t>Haga clic para modificar el estilo de texto del patrón</a:t>
             </a:r>
           </a:p>
           <a:p>
-            <a:pPr lvl="1"/>
-            <a:r>
-              <a:rPr lang="es-ES" smtClean="0"/>
+            <a:pPr lvl="1" eaLnBrk="1" latinLnBrk="0" hangingPunct="1"/>
+            <a:r>
+              <a:rPr kumimoji="0" lang="es-ES" smtClean="0"/>
               <a:t>Segundo nivel</a:t>
             </a:r>
           </a:p>
           <a:p>
-            <a:pPr lvl="2"/>
-            <a:r>
-              <a:rPr lang="es-ES" smtClean="0"/>
+            <a:pPr lvl="2" eaLnBrk="1" latinLnBrk="0" hangingPunct="1"/>
+            <a:r>
+              <a:rPr kumimoji="0" lang="es-ES" smtClean="0"/>
               <a:t>Tercer nivel</a:t>
             </a:r>
           </a:p>
           <a:p>
-            <a:pPr lvl="3"/>
-            <a:r>
-              <a:rPr lang="es-ES" smtClean="0"/>
+            <a:pPr lvl="3" eaLnBrk="1" latinLnBrk="0" hangingPunct="1"/>
+            <a:r>
+              <a:rPr kumimoji="0" lang="es-ES" smtClean="0"/>
               <a:t>Cuarto nivel</a:t>
             </a:r>
           </a:p>
           <a:p>
-            <a:pPr lvl="4"/>
-            <a:r>
-              <a:rPr lang="es-ES" smtClean="0"/>
+            <a:pPr lvl="4" eaLnBrk="1" latinLnBrk="0" hangingPunct="1"/>
+            <a:r>
+              <a:rPr kumimoji="0" lang="es-ES" smtClean="0"/>
               <a:t>Quinto nivel</a:t>
             </a:r>
-            <a:endParaRPr lang="es-ES"/>
-          </a:p>
-        </p:txBody>
-      </p:sp>
-      <p:sp>
-        <p:nvSpPr>
-          <p:cNvPr id="4" name="3 Marcador de fecha"/>
+            <a:endParaRPr kumimoji="0" lang="en-US"/>
+          </a:p>
+        </p:txBody>
+      </p:sp>
+      <p:sp>
+        <p:nvSpPr>
+          <p:cNvPr id="14" name="13 Marcador de fecha"/>
           <p:cNvSpPr>
             <a:spLocks noGrp="1"/>
           </p:cNvSpPr>
@@ -2654,22 +3123,20 @@
         </p:nvSpPr>
         <p:spPr>
           <a:xfrm>
-            <a:off x="457200" y="6356350"/>
-            <a:ext cx="2133600" cy="365125"/>
+            <a:off x="4791456" y="6480969"/>
+            <a:ext cx="2133600" cy="301752"/>
           </a:xfrm>
           <a:prstGeom prst="rect">
             <a:avLst/>
           </a:prstGeom>
         </p:spPr>
         <p:txBody>
-          <a:bodyPr vert="horz" lIns="91440" tIns="45720" rIns="91440" bIns="45720" rtlCol="0" anchor="ctr"/>
+          <a:bodyPr vert="horz" anchor="b"/>
           <a:lstStyle>
-            <a:lvl1pPr algn="l">
-              <a:defRPr sz="1200">
+            <a:lvl1pPr algn="l" eaLnBrk="1" latinLnBrk="0" hangingPunct="1">
+              <a:defRPr kumimoji="0" sz="1000" b="0">
                 <a:solidFill>
-                  <a:schemeClr val="tx1">
-                    <a:tint val="75000"/>
-                  </a:schemeClr>
+                  <a:schemeClr val="tx1"/>
                 </a:solidFill>
               </a:defRPr>
             </a:lvl1pPr>
@@ -2677,7 +3144,7 @@
           <a:p>
             <a:fld id="{7A847CFC-816F-41D0-AAC0-9BF4FEBC753E}" type="datetimeFigureOut">
               <a:rPr lang="es-ES" smtClean="0"/>
-              <a:t>19/05/2015</a:t>
+              <a:t>21/05/2015</a:t>
             </a:fld>
             <a:endParaRPr lang="es-ES"/>
           </a:p>
@@ -2685,7 +3152,7 @@
       </p:sp>
       <p:sp>
         <p:nvSpPr>
-          <p:cNvPr id="5" name="4 Marcador de pie de página"/>
+          <p:cNvPr id="3" name="2 Marcador de pie de página"/>
           <p:cNvSpPr>
             <a:spLocks noGrp="1"/>
           </p:cNvSpPr>
@@ -2695,22 +3162,20 @@
         </p:nvSpPr>
         <p:spPr>
           <a:xfrm>
-            <a:off x="3124200" y="6356350"/>
-            <a:ext cx="2895600" cy="365125"/>
+            <a:off x="457200" y="6481890"/>
+            <a:ext cx="4260056" cy="300831"/>
           </a:xfrm>
           <a:prstGeom prst="rect">
             <a:avLst/>
           </a:prstGeom>
         </p:spPr>
         <p:txBody>
-          <a:bodyPr vert="horz" lIns="91440" tIns="45720" rIns="91440" bIns="45720" rtlCol="0" anchor="ctr"/>
+          <a:bodyPr vert="horz" anchor="b"/>
           <a:lstStyle>
-            <a:lvl1pPr algn="ctr">
-              <a:defRPr sz="1200">
+            <a:lvl1pPr algn="r" eaLnBrk="1" latinLnBrk="0" hangingPunct="1">
+              <a:defRPr kumimoji="0" sz="1000">
                 <a:solidFill>
-                  <a:schemeClr val="tx1">
-                    <a:tint val="75000"/>
-                  </a:schemeClr>
+                  <a:schemeClr val="tx1"/>
                 </a:solidFill>
               </a:defRPr>
             </a:lvl1pPr>
@@ -2722,7 +3187,7 @@
       </p:sp>
       <p:sp>
         <p:nvSpPr>
-          <p:cNvPr id="6" name="5 Marcador de número de diapositiva"/>
+          <p:cNvPr id="23" name="22 Marcador de número de diapositiva"/>
           <p:cNvSpPr>
             <a:spLocks noGrp="1"/>
           </p:cNvSpPr>
@@ -2732,22 +3197,20 @@
         </p:nvSpPr>
         <p:spPr>
           <a:xfrm>
-            <a:off x="6553200" y="6356350"/>
-            <a:ext cx="2133600" cy="365125"/>
+            <a:off x="7589520" y="6480969"/>
+            <a:ext cx="502920" cy="301752"/>
           </a:xfrm>
           <a:prstGeom prst="rect">
             <a:avLst/>
           </a:prstGeom>
         </p:spPr>
         <p:txBody>
-          <a:bodyPr vert="horz" lIns="91440" tIns="45720" rIns="91440" bIns="45720" rtlCol="0" anchor="ctr"/>
+          <a:bodyPr vert="horz" anchor="b"/>
           <a:lstStyle>
-            <a:lvl1pPr algn="r">
-              <a:defRPr sz="1200">
+            <a:lvl1pPr algn="ctr" eaLnBrk="1" latinLnBrk="0" hangingPunct="1">
+              <a:defRPr kumimoji="0" sz="1200">
                 <a:solidFill>
-                  <a:schemeClr val="tx1">
-                    <a:tint val="75000"/>
-                  </a:schemeClr>
+                  <a:schemeClr val="tx1"/>
                 </a:solidFill>
               </a:defRPr>
             </a:lvl1pPr>
@@ -2763,31 +3226,48 @@
       </p:sp>
     </p:spTree>
   </p:cSld>
-  <p:clrMap bg1="lt1" tx1="dk1" bg2="lt2" tx2="dk2" accent1="accent1" accent2="accent2" accent3="accent3" accent4="accent4" accent5="accent5" accent6="accent6" hlink="hlink" folHlink="folHlink"/>
+  <p:clrMap bg1="dk1" tx1="lt1" bg2="dk2" tx2="lt2" accent1="accent1" accent2="accent2" accent3="accent3" accent4="accent4" accent5="accent5" accent6="accent6" hlink="hlink" folHlink="folHlink"/>
   <p:sldLayoutIdLst>
-    <p:sldLayoutId id="2147483649" r:id="rId1"/>
-    <p:sldLayoutId id="2147483650" r:id="rId2"/>
-    <p:sldLayoutId id="2147483651" r:id="rId3"/>
-    <p:sldLayoutId id="2147483652" r:id="rId4"/>
-    <p:sldLayoutId id="2147483653" r:id="rId5"/>
-    <p:sldLayoutId id="2147483654" r:id="rId6"/>
-    <p:sldLayoutId id="2147483655" r:id="rId7"/>
-    <p:sldLayoutId id="2147483656" r:id="rId8"/>
-    <p:sldLayoutId id="2147483657" r:id="rId9"/>
-    <p:sldLayoutId id="2147483658" r:id="rId10"/>
-    <p:sldLayoutId id="2147483659" r:id="rId11"/>
+    <p:sldLayoutId id="2147483661" r:id="rId1"/>
+    <p:sldLayoutId id="2147483662" r:id="rId2"/>
+    <p:sldLayoutId id="2147483663" r:id="rId3"/>
+    <p:sldLayoutId id="2147483664" r:id="rId4"/>
+    <p:sldLayoutId id="2147483665" r:id="rId5"/>
+    <p:sldLayoutId id="2147483666" r:id="rId6"/>
+    <p:sldLayoutId id="2147483667" r:id="rId7"/>
+    <p:sldLayoutId id="2147483668" r:id="rId8"/>
+    <p:sldLayoutId id="2147483669" r:id="rId9"/>
+    <p:sldLayoutId id="2147483670" r:id="rId10"/>
+    <p:sldLayoutId id="2147483671" r:id="rId11"/>
   </p:sldLayoutIdLst>
   <p:txStyles>
     <p:titleStyle>
-      <a:lvl1pPr algn="ctr" defTabSz="914400" rtl="0" eaLnBrk="1" latinLnBrk="0" hangingPunct="1">
+      <a:lvl1pPr marL="484632" algn="l" rtl="0" eaLnBrk="1" latinLnBrk="0" hangingPunct="1">
         <a:spcBef>
           <a:spcPct val="0"/>
         </a:spcBef>
         <a:buNone/>
-        <a:defRPr sz="4400" kern="1200">
+        <a:defRPr kumimoji="0" sz="4200" kern="1200">
+          <a:ln w="6350">
+            <a:solidFill>
+              <a:schemeClr val="accent1">
+                <a:shade val="43000"/>
+              </a:schemeClr>
+            </a:solidFill>
+          </a:ln>
           <a:solidFill>
-            <a:schemeClr val="tx1"/>
+            <a:schemeClr val="accent1">
+              <a:tint val="83000"/>
+              <a:satMod val="150000"/>
+            </a:schemeClr>
           </a:solidFill>
+          <a:effectLst>
+            <a:outerShdw blurRad="26000" dist="26000" dir="14500000" algn="tl" rotWithShape="0">
+              <a:srgbClr val="000000">
+                <a:alpha val="40000"/>
+              </a:srgbClr>
+            </a:outerShdw>
+          </a:effectLst>
           <a:latin typeface="+mj-lt"/>
           <a:ea typeface="+mj-ea"/>
           <a:cs typeface="+mj-cs"/>
@@ -2795,13 +3275,17 @@
       </a:lvl1pPr>
     </p:titleStyle>
     <p:bodyStyle>
-      <a:lvl1pPr marL="342900" indent="-342900" algn="l" defTabSz="914400" rtl="0" eaLnBrk="1" latinLnBrk="0" hangingPunct="1">
+      <a:lvl1pPr marL="448056" indent="-384048" algn="l" rtl="0" eaLnBrk="1" latinLnBrk="0" hangingPunct="1">
         <a:spcBef>
           <a:spcPct val="20000"/>
         </a:spcBef>
-        <a:buFont typeface="Arial" pitchFamily="34" charset="0"/>
-        <a:buChar char="•"/>
-        <a:defRPr sz="3200" kern="1200">
+        <a:buClr>
+          <a:schemeClr val="accent1"/>
+        </a:buClr>
+        <a:buSzPct val="80000"/>
+        <a:buFont typeface="Wingdings 2"/>
+        <a:buChar char=""/>
+        <a:defRPr kumimoji="0" sz="3000" kern="1200">
           <a:solidFill>
             <a:schemeClr val="tx1"/>
           </a:solidFill>
@@ -2810,13 +3294,17 @@
           <a:cs typeface="+mn-cs"/>
         </a:defRPr>
       </a:lvl1pPr>
-      <a:lvl2pPr marL="742950" indent="-285750" algn="l" defTabSz="914400" rtl="0" eaLnBrk="1" latinLnBrk="0" hangingPunct="1">
+      <a:lvl2pPr marL="822960" indent="-285750" algn="l" rtl="0" eaLnBrk="1" latinLnBrk="0" hangingPunct="1">
         <a:spcBef>
           <a:spcPct val="20000"/>
         </a:spcBef>
-        <a:buFont typeface="Arial" pitchFamily="34" charset="0"/>
-        <a:buChar char="–"/>
-        <a:defRPr sz="2800" kern="1200">
+        <a:buClr>
+          <a:schemeClr val="accent1"/>
+        </a:buClr>
+        <a:buSzPct val="95000"/>
+        <a:buFont typeface="Verdana"/>
+        <a:buChar char="›"/>
+        <a:defRPr kumimoji="0" sz="2600" kern="1200">
           <a:solidFill>
             <a:schemeClr val="tx1"/>
           </a:solidFill>
@@ -2825,13 +3313,16 @@
           <a:cs typeface="+mn-cs"/>
         </a:defRPr>
       </a:lvl2pPr>
-      <a:lvl3pPr marL="1143000" indent="-228600" algn="l" defTabSz="914400" rtl="0" eaLnBrk="1" latinLnBrk="0" hangingPunct="1">
+      <a:lvl3pPr marL="1106424" indent="-228600" algn="l" rtl="0" eaLnBrk="1" latinLnBrk="0" hangingPunct="1">
         <a:spcBef>
           <a:spcPct val="20000"/>
         </a:spcBef>
-        <a:buFont typeface="Arial" pitchFamily="34" charset="0"/>
-        <a:buChar char="•"/>
-        <a:defRPr sz="2400" kern="1200">
+        <a:buClr>
+          <a:schemeClr val="accent1"/>
+        </a:buClr>
+        <a:buFont typeface="Wingdings 2"/>
+        <a:buChar char=""/>
+        <a:defRPr kumimoji="0" sz="2400" kern="1200">
           <a:solidFill>
             <a:schemeClr val="tx1"/>
           </a:solidFill>
@@ -2840,13 +3331,16 @@
           <a:cs typeface="+mn-cs"/>
         </a:defRPr>
       </a:lvl3pPr>
-      <a:lvl4pPr marL="1600200" indent="-228600" algn="l" defTabSz="914400" rtl="0" eaLnBrk="1" latinLnBrk="0" hangingPunct="1">
+      <a:lvl4pPr marL="1371600" indent="-210312" algn="l" rtl="0" eaLnBrk="1" latinLnBrk="0" hangingPunct="1">
         <a:spcBef>
           <a:spcPct val="20000"/>
         </a:spcBef>
-        <a:buFont typeface="Arial" pitchFamily="34" charset="0"/>
-        <a:buChar char="–"/>
-        <a:defRPr sz="2000" kern="1200">
+        <a:buClr>
+          <a:schemeClr val="accent1"/>
+        </a:buClr>
+        <a:buFont typeface="Wingdings 2"/>
+        <a:buChar char=""/>
+        <a:defRPr kumimoji="0" sz="2000" kern="1200">
           <a:solidFill>
             <a:schemeClr val="tx1"/>
           </a:solidFill>
@@ -2855,13 +3349,18 @@
           <a:cs typeface="+mn-cs"/>
         </a:defRPr>
       </a:lvl4pPr>
-      <a:lvl5pPr marL="2057400" indent="-228600" algn="l" defTabSz="914400" rtl="0" eaLnBrk="1" latinLnBrk="0" hangingPunct="1">
+      <a:lvl5pPr marL="1600200" indent="-210312" algn="l" rtl="0" eaLnBrk="1" latinLnBrk="0" hangingPunct="1">
         <a:spcBef>
           <a:spcPct val="20000"/>
         </a:spcBef>
-        <a:buFont typeface="Arial" pitchFamily="34" charset="0"/>
-        <a:buChar char="»"/>
-        <a:defRPr sz="2000" kern="1200">
+        <a:buClr>
+          <a:schemeClr val="accent1">
+            <a:tint val="75000"/>
+          </a:schemeClr>
+        </a:buClr>
+        <a:buFont typeface="Wingdings 2"/>
+        <a:buChar char=""/>
+        <a:defRPr kumimoji="0" sz="1900" kern="1200">
           <a:solidFill>
             <a:schemeClr val="tx1"/>
           </a:solidFill>
@@ -2870,13 +3369,18 @@
           <a:cs typeface="+mn-cs"/>
         </a:defRPr>
       </a:lvl5pPr>
-      <a:lvl6pPr marL="2514600" indent="-228600" algn="l" defTabSz="914400" rtl="0" eaLnBrk="1" latinLnBrk="0" hangingPunct="1">
+      <a:lvl6pPr marL="1828800" indent="-210312" algn="l" rtl="0" eaLnBrk="1" latinLnBrk="0" hangingPunct="1">
         <a:spcBef>
           <a:spcPct val="20000"/>
         </a:spcBef>
-        <a:buFont typeface="Arial" pitchFamily="34" charset="0"/>
-        <a:buChar char="•"/>
-        <a:defRPr sz="2000" kern="1200">
+        <a:buClr>
+          <a:schemeClr val="accent1">
+            <a:tint val="75000"/>
+          </a:schemeClr>
+        </a:buClr>
+        <a:buFont typeface="Wingdings 2"/>
+        <a:buChar char=""/>
+        <a:defRPr kumimoji="0" sz="1800" kern="1200">
           <a:solidFill>
             <a:schemeClr val="tx1"/>
           </a:solidFill>
@@ -2885,13 +3389,18 @@
           <a:cs typeface="+mn-cs"/>
         </a:defRPr>
       </a:lvl6pPr>
-      <a:lvl7pPr marL="2971800" indent="-228600" algn="l" defTabSz="914400" rtl="0" eaLnBrk="1" latinLnBrk="0" hangingPunct="1">
+      <a:lvl7pPr marL="2084832" indent="-210312" algn="l" rtl="0" eaLnBrk="1" latinLnBrk="0" hangingPunct="1">
         <a:spcBef>
           <a:spcPct val="20000"/>
         </a:spcBef>
-        <a:buFont typeface="Arial" pitchFamily="34" charset="0"/>
-        <a:buChar char="•"/>
-        <a:defRPr sz="2000" kern="1200">
+        <a:buClr>
+          <a:schemeClr val="accent1">
+            <a:tint val="75000"/>
+          </a:schemeClr>
+        </a:buClr>
+        <a:buFont typeface="Wingdings 2"/>
+        <a:buChar char=""/>
+        <a:defRPr kumimoji="0" sz="1600" kern="1200">
           <a:solidFill>
             <a:schemeClr val="tx1"/>
           </a:solidFill>
@@ -2900,13 +3409,18 @@
           <a:cs typeface="+mn-cs"/>
         </a:defRPr>
       </a:lvl7pPr>
-      <a:lvl8pPr marL="3429000" indent="-228600" algn="l" defTabSz="914400" rtl="0" eaLnBrk="1" latinLnBrk="0" hangingPunct="1">
+      <a:lvl8pPr marL="2286000" indent="-182880" algn="l" rtl="0" eaLnBrk="1" latinLnBrk="0" hangingPunct="1">
         <a:spcBef>
           <a:spcPct val="20000"/>
         </a:spcBef>
-        <a:buFont typeface="Arial" pitchFamily="34" charset="0"/>
-        <a:buChar char="•"/>
-        <a:defRPr sz="2000" kern="1200">
+        <a:buClr>
+          <a:schemeClr val="accent1">
+            <a:tint val="75000"/>
+          </a:schemeClr>
+        </a:buClr>
+        <a:buFont typeface="Wingdings 2"/>
+        <a:buChar char=""/>
+        <a:defRPr kumimoji="0" sz="1600" kern="1200">
           <a:solidFill>
             <a:schemeClr val="tx1"/>
           </a:solidFill>
@@ -2915,13 +3429,18 @@
           <a:cs typeface="+mn-cs"/>
         </a:defRPr>
       </a:lvl8pPr>
-      <a:lvl9pPr marL="3886200" indent="-228600" algn="l" defTabSz="914400" rtl="0" eaLnBrk="1" latinLnBrk="0" hangingPunct="1">
+      <a:lvl9pPr marL="2514600" indent="-182880" algn="l" rtl="0" eaLnBrk="1" latinLnBrk="0" hangingPunct="1">
         <a:spcBef>
           <a:spcPct val="20000"/>
         </a:spcBef>
-        <a:buFont typeface="Arial" pitchFamily="34" charset="0"/>
-        <a:buChar char="•"/>
-        <a:defRPr sz="2000" kern="1200">
+        <a:buClr>
+          <a:schemeClr val="accent1">
+            <a:tint val="75000"/>
+          </a:schemeClr>
+        </a:buClr>
+        <a:buFont typeface="Wingdings 2"/>
+        <a:buChar char=""/>
+        <a:defRPr kumimoji="0" sz="1600" kern="1200">
           <a:solidFill>
             <a:schemeClr val="tx1"/>
           </a:solidFill>
@@ -2932,11 +3451,8 @@
       </a:lvl9pPr>
     </p:bodyStyle>
     <p:otherStyle>
-      <a:defPPr>
-        <a:defRPr lang="es-ES"/>
-      </a:defPPr>
-      <a:lvl1pPr marL="0" algn="l" defTabSz="914400" rtl="0" eaLnBrk="1" latinLnBrk="0" hangingPunct="1">
-        <a:defRPr sz="1800" kern="1200">
+      <a:lvl1pPr marL="0" algn="l" rtl="0" eaLnBrk="1" latinLnBrk="0" hangingPunct="1">
+        <a:defRPr kumimoji="0" kern="1200">
           <a:solidFill>
             <a:schemeClr val="tx1"/>
           </a:solidFill>
@@ -2945,8 +3461,8 @@
           <a:cs typeface="+mn-cs"/>
         </a:defRPr>
       </a:lvl1pPr>
-      <a:lvl2pPr marL="457200" algn="l" defTabSz="914400" rtl="0" eaLnBrk="1" latinLnBrk="0" hangingPunct="1">
-        <a:defRPr sz="1800" kern="1200">
+      <a:lvl2pPr marL="457200" algn="l" rtl="0" eaLnBrk="1" latinLnBrk="0" hangingPunct="1">
+        <a:defRPr kumimoji="0" kern="1200">
           <a:solidFill>
             <a:schemeClr val="tx1"/>
           </a:solidFill>
@@ -2955,8 +3471,8 @@
           <a:cs typeface="+mn-cs"/>
         </a:defRPr>
       </a:lvl2pPr>
-      <a:lvl3pPr marL="914400" algn="l" defTabSz="914400" rtl="0" eaLnBrk="1" latinLnBrk="0" hangingPunct="1">
-        <a:defRPr sz="1800" kern="1200">
+      <a:lvl3pPr marL="914400" algn="l" rtl="0" eaLnBrk="1" latinLnBrk="0" hangingPunct="1">
+        <a:defRPr kumimoji="0" kern="1200">
           <a:solidFill>
             <a:schemeClr val="tx1"/>
           </a:solidFill>
@@ -2965,8 +3481,8 @@
           <a:cs typeface="+mn-cs"/>
         </a:defRPr>
       </a:lvl3pPr>
-      <a:lvl4pPr marL="1371600" algn="l" defTabSz="914400" rtl="0" eaLnBrk="1" latinLnBrk="0" hangingPunct="1">
-        <a:defRPr sz="1800" kern="1200">
+      <a:lvl4pPr marL="1371600" algn="l" rtl="0" eaLnBrk="1" latinLnBrk="0" hangingPunct="1">
+        <a:defRPr kumimoji="0" kern="1200">
           <a:solidFill>
             <a:schemeClr val="tx1"/>
           </a:solidFill>
@@ -2975,8 +3491,8 @@
           <a:cs typeface="+mn-cs"/>
         </a:defRPr>
       </a:lvl4pPr>
-      <a:lvl5pPr marL="1828800" algn="l" defTabSz="914400" rtl="0" eaLnBrk="1" latinLnBrk="0" hangingPunct="1">
-        <a:defRPr sz="1800" kern="1200">
+      <a:lvl5pPr marL="1828800" algn="l" rtl="0" eaLnBrk="1" latinLnBrk="0" hangingPunct="1">
+        <a:defRPr kumimoji="0" kern="1200">
           <a:solidFill>
             <a:schemeClr val="tx1"/>
           </a:solidFill>
@@ -2985,8 +3501,8 @@
           <a:cs typeface="+mn-cs"/>
         </a:defRPr>
       </a:lvl5pPr>
-      <a:lvl6pPr marL="2286000" algn="l" defTabSz="914400" rtl="0" eaLnBrk="1" latinLnBrk="0" hangingPunct="1">
-        <a:defRPr sz="1800" kern="1200">
+      <a:lvl6pPr marL="2286000" algn="l" rtl="0" eaLnBrk="1" latinLnBrk="0" hangingPunct="1">
+        <a:defRPr kumimoji="0" kern="1200">
           <a:solidFill>
             <a:schemeClr val="tx1"/>
           </a:solidFill>
@@ -2995,8 +3511,8 @@
           <a:cs typeface="+mn-cs"/>
         </a:defRPr>
       </a:lvl6pPr>
-      <a:lvl7pPr marL="2743200" algn="l" defTabSz="914400" rtl="0" eaLnBrk="1" latinLnBrk="0" hangingPunct="1">
-        <a:defRPr sz="1800" kern="1200">
+      <a:lvl7pPr marL="2743200" algn="l" rtl="0" eaLnBrk="1" latinLnBrk="0" hangingPunct="1">
+        <a:defRPr kumimoji="0" kern="1200">
           <a:solidFill>
             <a:schemeClr val="tx1"/>
           </a:solidFill>
@@ -3005,8 +3521,8 @@
           <a:cs typeface="+mn-cs"/>
         </a:defRPr>
       </a:lvl7pPr>
-      <a:lvl8pPr marL="3200400" algn="l" defTabSz="914400" rtl="0" eaLnBrk="1" latinLnBrk="0" hangingPunct="1">
-        <a:defRPr sz="1800" kern="1200">
+      <a:lvl8pPr marL="3200400" algn="l" rtl="0" eaLnBrk="1" latinLnBrk="0" hangingPunct="1">
+        <a:defRPr kumimoji="0" kern="1200">
           <a:solidFill>
             <a:schemeClr val="tx1"/>
           </a:solidFill>
@@ -3015,8 +3531,8 @@
           <a:cs typeface="+mn-cs"/>
         </a:defRPr>
       </a:lvl8pPr>
-      <a:lvl9pPr marL="3657600" algn="l" defTabSz="914400" rtl="0" eaLnBrk="1" latinLnBrk="0" hangingPunct="1">
-        <a:defRPr sz="1800" kern="1200">
+      <a:lvl9pPr marL="3657600" algn="l" rtl="0" eaLnBrk="1" latinLnBrk="0" hangingPunct="1">
+        <a:defRPr kumimoji="0" kern="1200">
           <a:solidFill>
             <a:schemeClr val="tx1"/>
           </a:solidFill>
@@ -3064,7 +3580,9 @@
           </a:xfrm>
         </p:spPr>
         <p:txBody>
-          <a:bodyPr/>
+          <a:bodyPr>
+            <a:normAutofit fontScale="90000"/>
+          </a:bodyPr>
           <a:lstStyle/>
           <a:p>
             <a:r>
@@ -3166,11 +3684,7 @@
           <a:p>
             <a:r>
               <a:rPr lang="es-ES" sz="2600" b="1" dirty="0"/>
-              <a:t>PRODUCTO</a:t>
-            </a:r>
-            <a:r>
-              <a:rPr lang="es-ES" sz="2600" b="1" dirty="0"/>
-              <a:t> </a:t>
+              <a:t>PRODUCTO </a:t>
             </a:r>
             <a:r>
               <a:rPr lang="es-ES" sz="2600" dirty="0" smtClean="0"/>
@@ -3197,15 +3711,7 @@
             <a:pPr lvl="1"/>
             <a:r>
               <a:rPr lang="es-ES" sz="2600" dirty="0" smtClean="0"/>
-              <a:t>PRODUCTO(4;5)</a:t>
-            </a:r>
-            <a:r>
-              <a:rPr lang="es-ES" sz="2600" dirty="0" smtClean="0"/>
-              <a:t>  =&gt; </a:t>
-            </a:r>
-            <a:r>
-              <a:rPr lang="es-ES" sz="2600" dirty="0" smtClean="0"/>
-              <a:t>20</a:t>
+              <a:t>PRODUCTO(4;5)  =&gt; 20</a:t>
             </a:r>
           </a:p>
           <a:p>
@@ -3374,7 +3880,7 @@
         </p:spPr>
         <p:txBody>
           <a:bodyPr>
-            <a:normAutofit/>
+            <a:normAutofit lnSpcReduction="10000"/>
           </a:bodyPr>
           <a:lstStyle/>
           <a:p>
@@ -3568,24 +4074,8 @@
               <a:t>,...): </a:t>
             </a:r>
             <a:r>
-              <a:rPr lang="es-ES" sz="2800" dirty="0" smtClean="0"/>
-              <a:t>Tal </a:t>
-            </a:r>
-            <a:r>
               <a:rPr lang="es-ES" sz="2800" dirty="0"/>
-              <a:t>como con la función REDONDEAR</a:t>
-            </a:r>
-            <a:r>
-              <a:rPr lang="es-ES" sz="2600" dirty="0" smtClean="0"/>
-              <a:t>,  pero </a:t>
-            </a:r>
-            <a:r>
-              <a:rPr lang="es-ES" sz="2800" dirty="0"/>
-              <a:t>las aproximaciones de los decimales siempre los hace a los valores </a:t>
-            </a:r>
-            <a:r>
-              <a:rPr lang="es-ES" sz="2800" dirty="0" smtClean="0"/>
-              <a:t>superiores, </a:t>
+              <a:t>El resultado de la función es la suma de los cuadrados de los argumentos número1, número2, etc., </a:t>
             </a:r>
             <a:r>
               <a:rPr lang="es-ES" sz="2600" dirty="0" err="1" smtClean="0"/>
@@ -3594,17 +4084,6 @@
             <a:r>
               <a:rPr lang="es-ES" sz="2600" dirty="0" smtClean="0"/>
               <a:t>:</a:t>
-            </a:r>
-          </a:p>
-          <a:p>
-            <a:pPr lvl="1"/>
-            <a:r>
-              <a:rPr lang="pt-BR" sz="2400" dirty="0"/>
-              <a:t>REDONDEAR.MAS(4.52,1) </a:t>
-            </a:r>
-            <a:r>
-              <a:rPr lang="pt-BR" sz="2400" dirty="0" smtClean="0"/>
-              <a:t>=&gt; 4.6</a:t>
             </a:r>
           </a:p>
           <a:p>
@@ -4263,7 +4742,7 @@
         </p:spPr>
         <p:txBody>
           <a:bodyPr>
-            <a:normAutofit/>
+            <a:normAutofit lnSpcReduction="10000"/>
           </a:bodyPr>
           <a:lstStyle/>
           <a:p>
@@ -4627,11 +5106,7 @@
           <a:p>
             <a:r>
               <a:rPr lang="es-ES" sz="2600" b="1" dirty="0"/>
-              <a:t>PRODUCTO</a:t>
-            </a:r>
-            <a:r>
-              <a:rPr lang="es-ES" sz="2600" b="1" dirty="0"/>
-              <a:t> </a:t>
+              <a:t>PRODUCTO </a:t>
             </a:r>
             <a:r>
               <a:rPr lang="es-ES" sz="2600" dirty="0" smtClean="0"/>
@@ -4658,15 +5133,7 @@
             <a:pPr lvl="1"/>
             <a:r>
               <a:rPr lang="es-ES" sz="2600" dirty="0" smtClean="0"/>
-              <a:t>PRODUCTO(4;5)</a:t>
-            </a:r>
-            <a:r>
-              <a:rPr lang="es-ES" sz="2600" dirty="0" smtClean="0"/>
-              <a:t>  =&gt; </a:t>
-            </a:r>
-            <a:r>
-              <a:rPr lang="es-ES" sz="2600" dirty="0" smtClean="0"/>
-              <a:t>20</a:t>
+              <a:t>PRODUCTO(4;5)  =&gt; 20</a:t>
             </a:r>
           </a:p>
           <a:p>
@@ -4801,9 +5268,9 @@
 </file>
 
 <file path=ppt/theme/theme1.xml><?xml version="1.0" encoding="utf-8"?>
-<a:theme xmlns:a="http://schemas.openxmlformats.org/drawingml/2006/main" name="Tema de Office">
+<a:theme xmlns:a="http://schemas.openxmlformats.org/drawingml/2006/main" name="Brío">
   <a:themeElements>
-    <a:clrScheme name="Oficina">
+    <a:clrScheme name="Brío">
       <a:dk1>
         <a:sysClr val="windowText" lastClr="000000"/>
       </a:dk1>
@@ -4811,82 +5278,48 @@
         <a:sysClr val="window" lastClr="FFFFFF"/>
       </a:lt1>
       <a:dk2>
-        <a:srgbClr val="1F497D"/>
+        <a:srgbClr val="666666"/>
       </a:dk2>
       <a:lt2>
-        <a:srgbClr val="EEECE1"/>
+        <a:srgbClr val="D2D2D2"/>
       </a:lt2>
       <a:accent1>
-        <a:srgbClr val="4F81BD"/>
+        <a:srgbClr val="FF388C"/>
       </a:accent1>
       <a:accent2>
-        <a:srgbClr val="C0504D"/>
+        <a:srgbClr val="E40059"/>
       </a:accent2>
       <a:accent3>
-        <a:srgbClr val="9BBB59"/>
+        <a:srgbClr val="9C007F"/>
       </a:accent3>
       <a:accent4>
-        <a:srgbClr val="8064A2"/>
+        <a:srgbClr val="68007F"/>
       </a:accent4>
       <a:accent5>
-        <a:srgbClr val="4BACC6"/>
+        <a:srgbClr val="005BD3"/>
       </a:accent5>
       <a:accent6>
-        <a:srgbClr val="F79646"/>
+        <a:srgbClr val="00349E"/>
       </a:accent6>
       <a:hlink>
-        <a:srgbClr val="0000FF"/>
+        <a:srgbClr val="17BBFD"/>
       </a:hlink>
       <a:folHlink>
-        <a:srgbClr val="800080"/>
+        <a:srgbClr val="FF79C2"/>
       </a:folHlink>
     </a:clrScheme>
-    <a:fontScheme name="Oficina">
+    <a:fontScheme name="Brío">
       <a:majorFont>
-        <a:latin typeface="Calibri"/>
+        <a:latin typeface="Century Gothic"/>
         <a:ea typeface=""/>
         <a:cs typeface=""/>
-        <a:font script="Jpan" typeface="ＭＳ Ｐゴシック"/>
-        <a:font script="Hang" typeface="맑은 고딕"/>
-        <a:font script="Hans" typeface="宋体"/>
-        <a:font script="Hant" typeface="新細明體"/>
-        <a:font script="Arab" typeface="Times New Roman"/>
-        <a:font script="Hebr" typeface="Times New Roman"/>
-        <a:font script="Thai" typeface="Angsana New"/>
-        <a:font script="Ethi" typeface="Nyala"/>
-        <a:font script="Beng" typeface="Vrinda"/>
-        <a:font script="Gujr" typeface="Shruti"/>
-        <a:font script="Khmr" typeface="MoolBoran"/>
-        <a:font script="Knda" typeface="Tunga"/>
-        <a:font script="Guru" typeface="Raavi"/>
-        <a:font script="Cans" typeface="Euphemia"/>
-        <a:font script="Cher" typeface="Plantagenet Cherokee"/>
-        <a:font script="Yiii" typeface="Microsoft Yi Baiti"/>
-        <a:font script="Tibt" typeface="Microsoft Himalaya"/>
-        <a:font script="Thaa" typeface="MV Boli"/>
-        <a:font script="Deva" typeface="Mangal"/>
-        <a:font script="Telu" typeface="Gautami"/>
-        <a:font script="Taml" typeface="Latha"/>
-        <a:font script="Syrc" typeface="Estrangelo Edessa"/>
-        <a:font script="Orya" typeface="Kalinga"/>
-        <a:font script="Mlym" typeface="Kartika"/>
-        <a:font script="Laoo" typeface="DokChampa"/>
-        <a:font script="Sinh" typeface="Iskoola Pota"/>
-        <a:font script="Mong" typeface="Mongolian Baiti"/>
-        <a:font script="Viet" typeface="Times New Roman"/>
-        <a:font script="Uigh" typeface="Microsoft Uighur"/>
-      </a:majorFont>
-      <a:minorFont>
-        <a:latin typeface="Calibri"/>
-        <a:ea typeface=""/>
-        <a:cs typeface=""/>
-        <a:font script="Jpan" typeface="ＭＳ Ｐゴシック"/>
-        <a:font script="Hang" typeface="맑은 고딕"/>
-        <a:font script="Hans" typeface="宋体"/>
-        <a:font script="Hant" typeface="新細明體"/>
-        <a:font script="Arab" typeface="Arial"/>
-        <a:font script="Hebr" typeface="Arial"/>
-        <a:font script="Thai" typeface="Cordia New"/>
+        <a:font script="Jpan" typeface="HGｺﾞｼｯｸM"/>
+        <a:font script="Hang" typeface="HY중고딕"/>
+        <a:font script="Hans" typeface="幼圆"/>
+        <a:font script="Hant" typeface="微軟正黑體"/>
+        <a:font script="Arab" typeface="Tahoma"/>
+        <a:font script="Hebr" typeface="Gisha"/>
+        <a:font script="Thai" typeface="DilleniaUPC"/>
         <a:font script="Ethi" typeface="Nyala"/>
         <a:font script="Beng" typeface="Vrinda"/>
         <a:font script="Gujr" typeface="Shruti"/>
@@ -4907,11 +5340,47 @@
         <a:font script="Laoo" typeface="DokChampa"/>
         <a:font script="Sinh" typeface="Iskoola Pota"/>
         <a:font script="Mong" typeface="Mongolian Baiti"/>
-        <a:font script="Viet" typeface="Arial"/>
+        <a:font script="Viet" typeface="Tahoma"/>
         <a:font script="Uigh" typeface="Microsoft Uighur"/>
+        <a:font script="Geor" typeface="Sylfaen"/>
+      </a:majorFont>
+      <a:minorFont>
+        <a:latin typeface="Century Gothic"/>
+        <a:ea typeface=""/>
+        <a:cs typeface=""/>
+        <a:font script="Jpan" typeface="ＭＳ ゴシック"/>
+        <a:font script="Hang" typeface="HY중고딕"/>
+        <a:font script="Hans" typeface="幼圆"/>
+        <a:font script="Hant" typeface="微軟正黑體"/>
+        <a:font script="Arab" typeface="Tahoma"/>
+        <a:font script="Hebr" typeface="Gisha"/>
+        <a:font script="Thai" typeface="DilleniaUPC"/>
+        <a:font script="Ethi" typeface="Nyala"/>
+        <a:font script="Beng" typeface="Vrinda"/>
+        <a:font script="Gujr" typeface="Shruti"/>
+        <a:font script="Khmr" typeface="DaunPenh"/>
+        <a:font script="Knda" typeface="Tunga"/>
+        <a:font script="Guru" typeface="Raavi"/>
+        <a:font script="Cans" typeface="Euphemia"/>
+        <a:font script="Cher" typeface="Plantagenet Cherokee"/>
+        <a:font script="Yiii" typeface="Microsoft Yi Baiti"/>
+        <a:font script="Tibt" typeface="Microsoft Himalaya"/>
+        <a:font script="Thaa" typeface="MV Boli"/>
+        <a:font script="Deva" typeface="Mangal"/>
+        <a:font script="Telu" typeface="Gautami"/>
+        <a:font script="Taml" typeface="Latha"/>
+        <a:font script="Syrc" typeface="Estrangelo Edessa"/>
+        <a:font script="Orya" typeface="Kalinga"/>
+        <a:font script="Mlym" typeface="Kartika"/>
+        <a:font script="Laoo" typeface="DokChampa"/>
+        <a:font script="Sinh" typeface="Iskoola Pota"/>
+        <a:font script="Mong" typeface="Mongolian Baiti"/>
+        <a:font script="Viet" typeface="Verdana"/>
+        <a:font script="Uigh" typeface="Microsoft Uighur"/>
+        <a:font script="Geor" typeface="Sylfaen"/>
       </a:minorFont>
     </a:fontScheme>
-    <a:fmtScheme name="Oficina">
+    <a:fmtScheme name="Brío">
       <a:fillStyleLst>
         <a:solidFill>
           <a:schemeClr val="phClr"/>
@@ -4920,55 +5389,58 @@
           <a:gsLst>
             <a:gs pos="0">
               <a:schemeClr val="phClr">
-                <a:tint val="50000"/>
+                <a:tint val="10000"/>
                 <a:satMod val="300000"/>
               </a:schemeClr>
             </a:gs>
-            <a:gs pos="35000">
+            <a:gs pos="34000">
               <a:schemeClr val="phClr">
-                <a:tint val="37000"/>
-                <a:satMod val="300000"/>
+                <a:tint val="13500"/>
+                <a:satMod val="250000"/>
               </a:schemeClr>
             </a:gs>
             <a:gs pos="100000">
               <a:schemeClr val="phClr">
-                <a:tint val="15000"/>
-                <a:satMod val="350000"/>
+                <a:tint val="60000"/>
+                <a:satMod val="200000"/>
               </a:schemeClr>
             </a:gs>
           </a:gsLst>
-          <a:lin ang="16200000" scaled="1"/>
+          <a:path path="circle">
+            <a:fillToRect l="50000" t="155000" r="50000" b="-55000"/>
+          </a:path>
         </a:gradFill>
         <a:gradFill rotWithShape="1">
           <a:gsLst>
             <a:gs pos="0">
               <a:schemeClr val="phClr">
-                <a:shade val="51000"/>
-                <a:satMod val="130000"/>
+                <a:tint val="60000"/>
+                <a:satMod val="160000"/>
               </a:schemeClr>
             </a:gs>
-            <a:gs pos="80000">
+            <a:gs pos="46000">
               <a:schemeClr val="phClr">
-                <a:shade val="93000"/>
-                <a:satMod val="130000"/>
+                <a:tint val="86000"/>
+                <a:satMod val="160000"/>
               </a:schemeClr>
             </a:gs>
             <a:gs pos="100000">
               <a:schemeClr val="phClr">
-                <a:shade val="94000"/>
-                <a:satMod val="135000"/>
+                <a:shade val="40000"/>
+                <a:satMod val="160000"/>
               </a:schemeClr>
             </a:gs>
           </a:gsLst>
-          <a:lin ang="16200000" scaled="0"/>
+          <a:path path="circle">
+            <a:fillToRect l="50000" t="155000" r="50000" b="-55000"/>
+          </a:path>
         </a:gradFill>
       </a:fillStyleLst>
       <a:lnStyleLst>
         <a:ln w="9525" cap="flat" cmpd="sng" algn="ctr">
           <a:solidFill>
             <a:schemeClr val="phClr">
-              <a:shade val="95000"/>
-              <a:satMod val="105000"/>
+              <a:satMod val="120000"/>
             </a:schemeClr>
           </a:solidFill>
           <a:prstDash val="solid"/>
@@ -4989,40 +5461,43 @@
       <a:effectStyleLst>
         <a:effectStyle>
           <a:effectLst>
-            <a:outerShdw blurRad="40000" dist="20000" dir="5400000" rotWithShape="0">
+            <a:outerShdw blurRad="63500" dist="25400" dir="14700000" algn="t" rotWithShape="0">
               <a:srgbClr val="000000">
-                <a:alpha val="38000"/>
+                <a:alpha val="50000"/>
               </a:srgbClr>
             </a:outerShdw>
           </a:effectLst>
         </a:effectStyle>
         <a:effectStyle>
           <a:effectLst>
-            <a:outerShdw blurRad="40000" dist="23000" dir="5400000" rotWithShape="0">
+            <a:outerShdw blurRad="50800" dist="38100" dir="14700000" algn="t" rotWithShape="0">
               <a:srgbClr val="000000">
-                <a:alpha val="35000"/>
+                <a:alpha val="60000"/>
               </a:srgbClr>
             </a:outerShdw>
           </a:effectLst>
         </a:effectStyle>
         <a:effectStyle>
           <a:effectLst>
-            <a:outerShdw blurRad="40000" dist="23000" dir="5400000" rotWithShape="0">
+            <a:outerShdw blurRad="50800" dist="38100" dir="14700000" algn="t" rotWithShape="0">
               <a:srgbClr val="000000">
-                <a:alpha val="35000"/>
+                <a:alpha val="60000"/>
               </a:srgbClr>
             </a:outerShdw>
           </a:effectLst>
           <a:scene3d>
-            <a:camera prst="orthographicFront">
+            <a:camera prst="orthographicFront" fov="0">
               <a:rot lat="0" lon="0" rev="0"/>
             </a:camera>
-            <a:lightRig rig="threePt" dir="t">
-              <a:rot lat="0" lon="0" rev="1200000"/>
+            <a:lightRig rig="contrasting" dir="t">
+              <a:rot lat="0" lon="0" rev="3600000"/>
             </a:lightRig>
           </a:scene3d>
-          <a:sp3d>
-            <a:bevelT w="63500" h="25400"/>
+          <a:sp3d prstMaterial="plastic">
+            <a:bevelT w="127000" h="38200" prst="relaxedInset"/>
+            <a:contourClr>
+              <a:schemeClr val="phClr"/>
+            </a:contourClr>
           </a:sp3d>
         </a:effectStyle>
       </a:effectStyleLst>
@@ -5034,47 +5509,40 @@
           <a:gsLst>
             <a:gs pos="0">
               <a:schemeClr val="phClr">
-                <a:tint val="40000"/>
-                <a:satMod val="350000"/>
+                <a:shade val="48000"/>
+                <a:satMod val="230000"/>
               </a:schemeClr>
             </a:gs>
-            <a:gs pos="40000">
+            <a:gs pos="60000">
               <a:schemeClr val="phClr">
-                <a:tint val="45000"/>
-                <a:shade val="99000"/>
-                <a:satMod val="350000"/>
+                <a:shade val="92000"/>
+                <a:satMod val="230000"/>
               </a:schemeClr>
             </a:gs>
             <a:gs pos="100000">
               <a:schemeClr val="phClr">
-                <a:shade val="20000"/>
-                <a:satMod val="255000"/>
+                <a:tint val="85000"/>
+                <a:satMod val="400000"/>
               </a:schemeClr>
             </a:gs>
           </a:gsLst>
-          <a:path path="circle">
-            <a:fillToRect l="50000" t="-80000" r="50000" b="180000"/>
-          </a:path>
+          <a:lin ang="5400000" scaled="0"/>
         </a:gradFill>
-        <a:gradFill rotWithShape="1">
-          <a:gsLst>
-            <a:gs pos="0">
+        <a:blipFill>
+          <a:blip xmlns:r="http://schemas.openxmlformats.org/officeDocument/2006/relationships" r:embed="rId1">
+            <a:duotone>
               <a:schemeClr val="phClr">
-                <a:tint val="80000"/>
-                <a:satMod val="300000"/>
+                <a:shade val="1200"/>
+                <a:satMod val="150000"/>
               </a:schemeClr>
-            </a:gs>
-            <a:gs pos="100000">
               <a:schemeClr val="phClr">
-                <a:shade val="30000"/>
-                <a:satMod val="200000"/>
+                <a:tint val="90000"/>
+                <a:satMod val="150000"/>
               </a:schemeClr>
-            </a:gs>
-          </a:gsLst>
-          <a:path path="circle">
-            <a:fillToRect l="50000" t="50000" r="50000" b="50000"/>
-          </a:path>
-        </a:gradFill>
+            </a:duotone>
+          </a:blip>
+          <a:tile tx="0" ty="0" sx="70000" sy="70000" flip="none" algn="tl"/>
+        </a:blipFill>
       </a:bgFillStyleLst>
     </a:fmtScheme>
   </a:themeElements>

</xml_diff>